<commit_message>
Added additional notes for slides
</commit_message>
<xml_diff>
--- a/slides/lecture_1_intro.pptx
+++ b/slides/lecture_1_intro.pptx
@@ -225,7 +225,7 @@
           <a:p>
             <a:fld id="{3FDC14FC-A894-4869-A797-1EC82735D106}" type="datetimeFigureOut">
               <a:rPr lang="en-US" smtClean="0"/>
-              <a:t>9/7/2020</a:t>
+              <a:t>9/8/2020</a:t>
             </a:fld>
             <a:endParaRPr lang="en-US"/>
           </a:p>
@@ -390,7 +390,7 @@
           <a:p>
             <a:fld id="{B4F99C05-63F9-4248-8E20-3ACD9DF9DE7F}" type="datetimeFigureOut">
               <a:rPr lang="en-US" smtClean="0"/>
-              <a:t>9/7/2020</a:t>
+              <a:t>9/8/2020</a:t>
             </a:fld>
             <a:endParaRPr lang="en-US"/>
           </a:p>
@@ -716,6 +716,37 @@
               <a:buChar char="•"/>
             </a:pPr>
             <a:r>
+              <a:rPr lang="en-US" dirty="0"/>
+              <a:t>Test reports</a:t>
+            </a:r>
+          </a:p>
+          <a:p>
+            <a:pPr marL="171450" indent="-171450">
+              <a:buFont typeface="Arial" panose="020B0604020202020204" pitchFamily="34" charset="0"/>
+              <a:buChar char="•"/>
+            </a:pPr>
+            <a:r>
+              <a:rPr lang="en-US" dirty="0"/>
+              <a:t>CLI execution</a:t>
+            </a:r>
+          </a:p>
+          <a:p>
+            <a:pPr marL="171450" indent="-171450">
+              <a:buFont typeface="Arial" panose="020B0604020202020204" pitchFamily="34" charset="0"/>
+              <a:buChar char="•"/>
+            </a:pPr>
+            <a:r>
+              <a:rPr lang="en-US"/>
+              <a:t>Debugging</a:t>
+            </a:r>
+            <a:endParaRPr lang="en-US" dirty="0"/>
+          </a:p>
+          <a:p>
+            <a:pPr marL="171450" indent="-171450">
+              <a:buFont typeface="Arial" panose="020B0604020202020204" pitchFamily="34" charset="0"/>
+              <a:buChar char="•"/>
+            </a:pPr>
+            <a:r>
               <a:rPr lang="en-US" dirty="0">
                 <a:solidFill>
                   <a:srgbClr val="000077"/>
@@ -9639,7 +9670,7 @@
           </a:ln>
           <a:extLst>
             <a:ext uri="{C572A759-6A51-4108-AA02-DFA0A04FC94B}">
-              <ma14:wrappingTextBoxFlag xmlns:ma14="http://schemas.microsoft.com/office/mac/drawingml/2011/main" xmlns="" val="1"/>
+              <ma14:wrappingTextBoxFlag xmlns="" xmlns:ma14="http://schemas.microsoft.com/office/mac/drawingml/2011/main" val="1"/>
             </a:ext>
           </a:extLst>
         </p:spPr>

</xml_diff>

<commit_message>
Added bad tests for refactoring
</commit_message>
<xml_diff>
--- a/slides/lecture_1_intro.pptx
+++ b/slides/lecture_1_intro.pptx
@@ -7,10 +7,10 @@
     <p:sldMasterId id="2147483663" r:id="rId3"/>
   </p:sldMasterIdLst>
   <p:notesMasterIdLst>
-    <p:notesMasterId r:id="rId16"/>
+    <p:notesMasterId r:id="rId24"/>
   </p:notesMasterIdLst>
   <p:handoutMasterIdLst>
-    <p:handoutMasterId r:id="rId17"/>
+    <p:handoutMasterId r:id="rId25"/>
   </p:handoutMasterIdLst>
   <p:sldIdLst>
     <p:sldId id="256" r:id="rId4"/>
@@ -24,7 +24,15 @@
     <p:sldId id="282" r:id="rId12"/>
     <p:sldId id="287" r:id="rId13"/>
     <p:sldId id="285" r:id="rId14"/>
-    <p:sldId id="286" r:id="rId15"/>
+    <p:sldId id="288" r:id="rId15"/>
+    <p:sldId id="286" r:id="rId16"/>
+    <p:sldId id="289" r:id="rId17"/>
+    <p:sldId id="291" r:id="rId18"/>
+    <p:sldId id="292" r:id="rId19"/>
+    <p:sldId id="293" r:id="rId20"/>
+    <p:sldId id="294" r:id="rId21"/>
+    <p:sldId id="290" r:id="rId22"/>
+    <p:sldId id="295" r:id="rId23"/>
   </p:sldIdLst>
   <p:sldSz cx="9144000" cy="5143500" type="screen16x9"/>
   <p:notesSz cx="6858000" cy="9144000"/>
@@ -227,7 +235,7 @@
           <a:p>
             <a:fld id="{3FDC14FC-A894-4869-A797-1EC82735D106}" type="datetimeFigureOut">
               <a:rPr lang="en-US" smtClean="0"/>
-              <a:t>9/9/2020</a:t>
+              <a:t>9/10/2020</a:t>
             </a:fld>
             <a:endParaRPr lang="en-US"/>
           </a:p>
@@ -392,7 +400,7 @@
           <a:p>
             <a:fld id="{B4F99C05-63F9-4248-8E20-3ACD9DF9DE7F}" type="datetimeFigureOut">
               <a:rPr lang="en-US" smtClean="0"/>
-              <a:t>9/9/2020</a:t>
+              <a:t>9/10/2020</a:t>
             </a:fld>
             <a:endParaRPr lang="en-US"/>
           </a:p>
@@ -862,18 +870,7 @@
           <a:bodyPr/>
           <a:lstStyle/>
           <a:p>
-            <a:r>
-              <a:rPr lang="en-US" dirty="0"/>
-              <a:t>* Lifecycle methods – </a:t>
-            </a:r>
-            <a:r>
-              <a:rPr lang="en-US" dirty="0" err="1"/>
-              <a:t>ShoppingCart.empty</a:t>
-            </a:r>
-            <a:r>
-              <a:rPr lang="en-US" dirty="0"/>
-              <a:t>()</a:t>
-            </a:r>
+            <a:endParaRPr lang="en-US" dirty="0"/>
           </a:p>
         </p:txBody>
       </p:sp>
@@ -957,18 +954,7 @@
           <a:bodyPr/>
           <a:lstStyle/>
           <a:p>
-            <a:r>
-              <a:rPr lang="en-US" dirty="0"/>
-              <a:t>* Lifecycle methods – </a:t>
-            </a:r>
-            <a:r>
-              <a:rPr lang="en-US" dirty="0" err="1"/>
-              <a:t>ShoppingCart.empty</a:t>
-            </a:r>
-            <a:r>
-              <a:rPr lang="en-US" dirty="0"/>
-              <a:t>()</a:t>
-            </a:r>
+            <a:endParaRPr lang="en-US" dirty="0"/>
           </a:p>
         </p:txBody>
       </p:sp>
@@ -999,6 +985,665 @@
     <p:extLst>
       <p:ext uri="{BB962C8B-B14F-4D97-AF65-F5344CB8AC3E}">
         <p14:creationId xmlns:p14="http://schemas.microsoft.com/office/powerpoint/2010/main" val="4223205056"/>
+      </p:ext>
+    </p:extLst>
+  </p:cSld>
+  <p:clrMapOvr>
+    <a:masterClrMapping/>
+  </p:clrMapOvr>
+</p:notes>
+</file>
+
+<file path=ppt/notesSlides/notesSlide4.xml><?xml version="1.0" encoding="utf-8"?>
+<p:notes xmlns:a="http://schemas.openxmlformats.org/drawingml/2006/main" xmlns:r="http://schemas.openxmlformats.org/officeDocument/2006/relationships" xmlns:p="http://schemas.openxmlformats.org/presentationml/2006/main">
+  <p:cSld>
+    <p:spTree>
+      <p:nvGrpSpPr>
+        <p:cNvPr id="1" name=""/>
+        <p:cNvGrpSpPr/>
+        <p:nvPr/>
+      </p:nvGrpSpPr>
+      <p:grpSpPr>
+        <a:xfrm>
+          <a:off x="0" y="0"/>
+          <a:ext cx="0" cy="0"/>
+          <a:chOff x="0" y="0"/>
+          <a:chExt cx="0" cy="0"/>
+        </a:xfrm>
+      </p:grpSpPr>
+      <p:sp>
+        <p:nvSpPr>
+          <p:cNvPr id="2" name="Slide Image Placeholder 1"/>
+          <p:cNvSpPr>
+            <a:spLocks noGrp="1" noRot="1" noChangeAspect="1"/>
+          </p:cNvSpPr>
+          <p:nvPr>
+            <p:ph type="sldImg"/>
+          </p:nvPr>
+        </p:nvSpPr>
+        <p:spPr/>
+      </p:sp>
+      <p:sp>
+        <p:nvSpPr>
+          <p:cNvPr id="3" name="Notes Placeholder 2"/>
+          <p:cNvSpPr>
+            <a:spLocks noGrp="1"/>
+          </p:cNvSpPr>
+          <p:nvPr>
+            <p:ph type="body" idx="1"/>
+          </p:nvPr>
+        </p:nvSpPr>
+        <p:spPr/>
+        <p:txBody>
+          <a:bodyPr/>
+          <a:lstStyle/>
+          <a:p>
+            <a:pPr marL="171450" indent="-171450">
+              <a:buFont typeface="Arial" panose="020B0604020202020204" pitchFamily="34" charset="0"/>
+              <a:buChar char="•"/>
+            </a:pPr>
+            <a:r>
+              <a:rPr lang="en-US" dirty="0"/>
+              <a:t>Fast – Simple </a:t>
+            </a:r>
+            <a:r>
+              <a:rPr lang="en-US" dirty="0" err="1"/>
+              <a:t>Thread.sleep</a:t>
+            </a:r>
+            <a:r>
+              <a:rPr lang="en-US" dirty="0"/>
+              <a:t>() Accessing Warehouse Service</a:t>
+            </a:r>
+          </a:p>
+          <a:p>
+            <a:pPr marL="171450" marR="0" lvl="0" indent="-171450" algn="l" defTabSz="685800" rtl="0" eaLnBrk="1" fontAlgn="auto" latinLnBrk="0" hangingPunct="1">
+              <a:lnSpc>
+                <a:spcPct val="100000"/>
+              </a:lnSpc>
+              <a:spcBef>
+                <a:spcPts val="0"/>
+              </a:spcBef>
+              <a:spcAft>
+                <a:spcPts val="0"/>
+              </a:spcAft>
+              <a:buClrTx/>
+              <a:buSzTx/>
+              <a:buFont typeface="Arial" panose="020B0604020202020204" pitchFamily="34" charset="0"/>
+              <a:buChar char="•"/>
+              <a:tabLst/>
+              <a:defRPr/>
+            </a:pPr>
+            <a:r>
+              <a:rPr lang="en-US" dirty="0"/>
+              <a:t>Independent - Lifecycle methods – </a:t>
+            </a:r>
+            <a:r>
+              <a:rPr lang="en-US" dirty="0" err="1"/>
+              <a:t>ShoppingCart.empty</a:t>
+            </a:r>
+            <a:r>
+              <a:rPr lang="en-US" dirty="0"/>
+              <a:t>()</a:t>
+            </a:r>
+          </a:p>
+          <a:p>
+            <a:pPr marL="171450" indent="-171450">
+              <a:buFont typeface="Arial" panose="020B0604020202020204" pitchFamily="34" charset="0"/>
+              <a:buChar char="•"/>
+            </a:pPr>
+            <a:r>
+              <a:rPr lang="en-US" dirty="0"/>
+              <a:t>Repeatable – Using Date for a </a:t>
+            </a:r>
+            <a:r>
+              <a:rPr lang="en-US" dirty="0" err="1"/>
+              <a:t>ListItem</a:t>
+            </a:r>
+            <a:r>
+              <a:rPr lang="en-US" dirty="0"/>
+              <a:t>?</a:t>
+            </a:r>
+          </a:p>
+          <a:p>
+            <a:pPr marL="171450" indent="-171450">
+              <a:buFont typeface="Arial" panose="020B0604020202020204" pitchFamily="34" charset="0"/>
+              <a:buChar char="•"/>
+            </a:pPr>
+            <a:r>
+              <a:rPr lang="en-US" dirty="0"/>
+              <a:t>Self-Validating – </a:t>
+            </a:r>
+            <a:r>
+              <a:rPr lang="en-US" dirty="0" err="1"/>
+              <a:t>Sysout</a:t>
+            </a:r>
+            <a:r>
+              <a:rPr lang="en-US" dirty="0"/>
+              <a:t> and checking logs, files on FS</a:t>
+            </a:r>
+          </a:p>
+          <a:p>
+            <a:pPr marL="171450" indent="-171450">
+              <a:buFont typeface="Arial" panose="020B0604020202020204" pitchFamily="34" charset="0"/>
+              <a:buChar char="•"/>
+            </a:pPr>
+            <a:r>
+              <a:rPr lang="en-US" dirty="0"/>
+              <a:t>Timely – Tests written first</a:t>
+            </a:r>
+          </a:p>
+          <a:p>
+            <a:pPr marL="171450" indent="-171450">
+              <a:buFont typeface="Arial" panose="020B0604020202020204" pitchFamily="34" charset="0"/>
+              <a:buChar char="•"/>
+            </a:pPr>
+            <a:r>
+              <a:rPr lang="en-US" dirty="0" err="1"/>
+              <a:t>AssertSame</a:t>
+            </a:r>
+            <a:r>
+              <a:rPr lang="en-US" dirty="0"/>
+              <a:t> </a:t>
+            </a:r>
+            <a:r>
+              <a:rPr lang="en-US" dirty="0" err="1"/>
+              <a:t>cart.getOwner</a:t>
+            </a:r>
+            <a:r>
+              <a:rPr lang="en-US" dirty="0"/>
+              <a:t>() ???</a:t>
+            </a:r>
+          </a:p>
+          <a:p>
+            <a:pPr marL="171450" indent="-171450">
+              <a:buFont typeface="Arial" panose="020B0604020202020204" pitchFamily="34" charset="0"/>
+              <a:buChar char="•"/>
+            </a:pPr>
+            <a:endParaRPr lang="en-US" dirty="0"/>
+          </a:p>
+          <a:p>
+            <a:pPr marL="171450" indent="-171450">
+              <a:buFont typeface="Arial" panose="020B0604020202020204" pitchFamily="34" charset="0"/>
+              <a:buChar char="•"/>
+            </a:pPr>
+            <a:endParaRPr lang="en-US" dirty="0"/>
+          </a:p>
+        </p:txBody>
+      </p:sp>
+      <p:sp>
+        <p:nvSpPr>
+          <p:cNvPr id="4" name="Slide Number Placeholder 3"/>
+          <p:cNvSpPr>
+            <a:spLocks noGrp="1"/>
+          </p:cNvSpPr>
+          <p:nvPr>
+            <p:ph type="sldNum" sz="quarter" idx="5"/>
+          </p:nvPr>
+        </p:nvSpPr>
+        <p:spPr/>
+        <p:txBody>
+          <a:bodyPr/>
+          <a:lstStyle/>
+          <a:p>
+            <a:fld id="{A874FABB-6DBE-47C4-B626-20167906F475}" type="slidenum">
+              <a:rPr lang="en-US" smtClean="0"/>
+              <a:t>12</a:t>
+            </a:fld>
+            <a:endParaRPr lang="en-US"/>
+          </a:p>
+        </p:txBody>
+      </p:sp>
+    </p:spTree>
+    <p:extLst>
+      <p:ext uri="{BB962C8B-B14F-4D97-AF65-F5344CB8AC3E}">
+        <p14:creationId xmlns:p14="http://schemas.microsoft.com/office/powerpoint/2010/main" val="4155052760"/>
+      </p:ext>
+    </p:extLst>
+  </p:cSld>
+  <p:clrMapOvr>
+    <a:masterClrMapping/>
+  </p:clrMapOvr>
+</p:notes>
+</file>
+
+<file path=ppt/notesSlides/notesSlide5.xml><?xml version="1.0" encoding="utf-8"?>
+<p:notes xmlns:a="http://schemas.openxmlformats.org/drawingml/2006/main" xmlns:r="http://schemas.openxmlformats.org/officeDocument/2006/relationships" xmlns:p="http://schemas.openxmlformats.org/presentationml/2006/main">
+  <p:cSld>
+    <p:spTree>
+      <p:nvGrpSpPr>
+        <p:cNvPr id="1" name=""/>
+        <p:cNvGrpSpPr/>
+        <p:nvPr/>
+      </p:nvGrpSpPr>
+      <p:grpSpPr>
+        <a:xfrm>
+          <a:off x="0" y="0"/>
+          <a:ext cx="0" cy="0"/>
+          <a:chOff x="0" y="0"/>
+          <a:chExt cx="0" cy="0"/>
+        </a:xfrm>
+      </p:grpSpPr>
+      <p:sp>
+        <p:nvSpPr>
+          <p:cNvPr id="2" name="Slide Image Placeholder 1"/>
+          <p:cNvSpPr>
+            <a:spLocks noGrp="1" noRot="1" noChangeAspect="1"/>
+          </p:cNvSpPr>
+          <p:nvPr>
+            <p:ph type="sldImg"/>
+          </p:nvPr>
+        </p:nvSpPr>
+        <p:spPr/>
+      </p:sp>
+      <p:sp>
+        <p:nvSpPr>
+          <p:cNvPr id="3" name="Notes Placeholder 2"/>
+          <p:cNvSpPr>
+            <a:spLocks noGrp="1"/>
+          </p:cNvSpPr>
+          <p:nvPr>
+            <p:ph type="body" idx="1"/>
+          </p:nvPr>
+        </p:nvSpPr>
+        <p:spPr/>
+        <p:txBody>
+          <a:bodyPr/>
+          <a:lstStyle/>
+          <a:p>
+            <a:endParaRPr lang="en-US" dirty="0"/>
+          </a:p>
+        </p:txBody>
+      </p:sp>
+      <p:sp>
+        <p:nvSpPr>
+          <p:cNvPr id="4" name="Slide Number Placeholder 3"/>
+          <p:cNvSpPr>
+            <a:spLocks noGrp="1"/>
+          </p:cNvSpPr>
+          <p:nvPr>
+            <p:ph type="sldNum" sz="quarter" idx="5"/>
+          </p:nvPr>
+        </p:nvSpPr>
+        <p:spPr/>
+        <p:txBody>
+          <a:bodyPr/>
+          <a:lstStyle/>
+          <a:p>
+            <a:fld id="{A874FABB-6DBE-47C4-B626-20167906F475}" type="slidenum">
+              <a:rPr lang="en-US" smtClean="0"/>
+              <a:t>15</a:t>
+            </a:fld>
+            <a:endParaRPr lang="en-US"/>
+          </a:p>
+        </p:txBody>
+      </p:sp>
+    </p:spTree>
+    <p:extLst>
+      <p:ext uri="{BB962C8B-B14F-4D97-AF65-F5344CB8AC3E}">
+        <p14:creationId xmlns:p14="http://schemas.microsoft.com/office/powerpoint/2010/main" val="538611285"/>
+      </p:ext>
+    </p:extLst>
+  </p:cSld>
+  <p:clrMapOvr>
+    <a:masterClrMapping/>
+  </p:clrMapOvr>
+</p:notes>
+</file>
+
+<file path=ppt/notesSlides/notesSlide6.xml><?xml version="1.0" encoding="utf-8"?>
+<p:notes xmlns:a="http://schemas.openxmlformats.org/drawingml/2006/main" xmlns:r="http://schemas.openxmlformats.org/officeDocument/2006/relationships" xmlns:p="http://schemas.openxmlformats.org/presentationml/2006/main">
+  <p:cSld>
+    <p:spTree>
+      <p:nvGrpSpPr>
+        <p:cNvPr id="1" name=""/>
+        <p:cNvGrpSpPr/>
+        <p:nvPr/>
+      </p:nvGrpSpPr>
+      <p:grpSpPr>
+        <a:xfrm>
+          <a:off x="0" y="0"/>
+          <a:ext cx="0" cy="0"/>
+          <a:chOff x="0" y="0"/>
+          <a:chExt cx="0" cy="0"/>
+        </a:xfrm>
+      </p:grpSpPr>
+      <p:sp>
+        <p:nvSpPr>
+          <p:cNvPr id="2" name="Slide Image Placeholder 1"/>
+          <p:cNvSpPr>
+            <a:spLocks noGrp="1" noRot="1" noChangeAspect="1"/>
+          </p:cNvSpPr>
+          <p:nvPr>
+            <p:ph type="sldImg"/>
+          </p:nvPr>
+        </p:nvSpPr>
+        <p:spPr/>
+      </p:sp>
+      <p:sp>
+        <p:nvSpPr>
+          <p:cNvPr id="3" name="Notes Placeholder 2"/>
+          <p:cNvSpPr>
+            <a:spLocks noGrp="1"/>
+          </p:cNvSpPr>
+          <p:nvPr>
+            <p:ph type="body" idx="1"/>
+          </p:nvPr>
+        </p:nvSpPr>
+        <p:spPr/>
+        <p:txBody>
+          <a:bodyPr/>
+          <a:lstStyle/>
+          <a:p>
+            <a:endParaRPr lang="en-US" dirty="0"/>
+          </a:p>
+        </p:txBody>
+      </p:sp>
+      <p:sp>
+        <p:nvSpPr>
+          <p:cNvPr id="4" name="Slide Number Placeholder 3"/>
+          <p:cNvSpPr>
+            <a:spLocks noGrp="1"/>
+          </p:cNvSpPr>
+          <p:nvPr>
+            <p:ph type="sldNum" sz="quarter" idx="5"/>
+          </p:nvPr>
+        </p:nvSpPr>
+        <p:spPr/>
+        <p:txBody>
+          <a:bodyPr/>
+          <a:lstStyle/>
+          <a:p>
+            <a:fld id="{A874FABB-6DBE-47C4-B626-20167906F475}" type="slidenum">
+              <a:rPr lang="en-US" smtClean="0"/>
+              <a:t>16</a:t>
+            </a:fld>
+            <a:endParaRPr lang="en-US"/>
+          </a:p>
+        </p:txBody>
+      </p:sp>
+    </p:spTree>
+    <p:extLst>
+      <p:ext uri="{BB962C8B-B14F-4D97-AF65-F5344CB8AC3E}">
+        <p14:creationId xmlns:p14="http://schemas.microsoft.com/office/powerpoint/2010/main" val="4259437988"/>
+      </p:ext>
+    </p:extLst>
+  </p:cSld>
+  <p:clrMapOvr>
+    <a:masterClrMapping/>
+  </p:clrMapOvr>
+</p:notes>
+</file>
+
+<file path=ppt/notesSlides/notesSlide7.xml><?xml version="1.0" encoding="utf-8"?>
+<p:notes xmlns:a="http://schemas.openxmlformats.org/drawingml/2006/main" xmlns:r="http://schemas.openxmlformats.org/officeDocument/2006/relationships" xmlns:p="http://schemas.openxmlformats.org/presentationml/2006/main">
+  <p:cSld>
+    <p:spTree>
+      <p:nvGrpSpPr>
+        <p:cNvPr id="1" name=""/>
+        <p:cNvGrpSpPr/>
+        <p:nvPr/>
+      </p:nvGrpSpPr>
+      <p:grpSpPr>
+        <a:xfrm>
+          <a:off x="0" y="0"/>
+          <a:ext cx="0" cy="0"/>
+          <a:chOff x="0" y="0"/>
+          <a:chExt cx="0" cy="0"/>
+        </a:xfrm>
+      </p:grpSpPr>
+      <p:sp>
+        <p:nvSpPr>
+          <p:cNvPr id="2" name="Slide Image Placeholder 1"/>
+          <p:cNvSpPr>
+            <a:spLocks noGrp="1" noRot="1" noChangeAspect="1"/>
+          </p:cNvSpPr>
+          <p:nvPr>
+            <p:ph type="sldImg"/>
+          </p:nvPr>
+        </p:nvSpPr>
+        <p:spPr/>
+      </p:sp>
+      <p:sp>
+        <p:nvSpPr>
+          <p:cNvPr id="3" name="Notes Placeholder 2"/>
+          <p:cNvSpPr>
+            <a:spLocks noGrp="1"/>
+          </p:cNvSpPr>
+          <p:nvPr>
+            <p:ph type="body" idx="1"/>
+          </p:nvPr>
+        </p:nvSpPr>
+        <p:spPr/>
+        <p:txBody>
+          <a:bodyPr/>
+          <a:lstStyle/>
+          <a:p>
+            <a:pPr marL="0" indent="0">
+              <a:buFont typeface="Arial" panose="020B0604020202020204" pitchFamily="34" charset="0"/>
+              <a:buNone/>
+            </a:pPr>
+            <a:endParaRPr lang="en-US" dirty="0"/>
+          </a:p>
+        </p:txBody>
+      </p:sp>
+      <p:sp>
+        <p:nvSpPr>
+          <p:cNvPr id="4" name="Slide Number Placeholder 3"/>
+          <p:cNvSpPr>
+            <a:spLocks noGrp="1"/>
+          </p:cNvSpPr>
+          <p:nvPr>
+            <p:ph type="sldNum" sz="quarter" idx="5"/>
+          </p:nvPr>
+        </p:nvSpPr>
+        <p:spPr/>
+        <p:txBody>
+          <a:bodyPr/>
+          <a:lstStyle/>
+          <a:p>
+            <a:fld id="{A874FABB-6DBE-47C4-B626-20167906F475}" type="slidenum">
+              <a:rPr lang="en-US" smtClean="0"/>
+              <a:t>17</a:t>
+            </a:fld>
+            <a:endParaRPr lang="en-US"/>
+          </a:p>
+        </p:txBody>
+      </p:sp>
+    </p:spTree>
+    <p:extLst>
+      <p:ext uri="{BB962C8B-B14F-4D97-AF65-F5344CB8AC3E}">
+        <p14:creationId xmlns:p14="http://schemas.microsoft.com/office/powerpoint/2010/main" val="4213840763"/>
+      </p:ext>
+    </p:extLst>
+  </p:cSld>
+  <p:clrMapOvr>
+    <a:masterClrMapping/>
+  </p:clrMapOvr>
+</p:notes>
+</file>
+
+<file path=ppt/notesSlides/notesSlide8.xml><?xml version="1.0" encoding="utf-8"?>
+<p:notes xmlns:a="http://schemas.openxmlformats.org/drawingml/2006/main" xmlns:r="http://schemas.openxmlformats.org/officeDocument/2006/relationships" xmlns:p="http://schemas.openxmlformats.org/presentationml/2006/main">
+  <p:cSld>
+    <p:spTree>
+      <p:nvGrpSpPr>
+        <p:cNvPr id="1" name=""/>
+        <p:cNvGrpSpPr/>
+        <p:nvPr/>
+      </p:nvGrpSpPr>
+      <p:grpSpPr>
+        <a:xfrm>
+          <a:off x="0" y="0"/>
+          <a:ext cx="0" cy="0"/>
+          <a:chOff x="0" y="0"/>
+          <a:chExt cx="0" cy="0"/>
+        </a:xfrm>
+      </p:grpSpPr>
+      <p:sp>
+        <p:nvSpPr>
+          <p:cNvPr id="2" name="Slide Image Placeholder 1"/>
+          <p:cNvSpPr>
+            <a:spLocks noGrp="1" noRot="1" noChangeAspect="1"/>
+          </p:cNvSpPr>
+          <p:nvPr>
+            <p:ph type="sldImg"/>
+          </p:nvPr>
+        </p:nvSpPr>
+        <p:spPr/>
+      </p:sp>
+      <p:sp>
+        <p:nvSpPr>
+          <p:cNvPr id="3" name="Notes Placeholder 2"/>
+          <p:cNvSpPr>
+            <a:spLocks noGrp="1"/>
+          </p:cNvSpPr>
+          <p:nvPr>
+            <p:ph type="body" idx="1"/>
+          </p:nvPr>
+        </p:nvSpPr>
+        <p:spPr/>
+        <p:txBody>
+          <a:bodyPr/>
+          <a:lstStyle/>
+          <a:p>
+            <a:pPr marL="171450" indent="-171450">
+              <a:buFont typeface="Arial" panose="020B0604020202020204" pitchFamily="34" charset="0"/>
+              <a:buChar char="•"/>
+            </a:pPr>
+            <a:r>
+              <a:rPr lang="en-US" dirty="0"/>
+              <a:t>Distinguish tests with annotation, run </a:t>
+            </a:r>
+            <a:r>
+              <a:rPr lang="en-US"/>
+              <a:t>them separately</a:t>
+            </a:r>
+            <a:endParaRPr lang="en-US" dirty="0"/>
+          </a:p>
+        </p:txBody>
+      </p:sp>
+      <p:sp>
+        <p:nvSpPr>
+          <p:cNvPr id="4" name="Slide Number Placeholder 3"/>
+          <p:cNvSpPr>
+            <a:spLocks noGrp="1"/>
+          </p:cNvSpPr>
+          <p:nvPr>
+            <p:ph type="sldNum" sz="quarter" idx="5"/>
+          </p:nvPr>
+        </p:nvSpPr>
+        <p:spPr/>
+        <p:txBody>
+          <a:bodyPr/>
+          <a:lstStyle/>
+          <a:p>
+            <a:fld id="{A874FABB-6DBE-47C4-B626-20167906F475}" type="slidenum">
+              <a:rPr lang="en-US" smtClean="0"/>
+              <a:t>18</a:t>
+            </a:fld>
+            <a:endParaRPr lang="en-US"/>
+          </a:p>
+        </p:txBody>
+      </p:sp>
+    </p:spTree>
+    <p:extLst>
+      <p:ext uri="{BB962C8B-B14F-4D97-AF65-F5344CB8AC3E}">
+        <p14:creationId xmlns:p14="http://schemas.microsoft.com/office/powerpoint/2010/main" val="1200235832"/>
+      </p:ext>
+    </p:extLst>
+  </p:cSld>
+  <p:clrMapOvr>
+    <a:masterClrMapping/>
+  </p:clrMapOvr>
+</p:notes>
+</file>
+
+<file path=ppt/notesSlides/notesSlide9.xml><?xml version="1.0" encoding="utf-8"?>
+<p:notes xmlns:a="http://schemas.openxmlformats.org/drawingml/2006/main" xmlns:r="http://schemas.openxmlformats.org/officeDocument/2006/relationships" xmlns:p="http://schemas.openxmlformats.org/presentationml/2006/main">
+  <p:cSld>
+    <p:spTree>
+      <p:nvGrpSpPr>
+        <p:cNvPr id="1" name=""/>
+        <p:cNvGrpSpPr/>
+        <p:nvPr/>
+      </p:nvGrpSpPr>
+      <p:grpSpPr>
+        <a:xfrm>
+          <a:off x="0" y="0"/>
+          <a:ext cx="0" cy="0"/>
+          <a:chOff x="0" y="0"/>
+          <a:chExt cx="0" cy="0"/>
+        </a:xfrm>
+      </p:grpSpPr>
+      <p:sp>
+        <p:nvSpPr>
+          <p:cNvPr id="2" name="Slide Image Placeholder 1"/>
+          <p:cNvSpPr>
+            <a:spLocks noGrp="1" noRot="1" noChangeAspect="1"/>
+          </p:cNvSpPr>
+          <p:nvPr>
+            <p:ph type="sldImg"/>
+          </p:nvPr>
+        </p:nvSpPr>
+        <p:spPr/>
+      </p:sp>
+      <p:sp>
+        <p:nvSpPr>
+          <p:cNvPr id="3" name="Notes Placeholder 2"/>
+          <p:cNvSpPr>
+            <a:spLocks noGrp="1"/>
+          </p:cNvSpPr>
+          <p:nvPr>
+            <p:ph type="body" idx="1"/>
+          </p:nvPr>
+        </p:nvSpPr>
+        <p:spPr/>
+        <p:txBody>
+          <a:bodyPr/>
+          <a:lstStyle/>
+          <a:p>
+            <a:pPr marL="171450" indent="-171450">
+              <a:buFont typeface="Arial" panose="020B0604020202020204" pitchFamily="34" charset="0"/>
+              <a:buChar char="•"/>
+            </a:pPr>
+            <a:endParaRPr lang="en-US" dirty="0"/>
+          </a:p>
+          <a:p>
+            <a:pPr marL="171450" indent="-171450">
+              <a:buFont typeface="Arial" panose="020B0604020202020204" pitchFamily="34" charset="0"/>
+              <a:buChar char="•"/>
+            </a:pPr>
+            <a:endParaRPr lang="en-US" dirty="0"/>
+          </a:p>
+        </p:txBody>
+      </p:sp>
+      <p:sp>
+        <p:nvSpPr>
+          <p:cNvPr id="4" name="Slide Number Placeholder 3"/>
+          <p:cNvSpPr>
+            <a:spLocks noGrp="1"/>
+          </p:cNvSpPr>
+          <p:nvPr>
+            <p:ph type="sldNum" sz="quarter" idx="5"/>
+          </p:nvPr>
+        </p:nvSpPr>
+        <p:spPr/>
+        <p:txBody>
+          <a:bodyPr/>
+          <a:lstStyle/>
+          <a:p>
+            <a:fld id="{A874FABB-6DBE-47C4-B626-20167906F475}" type="slidenum">
+              <a:rPr lang="en-US" smtClean="0"/>
+              <a:t>20</a:t>
+            </a:fld>
+            <a:endParaRPr lang="en-US"/>
+          </a:p>
+        </p:txBody>
+      </p:sp>
+    </p:spTree>
+    <p:extLst>
+      <p:ext uri="{BB962C8B-B14F-4D97-AF65-F5344CB8AC3E}">
+        <p14:creationId xmlns:p14="http://schemas.microsoft.com/office/powerpoint/2010/main" val="518241313"/>
       </p:ext>
     </p:extLst>
   </p:cSld>
@@ -22625,13 +23270,13 @@
   <p:clrMapOvr>
     <a:masterClrMapping/>
   </p:clrMapOvr>
-  <mc:AlternateContent xmlns:mc="http://schemas.openxmlformats.org/markup-compatibility/2006">
-    <mc:Choice xmlns:p159="http://schemas.microsoft.com/office/powerpoint/2015/09/main" Requires="p159">
+  <mc:AlternateContent xmlns:mc="http://schemas.openxmlformats.org/markup-compatibility/2006" xmlns:p159="http://schemas.microsoft.com/office/powerpoint/2015/09/main">
+    <mc:Choice Requires="p159">
       <p:transition xmlns:p14="http://schemas.microsoft.com/office/powerpoint/2010/main" spd="slow" p14:dur="2000">
         <p159:morph option="byChar"/>
       </p:transition>
     </mc:Choice>
-    <mc:Fallback>
+    <mc:Fallback xmlns="">
       <p:transition spd="slow">
         <p:fade/>
       </p:transition>
@@ -22658,10 +23303,13 @@
                             </p:stCondLst>
                             <p:childTnLst>
                               <p:par>
-                                <p:cTn id="5" presetID="10" presetClass="entr" presetSubtype="0" fill="hold" grpId="0" nodeType="clickEffect">
+                                <p:cTn id="5" presetID="41" presetClass="entr" presetSubtype="0" fill="hold" grpId="1" nodeType="clickEffect">
                                   <p:stCondLst>
                                     <p:cond delay="0"/>
                                   </p:stCondLst>
+                                  <p:iterate type="lt">
+                                    <p:tmPct val="10000"/>
+                                  </p:iterate>
                                   <p:childTnLst>
                                     <p:set>
                                       <p:cBhvr>
@@ -22681,9 +23329,116 @@
                                         <p:strVal val="visible"/>
                                       </p:to>
                                     </p:set>
+                                    <p:anim calcmode="lin" valueType="num">
+                                      <p:cBhvr>
+                                        <p:cTn id="7" dur="500" fill="hold"/>
+                                        <p:tgtEl>
+                                          <p:spTgt spid="3"/>
+                                        </p:tgtEl>
+                                        <p:attrNameLst>
+                                          <p:attrName>ppt_x</p:attrName>
+                                        </p:attrNameLst>
+                                      </p:cBhvr>
+                                      <p:tavLst>
+                                        <p:tav tm="0">
+                                          <p:val>
+                                            <p:strVal val="#ppt_x"/>
+                                          </p:val>
+                                        </p:tav>
+                                        <p:tav tm="50000">
+                                          <p:val>
+                                            <p:strVal val="#ppt_x+.1"/>
+                                          </p:val>
+                                        </p:tav>
+                                        <p:tav tm="100000">
+                                          <p:val>
+                                            <p:strVal val="#ppt_x"/>
+                                          </p:val>
+                                        </p:tav>
+                                      </p:tavLst>
+                                    </p:anim>
+                                    <p:anim calcmode="lin" valueType="num">
+                                      <p:cBhvr>
+                                        <p:cTn id="8" dur="500" fill="hold"/>
+                                        <p:tgtEl>
+                                          <p:spTgt spid="3"/>
+                                        </p:tgtEl>
+                                        <p:attrNameLst>
+                                          <p:attrName>ppt_y</p:attrName>
+                                        </p:attrNameLst>
+                                      </p:cBhvr>
+                                      <p:tavLst>
+                                        <p:tav tm="0">
+                                          <p:val>
+                                            <p:strVal val="#ppt_y"/>
+                                          </p:val>
+                                        </p:tav>
+                                        <p:tav tm="100000">
+                                          <p:val>
+                                            <p:strVal val="#ppt_y"/>
+                                          </p:val>
+                                        </p:tav>
+                                      </p:tavLst>
+                                    </p:anim>
+                                    <p:anim calcmode="lin" valueType="num">
+                                      <p:cBhvr>
+                                        <p:cTn id="9" dur="500" fill="hold"/>
+                                        <p:tgtEl>
+                                          <p:spTgt spid="3"/>
+                                        </p:tgtEl>
+                                        <p:attrNameLst>
+                                          <p:attrName>ppt_h</p:attrName>
+                                        </p:attrNameLst>
+                                      </p:cBhvr>
+                                      <p:tavLst>
+                                        <p:tav tm="0">
+                                          <p:val>
+                                            <p:strVal val="#ppt_h/10"/>
+                                          </p:val>
+                                        </p:tav>
+                                        <p:tav tm="50000">
+                                          <p:val>
+                                            <p:strVal val="#ppt_h+.01"/>
+                                          </p:val>
+                                        </p:tav>
+                                        <p:tav tm="100000">
+                                          <p:val>
+                                            <p:strVal val="#ppt_h"/>
+                                          </p:val>
+                                        </p:tav>
+                                      </p:tavLst>
+                                    </p:anim>
+                                    <p:anim calcmode="lin" valueType="num">
+                                      <p:cBhvr>
+                                        <p:cTn id="10" dur="500" fill="hold"/>
+                                        <p:tgtEl>
+                                          <p:spTgt spid="3"/>
+                                        </p:tgtEl>
+                                        <p:attrNameLst>
+                                          <p:attrName>ppt_w</p:attrName>
+                                        </p:attrNameLst>
+                                      </p:cBhvr>
+                                      <p:tavLst>
+                                        <p:tav tm="0">
+                                          <p:val>
+                                            <p:strVal val="#ppt_w/10"/>
+                                          </p:val>
+                                        </p:tav>
+                                        <p:tav tm="50000">
+                                          <p:val>
+                                            <p:strVal val="#ppt_w+.01"/>
+                                          </p:val>
+                                        </p:tav>
+                                        <p:tav tm="100000">
+                                          <p:val>
+                                            <p:strVal val="#ppt_w"/>
+                                          </p:val>
+                                        </p:tav>
+                                      </p:tavLst>
+                                    </p:anim>
                                     <p:animEffect transition="in" filter="fade">
                                       <p:cBhvr>
-                                        <p:cTn id="7" dur="500"/>
+                                        <p:cTn id="11" dur="500" tmFilter="0,0; .5, 1; 1, 1"/>
                                         <p:tgtEl>
                                           <p:spTgt spid="3"/>
                                         </p:tgtEl>
@@ -22699,26 +23454,29 @@
                     </p:cTn>
                   </p:par>
                   <p:par>
-                    <p:cTn id="8" fill="hold">
+                    <p:cTn id="12" fill="hold">
                       <p:stCondLst>
                         <p:cond delay="indefinite"/>
                       </p:stCondLst>
                       <p:childTnLst>
                         <p:par>
-                          <p:cTn id="9" fill="hold">
+                          <p:cTn id="13" fill="hold">
                             <p:stCondLst>
                               <p:cond delay="0"/>
                             </p:stCondLst>
                             <p:childTnLst>
                               <p:par>
-                                <p:cTn id="10" presetID="10" presetClass="entr" presetSubtype="0" fill="hold" grpId="0" nodeType="clickEffect">
+                                <p:cTn id="14" presetID="41" presetClass="entr" presetSubtype="0" fill="hold" grpId="1" nodeType="clickEffect">
                                   <p:stCondLst>
                                     <p:cond delay="0"/>
                                   </p:stCondLst>
+                                  <p:iterate type="lt">
+                                    <p:tmPct val="10000"/>
+                                  </p:iterate>
                                   <p:childTnLst>
                                     <p:set>
                                       <p:cBhvr>
-                                        <p:cTn id="11" dur="1" fill="hold">
+                                        <p:cTn id="15" dur="1" fill="hold">
                                           <p:stCondLst>
                                             <p:cond delay="0"/>
                                           </p:stCondLst>
@@ -22734,9 +23492,116 @@
                                         <p:strVal val="visible"/>
                                       </p:to>
                                     </p:set>
+                                    <p:anim calcmode="lin" valueType="num">
+                                      <p:cBhvr>
+                                        <p:cTn id="16" dur="500" fill="hold"/>
+                                        <p:tgtEl>
+                                          <p:spTgt spid="5"/>
+                                        </p:tgtEl>
+                                        <p:attrNameLst>
+                                          <p:attrName>ppt_x</p:attrName>
+                                        </p:attrNameLst>
+                                      </p:cBhvr>
+                                      <p:tavLst>
+                                        <p:tav tm="0">
+                                          <p:val>
+                                            <p:strVal val="#ppt_x"/>
+                                          </p:val>
+                                        </p:tav>
+                                        <p:tav tm="50000">
+                                          <p:val>
+                                            <p:strVal val="#ppt_x+.1"/>
+                                          </p:val>
+                                        </p:tav>
+                                        <p:tav tm="100000">
+                                          <p:val>
+                                            <p:strVal val="#ppt_x"/>
+                                          </p:val>
+                                        </p:tav>
+                                      </p:tavLst>
+                                    </p:anim>
+                                    <p:anim calcmode="lin" valueType="num">
+                                      <p:cBhvr>
+                                        <p:cTn id="17" dur="500" fill="hold"/>
+                                        <p:tgtEl>
+                                          <p:spTgt spid="5"/>
+                                        </p:tgtEl>
+                                        <p:attrNameLst>
+                                          <p:attrName>ppt_y</p:attrName>
+                                        </p:attrNameLst>
+                                      </p:cBhvr>
+                                      <p:tavLst>
+                                        <p:tav tm="0">
+                                          <p:val>
+                                            <p:strVal val="#ppt_y"/>
+                                          </p:val>
+                                        </p:tav>
+                                        <p:tav tm="100000">
+                                          <p:val>
+                                            <p:strVal val="#ppt_y"/>
+                                          </p:val>
+                                        </p:tav>
+                                      </p:tavLst>
+                                    </p:anim>
+                                    <p:anim calcmode="lin" valueType="num">
+                                      <p:cBhvr>
+                                        <p:cTn id="18" dur="500" fill="hold"/>
+                                        <p:tgtEl>
+                                          <p:spTgt spid="5"/>
+                                        </p:tgtEl>
+                                        <p:attrNameLst>
+                                          <p:attrName>ppt_h</p:attrName>
+                                        </p:attrNameLst>
+                                      </p:cBhvr>
+                                      <p:tavLst>
+                                        <p:tav tm="0">
+                                          <p:val>
+                                            <p:strVal val="#ppt_h/10"/>
+                                          </p:val>
+                                        </p:tav>
+                                        <p:tav tm="50000">
+                                          <p:val>
+                                            <p:strVal val="#ppt_h+.01"/>
+                                          </p:val>
+                                        </p:tav>
+                                        <p:tav tm="100000">
+                                          <p:val>
+                                            <p:strVal val="#ppt_h"/>
+                                          </p:val>
+                                        </p:tav>
+                                      </p:tavLst>
+                                    </p:anim>
+                                    <p:anim calcmode="lin" valueType="num">
+                                      <p:cBhvr>
+                                        <p:cTn id="19" dur="500" fill="hold"/>
+                                        <p:tgtEl>
+                                          <p:spTgt spid="5"/>
+                                        </p:tgtEl>
+                                        <p:attrNameLst>
+                                          <p:attrName>ppt_w</p:attrName>
+                                        </p:attrNameLst>
+                                      </p:cBhvr>
+                                      <p:tavLst>
+                                        <p:tav tm="0">
+                                          <p:val>
+                                            <p:strVal val="#ppt_w/10"/>
+                                          </p:val>
+                                        </p:tav>
+                                        <p:tav tm="50000">
+                                          <p:val>
+                                            <p:strVal val="#ppt_w+.01"/>
+                                          </p:val>
+                                        </p:tav>
+                                        <p:tav tm="100000">
+                                          <p:val>
+                                            <p:strVal val="#ppt_w"/>
+                                          </p:val>
+                                        </p:tav>
+                                      </p:tavLst>
+                                    </p:anim>
                                     <p:animEffect transition="in" filter="fade">
                                       <p:cBhvr>
-                                        <p:cTn id="12" dur="500"/>
+                                        <p:cTn id="20" dur="500" tmFilter="0,0; .5, 1; 1, 1"/>
                                         <p:tgtEl>
                                           <p:spTgt spid="5"/>
                                         </p:tgtEl>
@@ -22752,26 +23617,29 @@
                     </p:cTn>
                   </p:par>
                   <p:par>
-                    <p:cTn id="13" fill="hold">
+                    <p:cTn id="21" fill="hold">
                       <p:stCondLst>
                         <p:cond delay="indefinite"/>
                       </p:stCondLst>
                       <p:childTnLst>
                         <p:par>
-                          <p:cTn id="14" fill="hold">
+                          <p:cTn id="22" fill="hold">
                             <p:stCondLst>
                               <p:cond delay="0"/>
                             </p:stCondLst>
                             <p:childTnLst>
                               <p:par>
-                                <p:cTn id="15" presetID="10" presetClass="entr" presetSubtype="0" fill="hold" grpId="0" nodeType="clickEffect">
+                                <p:cTn id="23" presetID="41" presetClass="entr" presetSubtype="0" fill="hold" grpId="1" nodeType="clickEffect">
                                   <p:stCondLst>
                                     <p:cond delay="0"/>
                                   </p:stCondLst>
+                                  <p:iterate type="lt">
+                                    <p:tmPct val="10000"/>
+                                  </p:iterate>
                                   <p:childTnLst>
                                     <p:set>
                                       <p:cBhvr>
-                                        <p:cTn id="16" dur="1" fill="hold">
+                                        <p:cTn id="24" dur="1" fill="hold">
                                           <p:stCondLst>
                                             <p:cond delay="0"/>
                                           </p:stCondLst>
@@ -22787,9 +23655,116 @@
                                         <p:strVal val="visible"/>
                                       </p:to>
                                     </p:set>
+                                    <p:anim calcmode="lin" valueType="num">
+                                      <p:cBhvr>
+                                        <p:cTn id="25" dur="500" fill="hold"/>
+                                        <p:tgtEl>
+                                          <p:spTgt spid="7"/>
+                                        </p:tgtEl>
+                                        <p:attrNameLst>
+                                          <p:attrName>ppt_x</p:attrName>
+                                        </p:attrNameLst>
+                                      </p:cBhvr>
+                                      <p:tavLst>
+                                        <p:tav tm="0">
+                                          <p:val>
+                                            <p:strVal val="#ppt_x"/>
+                                          </p:val>
+                                        </p:tav>
+                                        <p:tav tm="50000">
+                                          <p:val>
+                                            <p:strVal val="#ppt_x+.1"/>
+                                          </p:val>
+                                        </p:tav>
+                                        <p:tav tm="100000">
+                                          <p:val>
+                                            <p:strVal val="#ppt_x"/>
+                                          </p:val>
+                                        </p:tav>
+                                      </p:tavLst>
+                                    </p:anim>
+                                    <p:anim calcmode="lin" valueType="num">
+                                      <p:cBhvr>
+                                        <p:cTn id="26" dur="500" fill="hold"/>
+                                        <p:tgtEl>
+                                          <p:spTgt spid="7"/>
+                                        </p:tgtEl>
+                                        <p:attrNameLst>
+                                          <p:attrName>ppt_y</p:attrName>
+                                        </p:attrNameLst>
+                                      </p:cBhvr>
+                                      <p:tavLst>
+                                        <p:tav tm="0">
+                                          <p:val>
+                                            <p:strVal val="#ppt_y"/>
+                                          </p:val>
+                                        </p:tav>
+                                        <p:tav tm="100000">
+                                          <p:val>
+                                            <p:strVal val="#ppt_y"/>
+                                          </p:val>
+                                        </p:tav>
+                                      </p:tavLst>
+                                    </p:anim>
+                                    <p:anim calcmode="lin" valueType="num">
+                                      <p:cBhvr>
+                                        <p:cTn id="27" dur="500" fill="hold"/>
+                                        <p:tgtEl>
+                                          <p:spTgt spid="7"/>
+                                        </p:tgtEl>
+                                        <p:attrNameLst>
+                                          <p:attrName>ppt_h</p:attrName>
+                                        </p:attrNameLst>
+                                      </p:cBhvr>
+                                      <p:tavLst>
+                                        <p:tav tm="0">
+                                          <p:val>
+                                            <p:strVal val="#ppt_h/10"/>
+                                          </p:val>
+                                        </p:tav>
+                                        <p:tav tm="50000">
+                                          <p:val>
+                                            <p:strVal val="#ppt_h+.01"/>
+                                          </p:val>
+                                        </p:tav>
+                                        <p:tav tm="100000">
+                                          <p:val>
+                                            <p:strVal val="#ppt_h"/>
+                                          </p:val>
+                                        </p:tav>
+                                      </p:tavLst>
+                                    </p:anim>
+                                    <p:anim calcmode="lin" valueType="num">
+                                      <p:cBhvr>
+                                        <p:cTn id="28" dur="500" fill="hold"/>
+                                        <p:tgtEl>
+                                          <p:spTgt spid="7"/>
+                                        </p:tgtEl>
+                                        <p:attrNameLst>
+                                          <p:attrName>ppt_w</p:attrName>
+                                        </p:attrNameLst>
+                                      </p:cBhvr>
+                                      <p:tavLst>
+                                        <p:tav tm="0">
+                                          <p:val>
+                                            <p:strVal val="#ppt_w/10"/>
+                                          </p:val>
+                                        </p:tav>
+                                        <p:tav tm="50000">
+                                          <p:val>
+                                            <p:strVal val="#ppt_w+.01"/>
+                                          </p:val>
+                                        </p:tav>
+                                        <p:tav tm="100000">
+                                          <p:val>
+                                            <p:strVal val="#ppt_w"/>
+                                          </p:val>
+                                        </p:tav>
+                                      </p:tavLst>
+                                    </p:anim>
                                     <p:animEffect transition="in" filter="fade">
                                       <p:cBhvr>
-                                        <p:cTn id="17" dur="500"/>
+                                        <p:cTn id="29" dur="500" tmFilter="0,0; .5, 1; 1, 1"/>
                                         <p:tgtEl>
                                           <p:spTgt spid="7"/>
                                         </p:tgtEl>
@@ -22805,26 +23780,29 @@
                     </p:cTn>
                   </p:par>
                   <p:par>
-                    <p:cTn id="18" fill="hold">
+                    <p:cTn id="30" fill="hold">
                       <p:stCondLst>
                         <p:cond delay="indefinite"/>
                       </p:stCondLst>
                       <p:childTnLst>
                         <p:par>
-                          <p:cTn id="19" fill="hold">
+                          <p:cTn id="31" fill="hold">
                             <p:stCondLst>
                               <p:cond delay="0"/>
                             </p:stCondLst>
                             <p:childTnLst>
                               <p:par>
-                                <p:cTn id="20" presetID="10" presetClass="entr" presetSubtype="0" fill="hold" grpId="0" nodeType="clickEffect">
+                                <p:cTn id="32" presetID="41" presetClass="entr" presetSubtype="0" fill="hold" grpId="1" nodeType="clickEffect">
                                   <p:stCondLst>
                                     <p:cond delay="0"/>
                                   </p:stCondLst>
+                                  <p:iterate type="lt">
+                                    <p:tmPct val="10000"/>
+                                  </p:iterate>
                                   <p:childTnLst>
                                     <p:set>
                                       <p:cBhvr>
-                                        <p:cTn id="21" dur="1" fill="hold">
+                                        <p:cTn id="33" dur="1" fill="hold">
                                           <p:stCondLst>
                                             <p:cond delay="0"/>
                                           </p:stCondLst>
@@ -22840,9 +23818,116 @@
                                         <p:strVal val="visible"/>
                                       </p:to>
                                     </p:set>
+                                    <p:anim calcmode="lin" valueType="num">
+                                      <p:cBhvr>
+                                        <p:cTn id="34" dur="500" fill="hold"/>
+                                        <p:tgtEl>
+                                          <p:spTgt spid="9"/>
+                                        </p:tgtEl>
+                                        <p:attrNameLst>
+                                          <p:attrName>ppt_x</p:attrName>
+                                        </p:attrNameLst>
+                                      </p:cBhvr>
+                                      <p:tavLst>
+                                        <p:tav tm="0">
+                                          <p:val>
+                                            <p:strVal val="#ppt_x"/>
+                                          </p:val>
+                                        </p:tav>
+                                        <p:tav tm="50000">
+                                          <p:val>
+                                            <p:strVal val="#ppt_x+.1"/>
+                                          </p:val>
+                                        </p:tav>
+                                        <p:tav tm="100000">
+                                          <p:val>
+                                            <p:strVal val="#ppt_x"/>
+                                          </p:val>
+                                        </p:tav>
+                                      </p:tavLst>
+                                    </p:anim>
+                                    <p:anim calcmode="lin" valueType="num">
+                                      <p:cBhvr>
+                                        <p:cTn id="35" dur="500" fill="hold"/>
+                                        <p:tgtEl>
+                                          <p:spTgt spid="9"/>
+                                        </p:tgtEl>
+                                        <p:attrNameLst>
+                                          <p:attrName>ppt_y</p:attrName>
+                                        </p:attrNameLst>
+                                      </p:cBhvr>
+                                      <p:tavLst>
+                                        <p:tav tm="0">
+                                          <p:val>
+                                            <p:strVal val="#ppt_y"/>
+                                          </p:val>
+                                        </p:tav>
+                                        <p:tav tm="100000">
+                                          <p:val>
+                                            <p:strVal val="#ppt_y"/>
+                                          </p:val>
+                                        </p:tav>
+                                      </p:tavLst>
+                                    </p:anim>
+                                    <p:anim calcmode="lin" valueType="num">
+                                      <p:cBhvr>
+                                        <p:cTn id="36" dur="500" fill="hold"/>
+                                        <p:tgtEl>
+                                          <p:spTgt spid="9"/>
+                                        </p:tgtEl>
+                                        <p:attrNameLst>
+                                          <p:attrName>ppt_h</p:attrName>
+                                        </p:attrNameLst>
+                                      </p:cBhvr>
+                                      <p:tavLst>
+                                        <p:tav tm="0">
+                                          <p:val>
+                                            <p:strVal val="#ppt_h/10"/>
+                                          </p:val>
+                                        </p:tav>
+                                        <p:tav tm="50000">
+                                          <p:val>
+                                            <p:strVal val="#ppt_h+.01"/>
+                                          </p:val>
+                                        </p:tav>
+                                        <p:tav tm="100000">
+                                          <p:val>
+                                            <p:strVal val="#ppt_h"/>
+                                          </p:val>
+                                        </p:tav>
+                                      </p:tavLst>
+                                    </p:anim>
+                                    <p:anim calcmode="lin" valueType="num">
+                                      <p:cBhvr>
+                                        <p:cTn id="37" dur="500" fill="hold"/>
+                                        <p:tgtEl>
+                                          <p:spTgt spid="9"/>
+                                        </p:tgtEl>
+                                        <p:attrNameLst>
+                                          <p:attrName>ppt_w</p:attrName>
+                                        </p:attrNameLst>
+                                      </p:cBhvr>
+                                      <p:tavLst>
+                                        <p:tav tm="0">
+                                          <p:val>
+                                            <p:strVal val="#ppt_w/10"/>
+                                          </p:val>
+                                        </p:tav>
+                                        <p:tav tm="50000">
+                                          <p:val>
+                                            <p:strVal val="#ppt_w+.01"/>
+                                          </p:val>
+                                        </p:tav>
+                                        <p:tav tm="100000">
+                                          <p:val>
+                                            <p:strVal val="#ppt_w"/>
+                                          </p:val>
+                                        </p:tav>
+                                      </p:tavLst>
+                                    </p:anim>
                                     <p:animEffect transition="in" filter="fade">
                                       <p:cBhvr>
-                                        <p:cTn id="22" dur="500"/>
+                                        <p:cTn id="38" dur="500" tmFilter="0,0; .5, 1; 1, 1"/>
                                         <p:tgtEl>
                                           <p:spTgt spid="9"/>
                                         </p:tgtEl>
@@ -22858,26 +23943,29 @@
                     </p:cTn>
                   </p:par>
                   <p:par>
-                    <p:cTn id="23" fill="hold">
+                    <p:cTn id="39" fill="hold">
                       <p:stCondLst>
                         <p:cond delay="indefinite"/>
                       </p:stCondLst>
                       <p:childTnLst>
                         <p:par>
-                          <p:cTn id="24" fill="hold">
+                          <p:cTn id="40" fill="hold">
                             <p:stCondLst>
                               <p:cond delay="0"/>
                             </p:stCondLst>
                             <p:childTnLst>
                               <p:par>
-                                <p:cTn id="25" presetID="10" presetClass="entr" presetSubtype="0" fill="hold" grpId="0" nodeType="clickEffect">
+                                <p:cTn id="41" presetID="41" presetClass="entr" presetSubtype="0" fill="hold" grpId="1" nodeType="clickEffect">
                                   <p:stCondLst>
                                     <p:cond delay="0"/>
                                   </p:stCondLst>
+                                  <p:iterate type="lt">
+                                    <p:tmPct val="10000"/>
+                                  </p:iterate>
                                   <p:childTnLst>
                                     <p:set>
                                       <p:cBhvr>
-                                        <p:cTn id="26" dur="1" fill="hold">
+                                        <p:cTn id="42" dur="1" fill="hold">
                                           <p:stCondLst>
                                             <p:cond delay="0"/>
                                           </p:stCondLst>
@@ -22893,9 +23981,116 @@
                                         <p:strVal val="visible"/>
                                       </p:to>
                                     </p:set>
+                                    <p:anim calcmode="lin" valueType="num">
+                                      <p:cBhvr>
+                                        <p:cTn id="43" dur="500" fill="hold"/>
+                                        <p:tgtEl>
+                                          <p:spTgt spid="11"/>
+                                        </p:tgtEl>
+                                        <p:attrNameLst>
+                                          <p:attrName>ppt_x</p:attrName>
+                                        </p:attrNameLst>
+                                      </p:cBhvr>
+                                      <p:tavLst>
+                                        <p:tav tm="0">
+                                          <p:val>
+                                            <p:strVal val="#ppt_x"/>
+                                          </p:val>
+                                        </p:tav>
+                                        <p:tav tm="50000">
+                                          <p:val>
+                                            <p:strVal val="#ppt_x+.1"/>
+                                          </p:val>
+                                        </p:tav>
+                                        <p:tav tm="100000">
+                                          <p:val>
+                                            <p:strVal val="#ppt_x"/>
+                                          </p:val>
+                                        </p:tav>
+                                      </p:tavLst>
+                                    </p:anim>
+                                    <p:anim calcmode="lin" valueType="num">
+                                      <p:cBhvr>
+                                        <p:cTn id="44" dur="500" fill="hold"/>
+                                        <p:tgtEl>
+                                          <p:spTgt spid="11"/>
+                                        </p:tgtEl>
+                                        <p:attrNameLst>
+                                          <p:attrName>ppt_y</p:attrName>
+                                        </p:attrNameLst>
+                                      </p:cBhvr>
+                                      <p:tavLst>
+                                        <p:tav tm="0">
+                                          <p:val>
+                                            <p:strVal val="#ppt_y"/>
+                                          </p:val>
+                                        </p:tav>
+                                        <p:tav tm="100000">
+                                          <p:val>
+                                            <p:strVal val="#ppt_y"/>
+                                          </p:val>
+                                        </p:tav>
+                                      </p:tavLst>
+                                    </p:anim>
+                                    <p:anim calcmode="lin" valueType="num">
+                                      <p:cBhvr>
+                                        <p:cTn id="45" dur="500" fill="hold"/>
+                                        <p:tgtEl>
+                                          <p:spTgt spid="11"/>
+                                        </p:tgtEl>
+                                        <p:attrNameLst>
+                                          <p:attrName>ppt_h</p:attrName>
+                                        </p:attrNameLst>
+                                      </p:cBhvr>
+                                      <p:tavLst>
+                                        <p:tav tm="0">
+                                          <p:val>
+                                            <p:strVal val="#ppt_h/10"/>
+                                          </p:val>
+                                        </p:tav>
+                                        <p:tav tm="50000">
+                                          <p:val>
+                                            <p:strVal val="#ppt_h+.01"/>
+                                          </p:val>
+                                        </p:tav>
+                                        <p:tav tm="100000">
+                                          <p:val>
+                                            <p:strVal val="#ppt_h"/>
+                                          </p:val>
+                                        </p:tav>
+                                      </p:tavLst>
+                                    </p:anim>
+                                    <p:anim calcmode="lin" valueType="num">
+                                      <p:cBhvr>
+                                        <p:cTn id="46" dur="500" fill="hold"/>
+                                        <p:tgtEl>
+                                          <p:spTgt spid="11"/>
+                                        </p:tgtEl>
+                                        <p:attrNameLst>
+                                          <p:attrName>ppt_w</p:attrName>
+                                        </p:attrNameLst>
+                                      </p:cBhvr>
+                                      <p:tavLst>
+                                        <p:tav tm="0">
+                                          <p:val>
+                                            <p:strVal val="#ppt_w/10"/>
+                                          </p:val>
+                                        </p:tav>
+                                        <p:tav tm="50000">
+                                          <p:val>
+                                            <p:strVal val="#ppt_w+.01"/>
+                                          </p:val>
+                                        </p:tav>
+                                        <p:tav tm="100000">
+                                          <p:val>
+                                            <p:strVal val="#ppt_w"/>
+                                          </p:val>
+                                        </p:tav>
+                                      </p:tavLst>
+                                    </p:anim>
                                     <p:animEffect transition="in" filter="fade">
                                       <p:cBhvr>
-                                        <p:cTn id="27" dur="500"/>
+                                        <p:cTn id="47" dur="500" tmFilter="0,0; .5, 1; 1, 1"/>
                                         <p:tgtEl>
                                           <p:spTgt spid="11"/>
                                         </p:tgtEl>
@@ -22932,17 +24127,112 @@
       </p:par>
     </p:tnLst>
     <p:bldLst>
-      <p:bldP spid="3" grpId="0"/>
-      <p:bldP spid="5" grpId="0"/>
-      <p:bldP spid="7" grpId="0"/>
-      <p:bldP spid="9" grpId="0"/>
-      <p:bldP spid="11" grpId="0"/>
+      <p:bldP spid="3" grpId="1"/>
+      <p:bldP spid="5" grpId="1"/>
+      <p:bldP spid="7" grpId="1"/>
+      <p:bldP spid="9" grpId="1"/>
+      <p:bldP spid="11" grpId="1"/>
     </p:bldLst>
   </p:timing>
 </p:sld>
 </file>
 
 <file path=ppt/slides/slide12.xml><?xml version="1.0" encoding="utf-8"?>
+<p:sld xmlns:a="http://schemas.openxmlformats.org/drawingml/2006/main" xmlns:r="http://schemas.openxmlformats.org/officeDocument/2006/relationships" xmlns:p="http://schemas.openxmlformats.org/presentationml/2006/main">
+  <p:cSld>
+    <p:spTree>
+      <p:nvGrpSpPr>
+        <p:cNvPr id="1" name=""/>
+        <p:cNvGrpSpPr/>
+        <p:nvPr/>
+      </p:nvGrpSpPr>
+      <p:grpSpPr>
+        <a:xfrm>
+          <a:off x="0" y="0"/>
+          <a:ext cx="0" cy="0"/>
+          <a:chOff x="0" y="0"/>
+          <a:chExt cx="0" cy="0"/>
+        </a:xfrm>
+      </p:grpSpPr>
+      <p:sp>
+        <p:nvSpPr>
+          <p:cNvPr id="2" name="Slide Number Placeholder 1">
+            <a:extLst>
+              <a:ext uri="{FF2B5EF4-FFF2-40B4-BE49-F238E27FC236}">
+                <a16:creationId xmlns:a16="http://schemas.microsoft.com/office/drawing/2014/main" id="{F8A98626-1416-45BF-9D85-1D992DD3FC37}"/>
+              </a:ext>
+            </a:extLst>
+          </p:cNvPr>
+          <p:cNvSpPr>
+            <a:spLocks noGrp="1"/>
+          </p:cNvSpPr>
+          <p:nvPr>
+            <p:ph type="sldNum" sz="quarter" idx="4"/>
+          </p:nvPr>
+        </p:nvSpPr>
+        <p:spPr/>
+        <p:txBody>
+          <a:bodyPr/>
+          <a:lstStyle/>
+          <a:p>
+            <a:fld id="{3A707DD9-E92B-45E8-BE0A-E6B2EDF345EB}" type="slidenum">
+              <a:rPr lang="en-US" smtClean="0"/>
+              <a:pPr/>
+              <a:t>12</a:t>
+            </a:fld>
+            <a:endParaRPr lang="en-US" dirty="0"/>
+          </a:p>
+        </p:txBody>
+      </p:sp>
+      <p:sp>
+        <p:nvSpPr>
+          <p:cNvPr id="3" name="TextBox 2">
+            <a:extLst>
+              <a:ext uri="{FF2B5EF4-FFF2-40B4-BE49-F238E27FC236}">
+                <a16:creationId xmlns:a16="http://schemas.microsoft.com/office/drawing/2014/main" id="{B4A5174A-8A02-408B-94BA-E3EA0EE857D0}"/>
+              </a:ext>
+            </a:extLst>
+          </p:cNvPr>
+          <p:cNvSpPr txBox="1"/>
+          <p:nvPr/>
+        </p:nvSpPr>
+        <p:spPr>
+          <a:xfrm>
+            <a:off x="3400045" y="2279363"/>
+            <a:ext cx="2343911" cy="584775"/>
+          </a:xfrm>
+          <a:prstGeom prst="rect">
+            <a:avLst/>
+          </a:prstGeom>
+          <a:noFill/>
+        </p:spPr>
+        <p:txBody>
+          <a:bodyPr wrap="none" rtlCol="0">
+            <a:spAutoFit/>
+          </a:bodyPr>
+          <a:lstStyle/>
+          <a:p>
+            <a:r>
+              <a:rPr lang="en-US" sz="3200" dirty="0"/>
+              <a:t>DEMO TIME!</a:t>
+            </a:r>
+          </a:p>
+        </p:txBody>
+      </p:sp>
+    </p:spTree>
+    <p:extLst>
+      <p:ext uri="{BB962C8B-B14F-4D97-AF65-F5344CB8AC3E}">
+        <p14:creationId xmlns:p14="http://schemas.microsoft.com/office/powerpoint/2010/main" val="615045479"/>
+      </p:ext>
+    </p:extLst>
+  </p:cSld>
+  <p:clrMapOvr>
+    <a:masterClrMapping/>
+  </p:clrMapOvr>
+</p:sld>
+</file>
+
+<file path=ppt/slides/slide13.xml><?xml version="1.0" encoding="utf-8"?>
 <p:sld xmlns:a="http://schemas.openxmlformats.org/drawingml/2006/main" xmlns:r="http://schemas.openxmlformats.org/officeDocument/2006/relationships" xmlns:p="http://schemas.openxmlformats.org/presentationml/2006/main">
   <p:cSld>
     <p:spTree>
@@ -23019,7 +24309,7 @@
             <a:fld id="{3A707DD9-E92B-45E8-BE0A-E6B2EDF345EB}" type="slidenum">
               <a:rPr lang="en-US" smtClean="0"/>
               <a:pPr/>
-              <a:t>12</a:t>
+              <a:t>13</a:t>
             </a:fld>
             <a:endParaRPr lang="en-US" dirty="0"/>
           </a:p>
@@ -23029,6 +24319,2167 @@
     <p:extLst>
       <p:ext uri="{BB962C8B-B14F-4D97-AF65-F5344CB8AC3E}">
         <p14:creationId xmlns:p14="http://schemas.microsoft.com/office/powerpoint/2010/main" val="592054991"/>
+      </p:ext>
+    </p:extLst>
+  </p:cSld>
+  <p:clrMapOvr>
+    <a:masterClrMapping/>
+  </p:clrMapOvr>
+</p:sld>
+</file>
+
+<file path=ppt/slides/slide14.xml><?xml version="1.0" encoding="utf-8"?>
+<p:sld xmlns:a="http://schemas.openxmlformats.org/drawingml/2006/main" xmlns:r="http://schemas.openxmlformats.org/officeDocument/2006/relationships" xmlns:p="http://schemas.openxmlformats.org/presentationml/2006/main">
+  <p:cSld>
+    <p:spTree>
+      <p:nvGrpSpPr>
+        <p:cNvPr id="1" name=""/>
+        <p:cNvGrpSpPr/>
+        <p:nvPr/>
+      </p:nvGrpSpPr>
+      <p:grpSpPr>
+        <a:xfrm>
+          <a:off x="0" y="0"/>
+          <a:ext cx="0" cy="0"/>
+          <a:chOff x="0" y="0"/>
+          <a:chExt cx="0" cy="0"/>
+        </a:xfrm>
+      </p:grpSpPr>
+      <p:sp>
+        <p:nvSpPr>
+          <p:cNvPr id="2" name="Trapezoid 1">
+            <a:extLst>
+              <a:ext uri="{FF2B5EF4-FFF2-40B4-BE49-F238E27FC236}">
+                <a16:creationId xmlns:a16="http://schemas.microsoft.com/office/drawing/2014/main" id="{855B7E05-B80F-4B49-A502-56AFCCF78EB8}"/>
+              </a:ext>
+            </a:extLst>
+          </p:cNvPr>
+          <p:cNvSpPr/>
+          <p:nvPr/>
+        </p:nvSpPr>
+        <p:spPr>
+          <a:xfrm>
+            <a:off x="2105024" y="3152775"/>
+            <a:ext cx="5000625" cy="762000"/>
+          </a:xfrm>
+          <a:prstGeom prst="trapezoid">
+            <a:avLst>
+              <a:gd name="adj" fmla="val 81250"/>
+            </a:avLst>
+          </a:prstGeom>
+        </p:spPr>
+        <p:style>
+          <a:lnRef idx="2">
+            <a:schemeClr val="accent4">
+              <a:shade val="50000"/>
+            </a:schemeClr>
+          </a:lnRef>
+          <a:fillRef idx="1">
+            <a:schemeClr val="accent4"/>
+          </a:fillRef>
+          <a:effectRef idx="0">
+            <a:schemeClr val="accent4"/>
+          </a:effectRef>
+          <a:fontRef idx="minor">
+            <a:schemeClr val="lt1"/>
+          </a:fontRef>
+        </p:style>
+        <p:txBody>
+          <a:bodyPr rtlCol="0" anchor="ctr"/>
+          <a:lstStyle/>
+          <a:p>
+            <a:pPr algn="ctr"/>
+            <a:r>
+              <a:rPr lang="en-US" sz="2400" b="1" dirty="0"/>
+              <a:t>Unit</a:t>
+            </a:r>
+          </a:p>
+        </p:txBody>
+      </p:sp>
+      <p:sp>
+        <p:nvSpPr>
+          <p:cNvPr id="4" name="Trapezoid 3">
+            <a:extLst>
+              <a:ext uri="{FF2B5EF4-FFF2-40B4-BE49-F238E27FC236}">
+                <a16:creationId xmlns:a16="http://schemas.microsoft.com/office/drawing/2014/main" id="{3C829C68-9EBD-4979-AE56-481E6F82DB0B}"/>
+              </a:ext>
+            </a:extLst>
+          </p:cNvPr>
+          <p:cNvSpPr/>
+          <p:nvPr/>
+        </p:nvSpPr>
+        <p:spPr>
+          <a:xfrm>
+            <a:off x="2752723" y="2286000"/>
+            <a:ext cx="3686176" cy="762000"/>
+          </a:xfrm>
+          <a:prstGeom prst="trapezoid">
+            <a:avLst>
+              <a:gd name="adj" fmla="val 87500"/>
+            </a:avLst>
+          </a:prstGeom>
+        </p:spPr>
+        <p:style>
+          <a:lnRef idx="2">
+            <a:schemeClr val="accent3">
+              <a:shade val="50000"/>
+            </a:schemeClr>
+          </a:lnRef>
+          <a:fillRef idx="1">
+            <a:schemeClr val="accent3"/>
+          </a:fillRef>
+          <a:effectRef idx="0">
+            <a:schemeClr val="accent3"/>
+          </a:effectRef>
+          <a:fontRef idx="minor">
+            <a:schemeClr val="lt1"/>
+          </a:fontRef>
+        </p:style>
+        <p:txBody>
+          <a:bodyPr rtlCol="0" anchor="ctr"/>
+          <a:lstStyle/>
+          <a:p>
+            <a:pPr algn="ctr"/>
+            <a:r>
+              <a:rPr lang="en-US" sz="2400" b="1" dirty="0"/>
+              <a:t>Integration</a:t>
+            </a:r>
+          </a:p>
+        </p:txBody>
+      </p:sp>
+      <p:sp>
+        <p:nvSpPr>
+          <p:cNvPr id="7" name="Isosceles Triangle 6">
+            <a:extLst>
+              <a:ext uri="{FF2B5EF4-FFF2-40B4-BE49-F238E27FC236}">
+                <a16:creationId xmlns:a16="http://schemas.microsoft.com/office/drawing/2014/main" id="{CC5AFF67-2C18-40F5-94AB-4F3334F23D81}"/>
+              </a:ext>
+            </a:extLst>
+          </p:cNvPr>
+          <p:cNvSpPr/>
+          <p:nvPr/>
+        </p:nvSpPr>
+        <p:spPr>
+          <a:xfrm>
+            <a:off x="3486150" y="1057275"/>
+            <a:ext cx="2219324" cy="1123950"/>
+          </a:xfrm>
+          <a:prstGeom prst="triangle">
+            <a:avLst>
+              <a:gd name="adj" fmla="val 48246"/>
+            </a:avLst>
+          </a:prstGeom>
+        </p:spPr>
+        <p:style>
+          <a:lnRef idx="2">
+            <a:schemeClr val="accent6">
+              <a:shade val="50000"/>
+            </a:schemeClr>
+          </a:lnRef>
+          <a:fillRef idx="1">
+            <a:schemeClr val="accent6"/>
+          </a:fillRef>
+          <a:effectRef idx="0">
+            <a:schemeClr val="accent6"/>
+          </a:effectRef>
+          <a:fontRef idx="minor">
+            <a:schemeClr val="lt1"/>
+          </a:fontRef>
+        </p:style>
+        <p:txBody>
+          <a:bodyPr rtlCol="0" anchor="ctr"/>
+          <a:lstStyle/>
+          <a:p>
+            <a:pPr algn="ctr"/>
+            <a:r>
+              <a:rPr lang="en-US" sz="2400" b="1" dirty="0"/>
+              <a:t>E2E</a:t>
+            </a:r>
+          </a:p>
+        </p:txBody>
+      </p:sp>
+    </p:spTree>
+    <p:extLst>
+      <p:ext uri="{BB962C8B-B14F-4D97-AF65-F5344CB8AC3E}">
+        <p14:creationId xmlns:p14="http://schemas.microsoft.com/office/powerpoint/2010/main" val="3183372076"/>
+      </p:ext>
+    </p:extLst>
+  </p:cSld>
+  <p:clrMapOvr>
+    <a:masterClrMapping/>
+  </p:clrMapOvr>
+</p:sld>
+</file>
+
+<file path=ppt/slides/slide15.xml><?xml version="1.0" encoding="utf-8"?>
+<p:sld xmlns:a="http://schemas.openxmlformats.org/drawingml/2006/main" xmlns:r="http://schemas.openxmlformats.org/officeDocument/2006/relationships" xmlns:p="http://schemas.openxmlformats.org/presentationml/2006/main">
+  <p:cSld>
+    <p:spTree>
+      <p:nvGrpSpPr>
+        <p:cNvPr id="1" name=""/>
+        <p:cNvGrpSpPr/>
+        <p:nvPr/>
+      </p:nvGrpSpPr>
+      <p:grpSpPr>
+        <a:xfrm>
+          <a:off x="0" y="0"/>
+          <a:ext cx="0" cy="0"/>
+          <a:chOff x="0" y="0"/>
+          <a:chExt cx="0" cy="0"/>
+        </a:xfrm>
+      </p:grpSpPr>
+      <p:sp>
+        <p:nvSpPr>
+          <p:cNvPr id="3" name="Title 2">
+            <a:extLst>
+              <a:ext uri="{FF2B5EF4-FFF2-40B4-BE49-F238E27FC236}">
+                <a16:creationId xmlns:a16="http://schemas.microsoft.com/office/drawing/2014/main" id="{ADB04B0B-004D-4B94-8A06-4CFB0B4C2EF3}"/>
+              </a:ext>
+            </a:extLst>
+          </p:cNvPr>
+          <p:cNvSpPr>
+            <a:spLocks noGrp="1"/>
+          </p:cNvSpPr>
+          <p:nvPr>
+            <p:ph type="title"/>
+          </p:nvPr>
+        </p:nvSpPr>
+        <p:spPr>
+          <a:xfrm>
+            <a:off x="358775" y="219075"/>
+            <a:ext cx="8426449" cy="301752"/>
+          </a:xfrm>
+        </p:spPr>
+        <p:txBody>
+          <a:bodyPr/>
+          <a:lstStyle/>
+          <a:p>
+            <a:r>
+              <a:rPr lang="en-US" dirty="0"/>
+              <a:t>INTEGRATION TESTS</a:t>
+            </a:r>
+          </a:p>
+        </p:txBody>
+      </p:sp>
+      <p:sp>
+        <p:nvSpPr>
+          <p:cNvPr id="5" name="Rectangle: Rounded Corners 4">
+            <a:extLst>
+              <a:ext uri="{FF2B5EF4-FFF2-40B4-BE49-F238E27FC236}">
+                <a16:creationId xmlns:a16="http://schemas.microsoft.com/office/drawing/2014/main" id="{CBECB622-85F3-4346-B492-B0937EC9B9D4}"/>
+              </a:ext>
+            </a:extLst>
+          </p:cNvPr>
+          <p:cNvSpPr/>
+          <p:nvPr/>
+        </p:nvSpPr>
+        <p:spPr>
+          <a:xfrm>
+            <a:off x="2733936" y="2263890"/>
+            <a:ext cx="1003721" cy="615719"/>
+          </a:xfrm>
+          <a:prstGeom prst="roundRect">
+            <a:avLst/>
+          </a:prstGeom>
+        </p:spPr>
+        <p:style>
+          <a:lnRef idx="2">
+            <a:schemeClr val="accent3">
+              <a:shade val="50000"/>
+            </a:schemeClr>
+          </a:lnRef>
+          <a:fillRef idx="1">
+            <a:schemeClr val="accent3"/>
+          </a:fillRef>
+          <a:effectRef idx="0">
+            <a:schemeClr val="accent3"/>
+          </a:effectRef>
+          <a:fontRef idx="minor">
+            <a:schemeClr val="lt1"/>
+          </a:fontRef>
+        </p:style>
+        <p:txBody>
+          <a:bodyPr rtlCol="0" anchor="ctr"/>
+          <a:lstStyle/>
+          <a:p>
+            <a:pPr algn="ctr"/>
+            <a:r>
+              <a:rPr lang="en-US" dirty="0"/>
+              <a:t>Cart</a:t>
+            </a:r>
+          </a:p>
+        </p:txBody>
+      </p:sp>
+      <p:sp>
+        <p:nvSpPr>
+          <p:cNvPr id="9" name="Rectangle: Rounded Corners 8">
+            <a:extLst>
+              <a:ext uri="{FF2B5EF4-FFF2-40B4-BE49-F238E27FC236}">
+                <a16:creationId xmlns:a16="http://schemas.microsoft.com/office/drawing/2014/main" id="{E96E4BAB-7861-4323-94E7-CB95E4C1DB73}"/>
+              </a:ext>
+            </a:extLst>
+          </p:cNvPr>
+          <p:cNvSpPr/>
+          <p:nvPr/>
+        </p:nvSpPr>
+        <p:spPr>
+          <a:xfrm>
+            <a:off x="5452418" y="2269997"/>
+            <a:ext cx="1133214" cy="615719"/>
+          </a:xfrm>
+          <a:prstGeom prst="roundRect">
+            <a:avLst/>
+          </a:prstGeom>
+        </p:spPr>
+        <p:style>
+          <a:lnRef idx="2">
+            <a:schemeClr val="accent2">
+              <a:shade val="50000"/>
+            </a:schemeClr>
+          </a:lnRef>
+          <a:fillRef idx="1">
+            <a:schemeClr val="accent2"/>
+          </a:fillRef>
+          <a:effectRef idx="0">
+            <a:schemeClr val="accent2"/>
+          </a:effectRef>
+          <a:fontRef idx="minor">
+            <a:schemeClr val="lt1"/>
+          </a:fontRef>
+        </p:style>
+        <p:txBody>
+          <a:bodyPr rtlCol="0" anchor="ctr"/>
+          <a:lstStyle/>
+          <a:p>
+            <a:pPr algn="ctr"/>
+            <a:r>
+              <a:rPr lang="en-US" dirty="0"/>
+              <a:t>Warehouse</a:t>
+            </a:r>
+          </a:p>
+          <a:p>
+            <a:pPr algn="ctr"/>
+            <a:r>
+              <a:rPr lang="en-US" dirty="0"/>
+              <a:t>Service</a:t>
+            </a:r>
+          </a:p>
+        </p:txBody>
+      </p:sp>
+      <p:cxnSp>
+        <p:nvCxnSpPr>
+          <p:cNvPr id="10" name="Straight Connector 9">
+            <a:extLst>
+              <a:ext uri="{FF2B5EF4-FFF2-40B4-BE49-F238E27FC236}">
+                <a16:creationId xmlns:a16="http://schemas.microsoft.com/office/drawing/2014/main" id="{9E75CE0D-8E35-498B-B657-04BFADD06FCD}"/>
+              </a:ext>
+            </a:extLst>
+          </p:cNvPr>
+          <p:cNvCxnSpPr>
+            <a:cxnSpLocks/>
+            <a:stCxn id="5" idx="3"/>
+            <a:endCxn id="9" idx="1"/>
+          </p:cNvCxnSpPr>
+          <p:nvPr/>
+        </p:nvCxnSpPr>
+        <p:spPr>
+          <a:xfrm>
+            <a:off x="3737657" y="2571750"/>
+            <a:ext cx="1714761" cy="6107"/>
+          </a:xfrm>
+          <a:prstGeom prst="line">
+            <a:avLst/>
+          </a:prstGeom>
+          <a:ln w="28575">
+            <a:prstDash val="dash"/>
+          </a:ln>
+        </p:spPr>
+        <p:style>
+          <a:lnRef idx="1">
+            <a:schemeClr val="accent2"/>
+          </a:lnRef>
+          <a:fillRef idx="0">
+            <a:schemeClr val="accent2"/>
+          </a:fillRef>
+          <a:effectRef idx="0">
+            <a:schemeClr val="accent2"/>
+          </a:effectRef>
+          <a:fontRef idx="minor">
+            <a:schemeClr val="tx1"/>
+          </a:fontRef>
+        </p:style>
+      </p:cxnSp>
+    </p:spTree>
+    <p:extLst>
+      <p:ext uri="{BB962C8B-B14F-4D97-AF65-F5344CB8AC3E}">
+        <p14:creationId xmlns:p14="http://schemas.microsoft.com/office/powerpoint/2010/main" val="1260109242"/>
+      </p:ext>
+    </p:extLst>
+  </p:cSld>
+  <p:clrMapOvr>
+    <a:masterClrMapping/>
+  </p:clrMapOvr>
+</p:sld>
+</file>
+
+<file path=ppt/slides/slide16.xml><?xml version="1.0" encoding="utf-8"?>
+<p:sld xmlns:a="http://schemas.openxmlformats.org/drawingml/2006/main" xmlns:r="http://schemas.openxmlformats.org/officeDocument/2006/relationships" xmlns:p="http://schemas.openxmlformats.org/presentationml/2006/main">
+  <p:cSld>
+    <p:spTree>
+      <p:nvGrpSpPr>
+        <p:cNvPr id="1" name=""/>
+        <p:cNvGrpSpPr/>
+        <p:nvPr/>
+      </p:nvGrpSpPr>
+      <p:grpSpPr>
+        <a:xfrm>
+          <a:off x="0" y="0"/>
+          <a:ext cx="0" cy="0"/>
+          <a:chOff x="0" y="0"/>
+          <a:chExt cx="0" cy="0"/>
+        </a:xfrm>
+      </p:grpSpPr>
+      <p:sp>
+        <p:nvSpPr>
+          <p:cNvPr id="25" name="Rectangle: Rounded Corners 24">
+            <a:extLst>
+              <a:ext uri="{FF2B5EF4-FFF2-40B4-BE49-F238E27FC236}">
+                <a16:creationId xmlns:a16="http://schemas.microsoft.com/office/drawing/2014/main" id="{DF04F428-A1F4-4235-92A1-FAC3D72F46AA}"/>
+              </a:ext>
+            </a:extLst>
+          </p:cNvPr>
+          <p:cNvSpPr/>
+          <p:nvPr/>
+        </p:nvSpPr>
+        <p:spPr>
+          <a:xfrm>
+            <a:off x="2823228" y="817690"/>
+            <a:ext cx="3268470" cy="1951643"/>
+          </a:xfrm>
+          <a:prstGeom prst="roundRect">
+            <a:avLst/>
+          </a:prstGeom>
+        </p:spPr>
+        <p:style>
+          <a:lnRef idx="2">
+            <a:schemeClr val="accent5"/>
+          </a:lnRef>
+          <a:fillRef idx="1">
+            <a:schemeClr val="lt1"/>
+          </a:fillRef>
+          <a:effectRef idx="0">
+            <a:schemeClr val="accent5"/>
+          </a:effectRef>
+          <a:fontRef idx="minor">
+            <a:schemeClr val="dk1"/>
+          </a:fontRef>
+        </p:style>
+        <p:txBody>
+          <a:bodyPr rtlCol="0" anchor="ctr"/>
+          <a:lstStyle/>
+          <a:p>
+            <a:pPr algn="ctr"/>
+            <a:endParaRPr lang="en-US" dirty="0"/>
+          </a:p>
+        </p:txBody>
+      </p:sp>
+      <p:sp>
+        <p:nvSpPr>
+          <p:cNvPr id="3" name="Title 2">
+            <a:extLst>
+              <a:ext uri="{FF2B5EF4-FFF2-40B4-BE49-F238E27FC236}">
+                <a16:creationId xmlns:a16="http://schemas.microsoft.com/office/drawing/2014/main" id="{ADB04B0B-004D-4B94-8A06-4CFB0B4C2EF3}"/>
+              </a:ext>
+            </a:extLst>
+          </p:cNvPr>
+          <p:cNvSpPr>
+            <a:spLocks noGrp="1"/>
+          </p:cNvSpPr>
+          <p:nvPr>
+            <p:ph type="title"/>
+          </p:nvPr>
+        </p:nvSpPr>
+        <p:spPr>
+          <a:xfrm>
+            <a:off x="358775" y="219075"/>
+            <a:ext cx="8426449" cy="301752"/>
+          </a:xfrm>
+        </p:spPr>
+        <p:txBody>
+          <a:bodyPr/>
+          <a:lstStyle/>
+          <a:p>
+            <a:r>
+              <a:rPr lang="en-US" dirty="0"/>
+              <a:t>INTEGRATION TESTS</a:t>
+            </a:r>
+          </a:p>
+        </p:txBody>
+      </p:sp>
+      <p:sp>
+        <p:nvSpPr>
+          <p:cNvPr id="9" name="Rectangle: Rounded Corners 8">
+            <a:extLst>
+              <a:ext uri="{FF2B5EF4-FFF2-40B4-BE49-F238E27FC236}">
+                <a16:creationId xmlns:a16="http://schemas.microsoft.com/office/drawing/2014/main" id="{E96E4BAB-7861-4323-94E7-CB95E4C1DB73}"/>
+              </a:ext>
+            </a:extLst>
+          </p:cNvPr>
+          <p:cNvSpPr/>
+          <p:nvPr/>
+        </p:nvSpPr>
+        <p:spPr>
+          <a:xfrm>
+            <a:off x="2831548" y="3034478"/>
+            <a:ext cx="3268470" cy="615719"/>
+          </a:xfrm>
+          <a:prstGeom prst="roundRect">
+            <a:avLst/>
+          </a:prstGeom>
+        </p:spPr>
+        <p:style>
+          <a:lnRef idx="2">
+            <a:schemeClr val="accent4">
+              <a:shade val="50000"/>
+            </a:schemeClr>
+          </a:lnRef>
+          <a:fillRef idx="1">
+            <a:schemeClr val="accent4"/>
+          </a:fillRef>
+          <a:effectRef idx="0">
+            <a:schemeClr val="accent4"/>
+          </a:effectRef>
+          <a:fontRef idx="minor">
+            <a:schemeClr val="lt1"/>
+          </a:fontRef>
+        </p:style>
+        <p:txBody>
+          <a:bodyPr rtlCol="0" anchor="ctr"/>
+          <a:lstStyle/>
+          <a:p>
+            <a:pPr algn="ctr"/>
+            <a:r>
+              <a:rPr lang="en-US" dirty="0"/>
+              <a:t>Persistency</a:t>
+            </a:r>
+          </a:p>
+        </p:txBody>
+      </p:sp>
+      <p:sp>
+        <p:nvSpPr>
+          <p:cNvPr id="11" name="Rectangle: Rounded Corners 10">
+            <a:extLst>
+              <a:ext uri="{FF2B5EF4-FFF2-40B4-BE49-F238E27FC236}">
+                <a16:creationId xmlns:a16="http://schemas.microsoft.com/office/drawing/2014/main" id="{7C31B104-113C-41E4-8A4A-8DB1A0BA829A}"/>
+              </a:ext>
+            </a:extLst>
+          </p:cNvPr>
+          <p:cNvSpPr/>
+          <p:nvPr/>
+        </p:nvSpPr>
+        <p:spPr>
+          <a:xfrm>
+            <a:off x="3103108" y="922499"/>
+            <a:ext cx="808698" cy="433284"/>
+          </a:xfrm>
+          <a:prstGeom prst="roundRect">
+            <a:avLst/>
+          </a:prstGeom>
+        </p:spPr>
+        <p:style>
+          <a:lnRef idx="2">
+            <a:schemeClr val="accent3">
+              <a:shade val="50000"/>
+            </a:schemeClr>
+          </a:lnRef>
+          <a:fillRef idx="1">
+            <a:schemeClr val="accent3"/>
+          </a:fillRef>
+          <a:effectRef idx="0">
+            <a:schemeClr val="accent3"/>
+          </a:effectRef>
+          <a:fontRef idx="minor">
+            <a:schemeClr val="lt1"/>
+          </a:fontRef>
+        </p:style>
+        <p:txBody>
+          <a:bodyPr rtlCol="0" anchor="ctr"/>
+          <a:lstStyle/>
+          <a:p>
+            <a:pPr algn="ctr"/>
+            <a:r>
+              <a:rPr lang="en-US" dirty="0"/>
+              <a:t>User</a:t>
+            </a:r>
+          </a:p>
+        </p:txBody>
+      </p:sp>
+      <p:sp>
+        <p:nvSpPr>
+          <p:cNvPr id="12" name="Rectangle: Rounded Corners 11">
+            <a:extLst>
+              <a:ext uri="{FF2B5EF4-FFF2-40B4-BE49-F238E27FC236}">
+                <a16:creationId xmlns:a16="http://schemas.microsoft.com/office/drawing/2014/main" id="{7968C700-AA8E-405C-9073-3F2B2B193FEA}"/>
+              </a:ext>
+            </a:extLst>
+          </p:cNvPr>
+          <p:cNvSpPr/>
+          <p:nvPr/>
+        </p:nvSpPr>
+        <p:spPr>
+          <a:xfrm>
+            <a:off x="5003119" y="1316170"/>
+            <a:ext cx="808698" cy="433284"/>
+          </a:xfrm>
+          <a:prstGeom prst="roundRect">
+            <a:avLst/>
+          </a:prstGeom>
+        </p:spPr>
+        <p:style>
+          <a:lnRef idx="2">
+            <a:schemeClr val="accent3">
+              <a:shade val="50000"/>
+            </a:schemeClr>
+          </a:lnRef>
+          <a:fillRef idx="1">
+            <a:schemeClr val="accent3"/>
+          </a:fillRef>
+          <a:effectRef idx="0">
+            <a:schemeClr val="accent3"/>
+          </a:effectRef>
+          <a:fontRef idx="minor">
+            <a:schemeClr val="lt1"/>
+          </a:fontRef>
+        </p:style>
+        <p:txBody>
+          <a:bodyPr rtlCol="0" anchor="ctr"/>
+          <a:lstStyle/>
+          <a:p>
+            <a:pPr algn="ctr"/>
+            <a:r>
+              <a:rPr lang="en-US" dirty="0"/>
+              <a:t>Cart</a:t>
+            </a:r>
+          </a:p>
+        </p:txBody>
+      </p:sp>
+      <p:sp>
+        <p:nvSpPr>
+          <p:cNvPr id="13" name="Rectangle: Rounded Corners 12">
+            <a:extLst>
+              <a:ext uri="{FF2B5EF4-FFF2-40B4-BE49-F238E27FC236}">
+                <a16:creationId xmlns:a16="http://schemas.microsoft.com/office/drawing/2014/main" id="{C67256B9-991D-48F0-BDC9-F009DA86DA9A}"/>
+              </a:ext>
+            </a:extLst>
+          </p:cNvPr>
+          <p:cNvSpPr/>
+          <p:nvPr/>
+        </p:nvSpPr>
+        <p:spPr>
+          <a:xfrm>
+            <a:off x="3523008" y="2231240"/>
+            <a:ext cx="808698" cy="433284"/>
+          </a:xfrm>
+          <a:prstGeom prst="roundRect">
+            <a:avLst/>
+          </a:prstGeom>
+        </p:spPr>
+        <p:style>
+          <a:lnRef idx="2">
+            <a:schemeClr val="accent3">
+              <a:shade val="50000"/>
+            </a:schemeClr>
+          </a:lnRef>
+          <a:fillRef idx="1">
+            <a:schemeClr val="accent3"/>
+          </a:fillRef>
+          <a:effectRef idx="0">
+            <a:schemeClr val="accent3"/>
+          </a:effectRef>
+          <a:fontRef idx="minor">
+            <a:schemeClr val="lt1"/>
+          </a:fontRef>
+        </p:style>
+        <p:txBody>
+          <a:bodyPr rtlCol="0" anchor="ctr"/>
+          <a:lstStyle/>
+          <a:p>
+            <a:pPr algn="ctr"/>
+            <a:r>
+              <a:rPr lang="en-US" dirty="0" err="1"/>
+              <a:t>ListItem</a:t>
+            </a:r>
+            <a:endParaRPr lang="en-US" dirty="0"/>
+          </a:p>
+        </p:txBody>
+      </p:sp>
+      <p:cxnSp>
+        <p:nvCxnSpPr>
+          <p:cNvPr id="14" name="Straight Connector 13">
+            <a:extLst>
+              <a:ext uri="{FF2B5EF4-FFF2-40B4-BE49-F238E27FC236}">
+                <a16:creationId xmlns:a16="http://schemas.microsoft.com/office/drawing/2014/main" id="{106E79A2-9D24-4ACD-9BE3-B0F6B44A5D31}"/>
+              </a:ext>
+            </a:extLst>
+          </p:cNvPr>
+          <p:cNvCxnSpPr>
+            <a:cxnSpLocks/>
+            <a:stCxn id="11" idx="3"/>
+            <a:endCxn id="12" idx="1"/>
+          </p:cNvCxnSpPr>
+          <p:nvPr/>
+        </p:nvCxnSpPr>
+        <p:spPr>
+          <a:xfrm>
+            <a:off x="3911806" y="1139142"/>
+            <a:ext cx="1091313" cy="393671"/>
+          </a:xfrm>
+          <a:prstGeom prst="line">
+            <a:avLst/>
+          </a:prstGeom>
+          <a:ln w="28575">
+            <a:prstDash val="dash"/>
+          </a:ln>
+        </p:spPr>
+        <p:style>
+          <a:lnRef idx="1">
+            <a:schemeClr val="accent2"/>
+          </a:lnRef>
+          <a:fillRef idx="0">
+            <a:schemeClr val="accent2"/>
+          </a:fillRef>
+          <a:effectRef idx="0">
+            <a:schemeClr val="accent2"/>
+          </a:effectRef>
+          <a:fontRef idx="minor">
+            <a:schemeClr val="tx1"/>
+          </a:fontRef>
+        </p:style>
+      </p:cxnSp>
+      <p:cxnSp>
+        <p:nvCxnSpPr>
+          <p:cNvPr id="15" name="Straight Connector 14">
+            <a:extLst>
+              <a:ext uri="{FF2B5EF4-FFF2-40B4-BE49-F238E27FC236}">
+                <a16:creationId xmlns:a16="http://schemas.microsoft.com/office/drawing/2014/main" id="{CEE816F6-8948-49C7-A9CB-F869D6F1FC64}"/>
+              </a:ext>
+            </a:extLst>
+          </p:cNvPr>
+          <p:cNvCxnSpPr>
+            <a:cxnSpLocks/>
+            <a:stCxn id="13" idx="3"/>
+            <a:endCxn id="12" idx="2"/>
+          </p:cNvCxnSpPr>
+          <p:nvPr/>
+        </p:nvCxnSpPr>
+        <p:spPr>
+          <a:xfrm flipV="1">
+            <a:off x="4331706" y="1749454"/>
+            <a:ext cx="1075761" cy="698428"/>
+          </a:xfrm>
+          <a:prstGeom prst="line">
+            <a:avLst/>
+          </a:prstGeom>
+          <a:ln w="28575">
+            <a:prstDash val="dash"/>
+          </a:ln>
+        </p:spPr>
+        <p:style>
+          <a:lnRef idx="1">
+            <a:schemeClr val="accent2"/>
+          </a:lnRef>
+          <a:fillRef idx="0">
+            <a:schemeClr val="accent2"/>
+          </a:fillRef>
+          <a:effectRef idx="0">
+            <a:schemeClr val="accent2"/>
+          </a:effectRef>
+          <a:fontRef idx="minor">
+            <a:schemeClr val="tx1"/>
+          </a:fontRef>
+        </p:style>
+      </p:cxnSp>
+      <p:sp>
+        <p:nvSpPr>
+          <p:cNvPr id="17" name="Flowchart: Magnetic Disk 16">
+            <a:extLst>
+              <a:ext uri="{FF2B5EF4-FFF2-40B4-BE49-F238E27FC236}">
+                <a16:creationId xmlns:a16="http://schemas.microsoft.com/office/drawing/2014/main" id="{550D8398-D256-4E3E-9AE5-A5B912D759A2}"/>
+              </a:ext>
+            </a:extLst>
+          </p:cNvPr>
+          <p:cNvSpPr/>
+          <p:nvPr/>
+        </p:nvSpPr>
+        <p:spPr>
+          <a:xfrm>
+            <a:off x="3792003" y="3947060"/>
+            <a:ext cx="1347561" cy="771525"/>
+          </a:xfrm>
+          <a:prstGeom prst="flowChartMagneticDisk">
+            <a:avLst/>
+          </a:prstGeom>
+        </p:spPr>
+        <p:style>
+          <a:lnRef idx="2">
+            <a:schemeClr val="accent6">
+              <a:shade val="50000"/>
+            </a:schemeClr>
+          </a:lnRef>
+          <a:fillRef idx="1">
+            <a:schemeClr val="accent6"/>
+          </a:fillRef>
+          <a:effectRef idx="0">
+            <a:schemeClr val="accent6"/>
+          </a:effectRef>
+          <a:fontRef idx="minor">
+            <a:schemeClr val="lt1"/>
+          </a:fontRef>
+        </p:style>
+        <p:txBody>
+          <a:bodyPr rtlCol="0" anchor="ctr"/>
+          <a:lstStyle/>
+          <a:p>
+            <a:pPr algn="ctr"/>
+            <a:r>
+              <a:rPr lang="en-US" dirty="0"/>
+              <a:t>Database</a:t>
+            </a:r>
+          </a:p>
+        </p:txBody>
+      </p:sp>
+      <p:cxnSp>
+        <p:nvCxnSpPr>
+          <p:cNvPr id="18" name="Straight Connector 17">
+            <a:extLst>
+              <a:ext uri="{FF2B5EF4-FFF2-40B4-BE49-F238E27FC236}">
+                <a16:creationId xmlns:a16="http://schemas.microsoft.com/office/drawing/2014/main" id="{235D9357-CBFC-4F36-816C-8859C7D81078}"/>
+              </a:ext>
+            </a:extLst>
+          </p:cNvPr>
+          <p:cNvCxnSpPr>
+            <a:cxnSpLocks/>
+            <a:stCxn id="9" idx="2"/>
+            <a:endCxn id="17" idx="1"/>
+          </p:cNvCxnSpPr>
+          <p:nvPr/>
+        </p:nvCxnSpPr>
+        <p:spPr>
+          <a:xfrm>
+            <a:off x="4465783" y="3650197"/>
+            <a:ext cx="1" cy="296863"/>
+          </a:xfrm>
+          <a:prstGeom prst="line">
+            <a:avLst/>
+          </a:prstGeom>
+          <a:ln w="57150">
+            <a:prstDash val="solid"/>
+            <a:headEnd type="none" w="med" len="med"/>
+            <a:tailEnd type="triangle" w="med" len="med"/>
+          </a:ln>
+        </p:spPr>
+        <p:style>
+          <a:lnRef idx="1">
+            <a:schemeClr val="accent2"/>
+          </a:lnRef>
+          <a:fillRef idx="0">
+            <a:schemeClr val="accent2"/>
+          </a:fillRef>
+          <a:effectRef idx="0">
+            <a:schemeClr val="accent2"/>
+          </a:effectRef>
+          <a:fontRef idx="minor">
+            <a:schemeClr val="tx1"/>
+          </a:fontRef>
+        </p:style>
+      </p:cxnSp>
+      <p:cxnSp>
+        <p:nvCxnSpPr>
+          <p:cNvPr id="23" name="Straight Connector 22">
+            <a:extLst>
+              <a:ext uri="{FF2B5EF4-FFF2-40B4-BE49-F238E27FC236}">
+                <a16:creationId xmlns:a16="http://schemas.microsoft.com/office/drawing/2014/main" id="{D26C0954-62E5-4756-85F3-4E9BCF56B8E7}"/>
+              </a:ext>
+            </a:extLst>
+          </p:cNvPr>
+          <p:cNvCxnSpPr>
+            <a:cxnSpLocks/>
+          </p:cNvCxnSpPr>
+          <p:nvPr/>
+        </p:nvCxnSpPr>
+        <p:spPr>
+          <a:xfrm>
+            <a:off x="4465782" y="2769333"/>
+            <a:ext cx="1" cy="296863"/>
+          </a:xfrm>
+          <a:prstGeom prst="line">
+            <a:avLst/>
+          </a:prstGeom>
+          <a:ln w="57150">
+            <a:prstDash val="solid"/>
+            <a:headEnd type="none" w="med" len="med"/>
+            <a:tailEnd type="triangle" w="med" len="med"/>
+          </a:ln>
+        </p:spPr>
+        <p:style>
+          <a:lnRef idx="1">
+            <a:schemeClr val="accent2"/>
+          </a:lnRef>
+          <a:fillRef idx="0">
+            <a:schemeClr val="accent2"/>
+          </a:fillRef>
+          <a:effectRef idx="0">
+            <a:schemeClr val="accent2"/>
+          </a:effectRef>
+          <a:fontRef idx="minor">
+            <a:schemeClr val="tx1"/>
+          </a:fontRef>
+        </p:style>
+      </p:cxnSp>
+    </p:spTree>
+    <p:extLst>
+      <p:ext uri="{BB962C8B-B14F-4D97-AF65-F5344CB8AC3E}">
+        <p14:creationId xmlns:p14="http://schemas.microsoft.com/office/powerpoint/2010/main" val="3629601862"/>
+      </p:ext>
+    </p:extLst>
+  </p:cSld>
+  <p:clrMapOvr>
+    <a:masterClrMapping/>
+  </p:clrMapOvr>
+  <mc:AlternateContent xmlns:mc="http://schemas.openxmlformats.org/markup-compatibility/2006">
+    <mc:Choice xmlns:p159="http://schemas.microsoft.com/office/powerpoint/2015/09/main" Requires="p159">
+      <p:transition xmlns:p14="http://schemas.microsoft.com/office/powerpoint/2010/main" spd="slow" p14:dur="2000">
+        <p159:morph option="byObject"/>
+      </p:transition>
+    </mc:Choice>
+    <mc:Fallback>
+      <p:transition spd="slow">
+        <p:fade/>
+      </p:transition>
+    </mc:Fallback>
+  </mc:AlternateContent>
+  <p:timing>
+    <p:tnLst>
+      <p:par>
+        <p:cTn id="1" dur="indefinite" restart="never" nodeType="tmRoot">
+          <p:childTnLst>
+            <p:seq concurrent="1" nextAc="seek">
+              <p:cTn id="2" dur="indefinite" nodeType="mainSeq">
+                <p:childTnLst>
+                  <p:par>
+                    <p:cTn id="3" fill="hold">
+                      <p:stCondLst>
+                        <p:cond delay="indefinite"/>
+                      </p:stCondLst>
+                      <p:childTnLst>
+                        <p:par>
+                          <p:cTn id="4" fill="hold">
+                            <p:stCondLst>
+                              <p:cond delay="0"/>
+                            </p:stCondLst>
+                            <p:childTnLst>
+                              <p:par>
+                                <p:cTn id="5" presetID="24" presetClass="emph" presetSubtype="0" fill="hold" grpId="0" nodeType="clickEffect">
+                                  <p:stCondLst>
+                                    <p:cond delay="0"/>
+                                  </p:stCondLst>
+                                  <p:childTnLst>
+                                    <p:animClr clrSpc="hsl" dir="cw">
+                                      <p:cBhvr override="childStyle">
+                                        <p:cTn id="6" dur="500" fill="hold"/>
+                                        <p:tgtEl>
+                                          <p:spTgt spid="11"/>
+                                        </p:tgtEl>
+                                        <p:attrNameLst>
+                                          <p:attrName>style.color</p:attrName>
+                                        </p:attrNameLst>
+                                      </p:cBhvr>
+                                      <p:by>
+                                        <p:hsl h="0" s="-12549" l="-25098"/>
+                                      </p:by>
+                                    </p:animClr>
+                                    <p:animClr clrSpc="hsl" dir="cw">
+                                      <p:cBhvr>
+                                        <p:cTn id="7" dur="500" fill="hold"/>
+                                        <p:tgtEl>
+                                          <p:spTgt spid="11"/>
+                                        </p:tgtEl>
+                                        <p:attrNameLst>
+                                          <p:attrName>fillcolor</p:attrName>
+                                        </p:attrNameLst>
+                                      </p:cBhvr>
+                                      <p:by>
+                                        <p:hsl h="0" s="-12549" l="-25098"/>
+                                      </p:by>
+                                    </p:animClr>
+                                    <p:animClr clrSpc="hsl" dir="cw">
+                                      <p:cBhvr>
+                                        <p:cTn id="8" dur="500" fill="hold"/>
+                                        <p:tgtEl>
+                                          <p:spTgt spid="11"/>
+                                        </p:tgtEl>
+                                        <p:attrNameLst>
+                                          <p:attrName>stroke.color</p:attrName>
+                                        </p:attrNameLst>
+                                      </p:cBhvr>
+                                      <p:by>
+                                        <p:hsl h="0" s="-12549" l="-25098"/>
+                                      </p:by>
+                                    </p:animClr>
+                                    <p:set>
+                                      <p:cBhvr>
+                                        <p:cTn id="9" dur="500" fill="hold"/>
+                                        <p:tgtEl>
+                                          <p:spTgt spid="11"/>
+                                        </p:tgtEl>
+                                        <p:attrNameLst>
+                                          <p:attrName>fill.type</p:attrName>
+                                        </p:attrNameLst>
+                                      </p:cBhvr>
+                                      <p:to>
+                                        <p:strVal val="solid"/>
+                                      </p:to>
+                                    </p:set>
+                                  </p:childTnLst>
+                                </p:cTn>
+                              </p:par>
+                              <p:par>
+                                <p:cTn id="10" presetID="24" presetClass="emph" presetSubtype="0" fill="hold" grpId="0" nodeType="withEffect">
+                                  <p:stCondLst>
+                                    <p:cond delay="0"/>
+                                  </p:stCondLst>
+                                  <p:childTnLst>
+                                    <p:animClr clrSpc="hsl" dir="cw">
+                                      <p:cBhvr override="childStyle">
+                                        <p:cTn id="11" dur="500" fill="hold"/>
+                                        <p:tgtEl>
+                                          <p:spTgt spid="12"/>
+                                        </p:tgtEl>
+                                        <p:attrNameLst>
+                                          <p:attrName>style.color</p:attrName>
+                                        </p:attrNameLst>
+                                      </p:cBhvr>
+                                      <p:by>
+                                        <p:hsl h="0" s="-12549" l="-25098"/>
+                                      </p:by>
+                                    </p:animClr>
+                                    <p:animClr clrSpc="hsl" dir="cw">
+                                      <p:cBhvr>
+                                        <p:cTn id="12" dur="500" fill="hold"/>
+                                        <p:tgtEl>
+                                          <p:spTgt spid="12"/>
+                                        </p:tgtEl>
+                                        <p:attrNameLst>
+                                          <p:attrName>fillcolor</p:attrName>
+                                        </p:attrNameLst>
+                                      </p:cBhvr>
+                                      <p:by>
+                                        <p:hsl h="0" s="-12549" l="-25098"/>
+                                      </p:by>
+                                    </p:animClr>
+                                    <p:animClr clrSpc="hsl" dir="cw">
+                                      <p:cBhvr>
+                                        <p:cTn id="13" dur="500" fill="hold"/>
+                                        <p:tgtEl>
+                                          <p:spTgt spid="12"/>
+                                        </p:tgtEl>
+                                        <p:attrNameLst>
+                                          <p:attrName>stroke.color</p:attrName>
+                                        </p:attrNameLst>
+                                      </p:cBhvr>
+                                      <p:by>
+                                        <p:hsl h="0" s="-12549" l="-25098"/>
+                                      </p:by>
+                                    </p:animClr>
+                                    <p:set>
+                                      <p:cBhvr>
+                                        <p:cTn id="14" dur="500" fill="hold"/>
+                                        <p:tgtEl>
+                                          <p:spTgt spid="12"/>
+                                        </p:tgtEl>
+                                        <p:attrNameLst>
+                                          <p:attrName>fill.type</p:attrName>
+                                        </p:attrNameLst>
+                                      </p:cBhvr>
+                                      <p:to>
+                                        <p:strVal val="solid"/>
+                                      </p:to>
+                                    </p:set>
+                                  </p:childTnLst>
+                                </p:cTn>
+                              </p:par>
+                              <p:par>
+                                <p:cTn id="15" presetID="24" presetClass="emph" presetSubtype="0" fill="hold" nodeType="withEffect">
+                                  <p:stCondLst>
+                                    <p:cond delay="0"/>
+                                  </p:stCondLst>
+                                  <p:childTnLst>
+                                    <p:animClr clrSpc="hsl" dir="cw">
+                                      <p:cBhvr override="childStyle">
+                                        <p:cTn id="16" dur="500" fill="hold"/>
+                                        <p:tgtEl>
+                                          <p:spTgt spid="14"/>
+                                        </p:tgtEl>
+                                        <p:attrNameLst>
+                                          <p:attrName>style.color</p:attrName>
+                                        </p:attrNameLst>
+                                      </p:cBhvr>
+                                      <p:by>
+                                        <p:hsl h="0" s="-12549" l="-25098"/>
+                                      </p:by>
+                                    </p:animClr>
+                                    <p:animClr clrSpc="hsl" dir="cw">
+                                      <p:cBhvr>
+                                        <p:cTn id="17" dur="500" fill="hold"/>
+                                        <p:tgtEl>
+                                          <p:spTgt spid="14"/>
+                                        </p:tgtEl>
+                                        <p:attrNameLst>
+                                          <p:attrName>fillcolor</p:attrName>
+                                        </p:attrNameLst>
+                                      </p:cBhvr>
+                                      <p:by>
+                                        <p:hsl h="0" s="-12549" l="-25098"/>
+                                      </p:by>
+                                    </p:animClr>
+                                    <p:animClr clrSpc="hsl" dir="cw">
+                                      <p:cBhvr>
+                                        <p:cTn id="18" dur="500" fill="hold"/>
+                                        <p:tgtEl>
+                                          <p:spTgt spid="14"/>
+                                        </p:tgtEl>
+                                        <p:attrNameLst>
+                                          <p:attrName>stroke.color</p:attrName>
+                                        </p:attrNameLst>
+                                      </p:cBhvr>
+                                      <p:by>
+                                        <p:hsl h="0" s="-12549" l="-25098"/>
+                                      </p:by>
+                                    </p:animClr>
+                                    <p:set>
+                                      <p:cBhvr>
+                                        <p:cTn id="19" dur="500" fill="hold"/>
+                                        <p:tgtEl>
+                                          <p:spTgt spid="14"/>
+                                        </p:tgtEl>
+                                        <p:attrNameLst>
+                                          <p:attrName>fill.type</p:attrName>
+                                        </p:attrNameLst>
+                                      </p:cBhvr>
+                                      <p:to>
+                                        <p:strVal val="solid"/>
+                                      </p:to>
+                                    </p:set>
+                                  </p:childTnLst>
+                                </p:cTn>
+                              </p:par>
+                              <p:par>
+                                <p:cTn id="20" presetID="24" presetClass="emph" presetSubtype="0" fill="hold" grpId="0" nodeType="withEffect">
+                                  <p:stCondLst>
+                                    <p:cond delay="0"/>
+                                  </p:stCondLst>
+                                  <p:childTnLst>
+                                    <p:animClr clrSpc="hsl" dir="cw">
+                                      <p:cBhvr override="childStyle">
+                                        <p:cTn id="21" dur="500" fill="hold"/>
+                                        <p:tgtEl>
+                                          <p:spTgt spid="25"/>
+                                        </p:tgtEl>
+                                        <p:attrNameLst>
+                                          <p:attrName>style.color</p:attrName>
+                                        </p:attrNameLst>
+                                      </p:cBhvr>
+                                      <p:by>
+                                        <p:hsl h="0" s="-12549" l="-25098"/>
+                                      </p:by>
+                                    </p:animClr>
+                                    <p:animClr clrSpc="hsl" dir="cw">
+                                      <p:cBhvr>
+                                        <p:cTn id="22" dur="500" fill="hold"/>
+                                        <p:tgtEl>
+                                          <p:spTgt spid="25"/>
+                                        </p:tgtEl>
+                                        <p:attrNameLst>
+                                          <p:attrName>fillcolor</p:attrName>
+                                        </p:attrNameLst>
+                                      </p:cBhvr>
+                                      <p:by>
+                                        <p:hsl h="0" s="-12549" l="-25098"/>
+                                      </p:by>
+                                    </p:animClr>
+                                    <p:animClr clrSpc="hsl" dir="cw">
+                                      <p:cBhvr>
+                                        <p:cTn id="23" dur="500" fill="hold"/>
+                                        <p:tgtEl>
+                                          <p:spTgt spid="25"/>
+                                        </p:tgtEl>
+                                        <p:attrNameLst>
+                                          <p:attrName>stroke.color</p:attrName>
+                                        </p:attrNameLst>
+                                      </p:cBhvr>
+                                      <p:by>
+                                        <p:hsl h="0" s="-12549" l="-25098"/>
+                                      </p:by>
+                                    </p:animClr>
+                                    <p:set>
+                                      <p:cBhvr>
+                                        <p:cTn id="24" dur="500" fill="hold"/>
+                                        <p:tgtEl>
+                                          <p:spTgt spid="25"/>
+                                        </p:tgtEl>
+                                        <p:attrNameLst>
+                                          <p:attrName>fill.type</p:attrName>
+                                        </p:attrNameLst>
+                                      </p:cBhvr>
+                                      <p:to>
+                                        <p:strVal val="solid"/>
+                                      </p:to>
+                                    </p:set>
+                                  </p:childTnLst>
+                                </p:cTn>
+                              </p:par>
+                              <p:par>
+                                <p:cTn id="25" presetID="24" presetClass="emph" presetSubtype="0" fill="hold" nodeType="withEffect">
+                                  <p:stCondLst>
+                                    <p:cond delay="0"/>
+                                  </p:stCondLst>
+                                  <p:childTnLst>
+                                    <p:animClr clrSpc="hsl" dir="cw">
+                                      <p:cBhvr override="childStyle">
+                                        <p:cTn id="26" dur="500" fill="hold"/>
+                                        <p:tgtEl>
+                                          <p:spTgt spid="15"/>
+                                        </p:tgtEl>
+                                        <p:attrNameLst>
+                                          <p:attrName>style.color</p:attrName>
+                                        </p:attrNameLst>
+                                      </p:cBhvr>
+                                      <p:by>
+                                        <p:hsl h="0" s="-12549" l="-25098"/>
+                                      </p:by>
+                                    </p:animClr>
+                                    <p:animClr clrSpc="hsl" dir="cw">
+                                      <p:cBhvr>
+                                        <p:cTn id="27" dur="500" fill="hold"/>
+                                        <p:tgtEl>
+                                          <p:spTgt spid="15"/>
+                                        </p:tgtEl>
+                                        <p:attrNameLst>
+                                          <p:attrName>fillcolor</p:attrName>
+                                        </p:attrNameLst>
+                                      </p:cBhvr>
+                                      <p:by>
+                                        <p:hsl h="0" s="-12549" l="-25098"/>
+                                      </p:by>
+                                    </p:animClr>
+                                    <p:animClr clrSpc="hsl" dir="cw">
+                                      <p:cBhvr>
+                                        <p:cTn id="28" dur="500" fill="hold"/>
+                                        <p:tgtEl>
+                                          <p:spTgt spid="15"/>
+                                        </p:tgtEl>
+                                        <p:attrNameLst>
+                                          <p:attrName>stroke.color</p:attrName>
+                                        </p:attrNameLst>
+                                      </p:cBhvr>
+                                      <p:by>
+                                        <p:hsl h="0" s="-12549" l="-25098"/>
+                                      </p:by>
+                                    </p:animClr>
+                                    <p:set>
+                                      <p:cBhvr>
+                                        <p:cTn id="29" dur="500" fill="hold"/>
+                                        <p:tgtEl>
+                                          <p:spTgt spid="15"/>
+                                        </p:tgtEl>
+                                        <p:attrNameLst>
+                                          <p:attrName>fill.type</p:attrName>
+                                        </p:attrNameLst>
+                                      </p:cBhvr>
+                                      <p:to>
+                                        <p:strVal val="solid"/>
+                                      </p:to>
+                                    </p:set>
+                                  </p:childTnLst>
+                                </p:cTn>
+                              </p:par>
+                            </p:childTnLst>
+                          </p:cTn>
+                        </p:par>
+                      </p:childTnLst>
+                    </p:cTn>
+                  </p:par>
+                </p:childTnLst>
+              </p:cTn>
+              <p:prevCondLst>
+                <p:cond evt="onPrev" delay="0">
+                  <p:tgtEl>
+                    <p:sldTgt/>
+                  </p:tgtEl>
+                </p:cond>
+              </p:prevCondLst>
+              <p:nextCondLst>
+                <p:cond evt="onNext" delay="0">
+                  <p:tgtEl>
+                    <p:sldTgt/>
+                  </p:tgtEl>
+                </p:cond>
+              </p:nextCondLst>
+            </p:seq>
+          </p:childTnLst>
+        </p:cTn>
+      </p:par>
+    </p:tnLst>
+    <p:bldLst>
+      <p:bldP spid="25" grpId="0" animBg="1"/>
+      <p:bldP spid="11" grpId="0" animBg="1"/>
+      <p:bldP spid="12" grpId="0" animBg="1"/>
+    </p:bldLst>
+  </p:timing>
+</p:sld>
+</file>
+
+<file path=ppt/slides/slide17.xml><?xml version="1.0" encoding="utf-8"?>
+<p:sld xmlns:a="http://schemas.openxmlformats.org/drawingml/2006/main" xmlns:r="http://schemas.openxmlformats.org/officeDocument/2006/relationships" xmlns:p="http://schemas.openxmlformats.org/presentationml/2006/main">
+  <p:cSld>
+    <p:spTree>
+      <p:nvGrpSpPr>
+        <p:cNvPr id="1" name=""/>
+        <p:cNvGrpSpPr/>
+        <p:nvPr/>
+      </p:nvGrpSpPr>
+      <p:grpSpPr>
+        <a:xfrm>
+          <a:off x="0" y="0"/>
+          <a:ext cx="0" cy="0"/>
+          <a:chOff x="0" y="0"/>
+          <a:chExt cx="0" cy="0"/>
+        </a:xfrm>
+      </p:grpSpPr>
+      <p:sp>
+        <p:nvSpPr>
+          <p:cNvPr id="25" name="Rectangle: Rounded Corners 24">
+            <a:extLst>
+              <a:ext uri="{FF2B5EF4-FFF2-40B4-BE49-F238E27FC236}">
+                <a16:creationId xmlns:a16="http://schemas.microsoft.com/office/drawing/2014/main" id="{DF04F428-A1F4-4235-92A1-FAC3D72F46AA}"/>
+              </a:ext>
+            </a:extLst>
+          </p:cNvPr>
+          <p:cNvSpPr/>
+          <p:nvPr/>
+        </p:nvSpPr>
+        <p:spPr>
+          <a:xfrm>
+            <a:off x="2823228" y="817690"/>
+            <a:ext cx="3268470" cy="1951643"/>
+          </a:xfrm>
+          <a:prstGeom prst="roundRect">
+            <a:avLst/>
+          </a:prstGeom>
+        </p:spPr>
+        <p:style>
+          <a:lnRef idx="2">
+            <a:schemeClr val="accent5"/>
+          </a:lnRef>
+          <a:fillRef idx="1">
+            <a:schemeClr val="lt1"/>
+          </a:fillRef>
+          <a:effectRef idx="0">
+            <a:schemeClr val="accent5"/>
+          </a:effectRef>
+          <a:fontRef idx="minor">
+            <a:schemeClr val="dk1"/>
+          </a:fontRef>
+        </p:style>
+        <p:txBody>
+          <a:bodyPr rtlCol="0" anchor="ctr"/>
+          <a:lstStyle/>
+          <a:p>
+            <a:pPr algn="ctr"/>
+            <a:endParaRPr lang="en-US" dirty="0"/>
+          </a:p>
+        </p:txBody>
+      </p:sp>
+      <p:sp>
+        <p:nvSpPr>
+          <p:cNvPr id="3" name="Title 2">
+            <a:extLst>
+              <a:ext uri="{FF2B5EF4-FFF2-40B4-BE49-F238E27FC236}">
+                <a16:creationId xmlns:a16="http://schemas.microsoft.com/office/drawing/2014/main" id="{ADB04B0B-004D-4B94-8A06-4CFB0B4C2EF3}"/>
+              </a:ext>
+            </a:extLst>
+          </p:cNvPr>
+          <p:cNvSpPr>
+            <a:spLocks noGrp="1"/>
+          </p:cNvSpPr>
+          <p:nvPr>
+            <p:ph type="title"/>
+          </p:nvPr>
+        </p:nvSpPr>
+        <p:spPr>
+          <a:xfrm>
+            <a:off x="358775" y="219075"/>
+            <a:ext cx="8426449" cy="301752"/>
+          </a:xfrm>
+        </p:spPr>
+        <p:txBody>
+          <a:bodyPr/>
+          <a:lstStyle/>
+          <a:p>
+            <a:r>
+              <a:rPr lang="en-US" dirty="0"/>
+              <a:t>E2E TESTS</a:t>
+            </a:r>
+          </a:p>
+        </p:txBody>
+      </p:sp>
+      <p:sp>
+        <p:nvSpPr>
+          <p:cNvPr id="9" name="Rectangle: Rounded Corners 8">
+            <a:extLst>
+              <a:ext uri="{FF2B5EF4-FFF2-40B4-BE49-F238E27FC236}">
+                <a16:creationId xmlns:a16="http://schemas.microsoft.com/office/drawing/2014/main" id="{E96E4BAB-7861-4323-94E7-CB95E4C1DB73}"/>
+              </a:ext>
+            </a:extLst>
+          </p:cNvPr>
+          <p:cNvSpPr/>
+          <p:nvPr/>
+        </p:nvSpPr>
+        <p:spPr>
+          <a:xfrm>
+            <a:off x="2831548" y="3034478"/>
+            <a:ext cx="3268470" cy="615719"/>
+          </a:xfrm>
+          <a:prstGeom prst="roundRect">
+            <a:avLst/>
+          </a:prstGeom>
+        </p:spPr>
+        <p:style>
+          <a:lnRef idx="2">
+            <a:schemeClr val="accent4">
+              <a:shade val="50000"/>
+            </a:schemeClr>
+          </a:lnRef>
+          <a:fillRef idx="1">
+            <a:schemeClr val="accent4"/>
+          </a:fillRef>
+          <a:effectRef idx="0">
+            <a:schemeClr val="accent4"/>
+          </a:effectRef>
+          <a:fontRef idx="minor">
+            <a:schemeClr val="lt1"/>
+          </a:fontRef>
+        </p:style>
+        <p:txBody>
+          <a:bodyPr rtlCol="0" anchor="ctr"/>
+          <a:lstStyle/>
+          <a:p>
+            <a:pPr algn="ctr"/>
+            <a:r>
+              <a:rPr lang="en-US" dirty="0"/>
+              <a:t>Persistency</a:t>
+            </a:r>
+          </a:p>
+        </p:txBody>
+      </p:sp>
+      <p:grpSp>
+        <p:nvGrpSpPr>
+          <p:cNvPr id="7" name="Group 6">
+            <a:extLst>
+              <a:ext uri="{FF2B5EF4-FFF2-40B4-BE49-F238E27FC236}">
+                <a16:creationId xmlns:a16="http://schemas.microsoft.com/office/drawing/2014/main" id="{668D00C8-6A5A-4CF8-87CE-AA59AC703DD2}"/>
+              </a:ext>
+            </a:extLst>
+          </p:cNvPr>
+          <p:cNvGrpSpPr/>
+          <p:nvPr/>
+        </p:nvGrpSpPr>
+        <p:grpSpPr>
+          <a:xfrm>
+            <a:off x="3103108" y="922499"/>
+            <a:ext cx="2708709" cy="1742025"/>
+            <a:chOff x="1135782" y="1478916"/>
+            <a:chExt cx="3361934" cy="2475506"/>
+          </a:xfrm>
+        </p:grpSpPr>
+        <p:sp>
+          <p:nvSpPr>
+            <p:cNvPr id="11" name="Rectangle: Rounded Corners 10">
+              <a:extLst>
+                <a:ext uri="{FF2B5EF4-FFF2-40B4-BE49-F238E27FC236}">
+                  <a16:creationId xmlns:a16="http://schemas.microsoft.com/office/drawing/2014/main" id="{7C31B104-113C-41E4-8A4A-8DB1A0BA829A}"/>
+                </a:ext>
+              </a:extLst>
+            </p:cNvPr>
+            <p:cNvSpPr/>
+            <p:nvPr/>
+          </p:nvSpPr>
+          <p:spPr>
+            <a:xfrm>
+              <a:off x="1135782" y="1478916"/>
+              <a:ext cx="1003721" cy="615719"/>
+            </a:xfrm>
+            <a:prstGeom prst="roundRect">
+              <a:avLst/>
+            </a:prstGeom>
+          </p:spPr>
+          <p:style>
+            <a:lnRef idx="2">
+              <a:schemeClr val="accent3">
+                <a:shade val="50000"/>
+              </a:schemeClr>
+            </a:lnRef>
+            <a:fillRef idx="1">
+              <a:schemeClr val="accent3"/>
+            </a:fillRef>
+            <a:effectRef idx="0">
+              <a:schemeClr val="accent3"/>
+            </a:effectRef>
+            <a:fontRef idx="minor">
+              <a:schemeClr val="lt1"/>
+            </a:fontRef>
+          </p:style>
+          <p:txBody>
+            <a:bodyPr rtlCol="0" anchor="ctr"/>
+            <a:lstStyle/>
+            <a:p>
+              <a:pPr algn="ctr"/>
+              <a:r>
+                <a:rPr lang="en-US" dirty="0"/>
+                <a:t>User</a:t>
+              </a:r>
+            </a:p>
+          </p:txBody>
+        </p:sp>
+        <p:sp>
+          <p:nvSpPr>
+            <p:cNvPr id="12" name="Rectangle: Rounded Corners 11">
+              <a:extLst>
+                <a:ext uri="{FF2B5EF4-FFF2-40B4-BE49-F238E27FC236}">
+                  <a16:creationId xmlns:a16="http://schemas.microsoft.com/office/drawing/2014/main" id="{7968C700-AA8E-405C-9073-3F2B2B193FEA}"/>
+                </a:ext>
+              </a:extLst>
+            </p:cNvPr>
+            <p:cNvSpPr/>
+            <p:nvPr/>
+          </p:nvSpPr>
+          <p:spPr>
+            <a:xfrm>
+              <a:off x="3493995" y="2038342"/>
+              <a:ext cx="1003721" cy="615719"/>
+            </a:xfrm>
+            <a:prstGeom prst="roundRect">
+              <a:avLst/>
+            </a:prstGeom>
+          </p:spPr>
+          <p:style>
+            <a:lnRef idx="2">
+              <a:schemeClr val="accent3">
+                <a:shade val="50000"/>
+              </a:schemeClr>
+            </a:lnRef>
+            <a:fillRef idx="1">
+              <a:schemeClr val="accent3"/>
+            </a:fillRef>
+            <a:effectRef idx="0">
+              <a:schemeClr val="accent3"/>
+            </a:effectRef>
+            <a:fontRef idx="minor">
+              <a:schemeClr val="lt1"/>
+            </a:fontRef>
+          </p:style>
+          <p:txBody>
+            <a:bodyPr rtlCol="0" anchor="ctr"/>
+            <a:lstStyle/>
+            <a:p>
+              <a:pPr algn="ctr"/>
+              <a:r>
+                <a:rPr lang="en-US" dirty="0"/>
+                <a:t>Cart</a:t>
+              </a:r>
+            </a:p>
+          </p:txBody>
+        </p:sp>
+        <p:sp>
+          <p:nvSpPr>
+            <p:cNvPr id="13" name="Rectangle: Rounded Corners 12">
+              <a:extLst>
+                <a:ext uri="{FF2B5EF4-FFF2-40B4-BE49-F238E27FC236}">
+                  <a16:creationId xmlns:a16="http://schemas.microsoft.com/office/drawing/2014/main" id="{C67256B9-991D-48F0-BDC9-F009DA86DA9A}"/>
+                </a:ext>
+              </a:extLst>
+            </p:cNvPr>
+            <p:cNvSpPr/>
+            <p:nvPr/>
+          </p:nvSpPr>
+          <p:spPr>
+            <a:xfrm>
+              <a:off x="1656944" y="3338703"/>
+              <a:ext cx="1003721" cy="615719"/>
+            </a:xfrm>
+            <a:prstGeom prst="roundRect">
+              <a:avLst/>
+            </a:prstGeom>
+          </p:spPr>
+          <p:style>
+            <a:lnRef idx="2">
+              <a:schemeClr val="accent3">
+                <a:shade val="50000"/>
+              </a:schemeClr>
+            </a:lnRef>
+            <a:fillRef idx="1">
+              <a:schemeClr val="accent3"/>
+            </a:fillRef>
+            <a:effectRef idx="0">
+              <a:schemeClr val="accent3"/>
+            </a:effectRef>
+            <a:fontRef idx="minor">
+              <a:schemeClr val="lt1"/>
+            </a:fontRef>
+          </p:style>
+          <p:txBody>
+            <a:bodyPr rtlCol="0" anchor="ctr"/>
+            <a:lstStyle/>
+            <a:p>
+              <a:pPr algn="ctr"/>
+              <a:r>
+                <a:rPr lang="en-US" dirty="0" err="1"/>
+                <a:t>ListItem</a:t>
+              </a:r>
+              <a:endParaRPr lang="en-US" dirty="0"/>
+            </a:p>
+          </p:txBody>
+        </p:sp>
+        <p:cxnSp>
+          <p:nvCxnSpPr>
+            <p:cNvPr id="14" name="Straight Connector 13">
+              <a:extLst>
+                <a:ext uri="{FF2B5EF4-FFF2-40B4-BE49-F238E27FC236}">
+                  <a16:creationId xmlns:a16="http://schemas.microsoft.com/office/drawing/2014/main" id="{106E79A2-9D24-4ACD-9BE3-B0F6B44A5D31}"/>
+                </a:ext>
+              </a:extLst>
+            </p:cNvPr>
+            <p:cNvCxnSpPr>
+              <a:cxnSpLocks/>
+              <a:stCxn id="11" idx="3"/>
+              <a:endCxn id="12" idx="1"/>
+            </p:cNvCxnSpPr>
+            <p:nvPr/>
+          </p:nvCxnSpPr>
+          <p:spPr>
+            <a:xfrm>
+              <a:off x="2139503" y="1786776"/>
+              <a:ext cx="1354491" cy="559426"/>
+            </a:xfrm>
+            <a:prstGeom prst="line">
+              <a:avLst/>
+            </a:prstGeom>
+            <a:ln w="28575">
+              <a:prstDash val="dash"/>
+            </a:ln>
+          </p:spPr>
+          <p:style>
+            <a:lnRef idx="1">
+              <a:schemeClr val="accent2"/>
+            </a:lnRef>
+            <a:fillRef idx="0">
+              <a:schemeClr val="accent2"/>
+            </a:fillRef>
+            <a:effectRef idx="0">
+              <a:schemeClr val="accent2"/>
+            </a:effectRef>
+            <a:fontRef idx="minor">
+              <a:schemeClr val="tx1"/>
+            </a:fontRef>
+          </p:style>
+        </p:cxnSp>
+        <p:cxnSp>
+          <p:nvCxnSpPr>
+            <p:cNvPr id="15" name="Straight Connector 14">
+              <a:extLst>
+                <a:ext uri="{FF2B5EF4-FFF2-40B4-BE49-F238E27FC236}">
+                  <a16:creationId xmlns:a16="http://schemas.microsoft.com/office/drawing/2014/main" id="{CEE816F6-8948-49C7-A9CB-F869D6F1FC64}"/>
+                </a:ext>
+              </a:extLst>
+            </p:cNvPr>
+            <p:cNvCxnSpPr>
+              <a:cxnSpLocks/>
+              <a:stCxn id="13" idx="3"/>
+              <a:endCxn id="12" idx="2"/>
+            </p:cNvCxnSpPr>
+            <p:nvPr/>
+          </p:nvCxnSpPr>
+          <p:spPr>
+            <a:xfrm flipV="1">
+              <a:off x="2660666" y="2654061"/>
+              <a:ext cx="1335189" cy="992502"/>
+            </a:xfrm>
+            <a:prstGeom prst="line">
+              <a:avLst/>
+            </a:prstGeom>
+            <a:ln w="28575">
+              <a:prstDash val="dash"/>
+            </a:ln>
+          </p:spPr>
+          <p:style>
+            <a:lnRef idx="1">
+              <a:schemeClr val="accent2"/>
+            </a:lnRef>
+            <a:fillRef idx="0">
+              <a:schemeClr val="accent2"/>
+            </a:fillRef>
+            <a:effectRef idx="0">
+              <a:schemeClr val="accent2"/>
+            </a:effectRef>
+            <a:fontRef idx="minor">
+              <a:schemeClr val="tx1"/>
+            </a:fontRef>
+          </p:style>
+        </p:cxnSp>
+      </p:grpSp>
+      <p:sp>
+        <p:nvSpPr>
+          <p:cNvPr id="17" name="Flowchart: Magnetic Disk 16">
+            <a:extLst>
+              <a:ext uri="{FF2B5EF4-FFF2-40B4-BE49-F238E27FC236}">
+                <a16:creationId xmlns:a16="http://schemas.microsoft.com/office/drawing/2014/main" id="{550D8398-D256-4E3E-9AE5-A5B912D759A2}"/>
+              </a:ext>
+            </a:extLst>
+          </p:cNvPr>
+          <p:cNvSpPr/>
+          <p:nvPr/>
+        </p:nvSpPr>
+        <p:spPr>
+          <a:xfrm>
+            <a:off x="3792003" y="3947060"/>
+            <a:ext cx="1347561" cy="771525"/>
+          </a:xfrm>
+          <a:prstGeom prst="flowChartMagneticDisk">
+            <a:avLst/>
+          </a:prstGeom>
+        </p:spPr>
+        <p:style>
+          <a:lnRef idx="2">
+            <a:schemeClr val="accent6">
+              <a:shade val="50000"/>
+            </a:schemeClr>
+          </a:lnRef>
+          <a:fillRef idx="1">
+            <a:schemeClr val="accent6"/>
+          </a:fillRef>
+          <a:effectRef idx="0">
+            <a:schemeClr val="accent6"/>
+          </a:effectRef>
+          <a:fontRef idx="minor">
+            <a:schemeClr val="lt1"/>
+          </a:fontRef>
+        </p:style>
+        <p:txBody>
+          <a:bodyPr rtlCol="0" anchor="ctr"/>
+          <a:lstStyle/>
+          <a:p>
+            <a:pPr algn="ctr"/>
+            <a:r>
+              <a:rPr lang="en-US" dirty="0"/>
+              <a:t>Database</a:t>
+            </a:r>
+          </a:p>
+        </p:txBody>
+      </p:sp>
+      <p:cxnSp>
+        <p:nvCxnSpPr>
+          <p:cNvPr id="18" name="Straight Connector 17">
+            <a:extLst>
+              <a:ext uri="{FF2B5EF4-FFF2-40B4-BE49-F238E27FC236}">
+                <a16:creationId xmlns:a16="http://schemas.microsoft.com/office/drawing/2014/main" id="{235D9357-CBFC-4F36-816C-8859C7D81078}"/>
+              </a:ext>
+            </a:extLst>
+          </p:cNvPr>
+          <p:cNvCxnSpPr>
+            <a:cxnSpLocks/>
+            <a:stCxn id="9" idx="2"/>
+            <a:endCxn id="17" idx="1"/>
+          </p:cNvCxnSpPr>
+          <p:nvPr/>
+        </p:nvCxnSpPr>
+        <p:spPr>
+          <a:xfrm>
+            <a:off x="4465783" y="3650197"/>
+            <a:ext cx="1" cy="296863"/>
+          </a:xfrm>
+          <a:prstGeom prst="line">
+            <a:avLst/>
+          </a:prstGeom>
+          <a:ln w="57150">
+            <a:prstDash val="solid"/>
+            <a:headEnd type="none" w="med" len="med"/>
+            <a:tailEnd type="triangle" w="med" len="med"/>
+          </a:ln>
+        </p:spPr>
+        <p:style>
+          <a:lnRef idx="1">
+            <a:schemeClr val="accent2"/>
+          </a:lnRef>
+          <a:fillRef idx="0">
+            <a:schemeClr val="accent2"/>
+          </a:fillRef>
+          <a:effectRef idx="0">
+            <a:schemeClr val="accent2"/>
+          </a:effectRef>
+          <a:fontRef idx="minor">
+            <a:schemeClr val="tx1"/>
+          </a:fontRef>
+        </p:style>
+      </p:cxnSp>
+      <p:cxnSp>
+        <p:nvCxnSpPr>
+          <p:cNvPr id="23" name="Straight Connector 22">
+            <a:extLst>
+              <a:ext uri="{FF2B5EF4-FFF2-40B4-BE49-F238E27FC236}">
+                <a16:creationId xmlns:a16="http://schemas.microsoft.com/office/drawing/2014/main" id="{D26C0954-62E5-4756-85F3-4E9BCF56B8E7}"/>
+              </a:ext>
+            </a:extLst>
+          </p:cNvPr>
+          <p:cNvCxnSpPr>
+            <a:cxnSpLocks/>
+          </p:cNvCxnSpPr>
+          <p:nvPr/>
+        </p:nvCxnSpPr>
+        <p:spPr>
+          <a:xfrm>
+            <a:off x="4465782" y="2769333"/>
+            <a:ext cx="1" cy="296863"/>
+          </a:xfrm>
+          <a:prstGeom prst="line">
+            <a:avLst/>
+          </a:prstGeom>
+          <a:ln w="57150">
+            <a:prstDash val="solid"/>
+            <a:headEnd type="none" w="med" len="med"/>
+            <a:tailEnd type="triangle" w="med" len="med"/>
+          </a:ln>
+        </p:spPr>
+        <p:style>
+          <a:lnRef idx="1">
+            <a:schemeClr val="accent2"/>
+          </a:lnRef>
+          <a:fillRef idx="0">
+            <a:schemeClr val="accent2"/>
+          </a:fillRef>
+          <a:effectRef idx="0">
+            <a:schemeClr val="accent2"/>
+          </a:effectRef>
+          <a:fontRef idx="minor">
+            <a:schemeClr val="tx1"/>
+          </a:fontRef>
+        </p:style>
+      </p:cxnSp>
+      <p:sp>
+        <p:nvSpPr>
+          <p:cNvPr id="16" name="Rectangle: Rounded Corners 15">
+            <a:extLst>
+              <a:ext uri="{FF2B5EF4-FFF2-40B4-BE49-F238E27FC236}">
+                <a16:creationId xmlns:a16="http://schemas.microsoft.com/office/drawing/2014/main" id="{5EFAA7C3-B491-40C6-8444-D91A0C1040E0}"/>
+              </a:ext>
+            </a:extLst>
+          </p:cNvPr>
+          <p:cNvSpPr/>
+          <p:nvPr/>
+        </p:nvSpPr>
+        <p:spPr>
+          <a:xfrm>
+            <a:off x="6900396" y="1224953"/>
+            <a:ext cx="1133214" cy="615719"/>
+          </a:xfrm>
+          <a:prstGeom prst="roundRect">
+            <a:avLst/>
+          </a:prstGeom>
+        </p:spPr>
+        <p:style>
+          <a:lnRef idx="2">
+            <a:schemeClr val="accent2">
+              <a:shade val="50000"/>
+            </a:schemeClr>
+          </a:lnRef>
+          <a:fillRef idx="1">
+            <a:schemeClr val="accent2"/>
+          </a:fillRef>
+          <a:effectRef idx="0">
+            <a:schemeClr val="accent2"/>
+          </a:effectRef>
+          <a:fontRef idx="minor">
+            <a:schemeClr val="lt1"/>
+          </a:fontRef>
+        </p:style>
+        <p:txBody>
+          <a:bodyPr rtlCol="0" anchor="ctr"/>
+          <a:lstStyle/>
+          <a:p>
+            <a:pPr algn="ctr"/>
+            <a:r>
+              <a:rPr lang="en-US" dirty="0"/>
+              <a:t>Warehouse</a:t>
+            </a:r>
+          </a:p>
+          <a:p>
+            <a:pPr algn="ctr"/>
+            <a:r>
+              <a:rPr lang="en-US" dirty="0"/>
+              <a:t>Service</a:t>
+            </a:r>
+          </a:p>
+        </p:txBody>
+      </p:sp>
+      <p:cxnSp>
+        <p:nvCxnSpPr>
+          <p:cNvPr id="19" name="Straight Connector 18">
+            <a:extLst>
+              <a:ext uri="{FF2B5EF4-FFF2-40B4-BE49-F238E27FC236}">
+                <a16:creationId xmlns:a16="http://schemas.microsoft.com/office/drawing/2014/main" id="{5F093ED5-16B2-4B33-96B1-72A2E5D80FED}"/>
+              </a:ext>
+            </a:extLst>
+          </p:cNvPr>
+          <p:cNvCxnSpPr>
+            <a:cxnSpLocks/>
+            <a:stCxn id="12" idx="3"/>
+            <a:endCxn id="16" idx="1"/>
+          </p:cNvCxnSpPr>
+          <p:nvPr/>
+        </p:nvCxnSpPr>
+        <p:spPr>
+          <a:xfrm>
+            <a:off x="5811817" y="1532812"/>
+            <a:ext cx="1088579" cy="1"/>
+          </a:xfrm>
+          <a:prstGeom prst="line">
+            <a:avLst/>
+          </a:prstGeom>
+          <a:ln w="28575">
+            <a:prstDash val="dash"/>
+          </a:ln>
+        </p:spPr>
+        <p:style>
+          <a:lnRef idx="1">
+            <a:schemeClr val="accent2"/>
+          </a:lnRef>
+          <a:fillRef idx="0">
+            <a:schemeClr val="accent2"/>
+          </a:fillRef>
+          <a:effectRef idx="0">
+            <a:schemeClr val="accent2"/>
+          </a:effectRef>
+          <a:fontRef idx="minor">
+            <a:schemeClr val="tx1"/>
+          </a:fontRef>
+        </p:style>
+      </p:cxnSp>
+    </p:spTree>
+    <p:extLst>
+      <p:ext uri="{BB962C8B-B14F-4D97-AF65-F5344CB8AC3E}">
+        <p14:creationId xmlns:p14="http://schemas.microsoft.com/office/powerpoint/2010/main" val="1980022481"/>
+      </p:ext>
+    </p:extLst>
+  </p:cSld>
+  <p:clrMapOvr>
+    <a:masterClrMapping/>
+  </p:clrMapOvr>
+  <mc:AlternateContent xmlns:mc="http://schemas.openxmlformats.org/markup-compatibility/2006">
+    <mc:Choice xmlns:p159="http://schemas.microsoft.com/office/powerpoint/2015/09/main" Requires="p159">
+      <p:transition xmlns:p14="http://schemas.microsoft.com/office/powerpoint/2010/main" spd="slow" p14:dur="2000">
+        <p159:morph option="byObject"/>
+      </p:transition>
+    </mc:Choice>
+    <mc:Fallback>
+      <p:transition spd="slow">
+        <p:fade/>
+      </p:transition>
+    </mc:Fallback>
+  </mc:AlternateContent>
+</p:sld>
+</file>
+
+<file path=ppt/slides/slide18.xml><?xml version="1.0" encoding="utf-8"?>
+<p:sld xmlns:a="http://schemas.openxmlformats.org/drawingml/2006/main" xmlns:r="http://schemas.openxmlformats.org/officeDocument/2006/relationships" xmlns:p="http://schemas.openxmlformats.org/presentationml/2006/main">
+  <p:cSld>
+    <p:spTree>
+      <p:nvGrpSpPr>
+        <p:cNvPr id="1" name=""/>
+        <p:cNvGrpSpPr/>
+        <p:nvPr/>
+      </p:nvGrpSpPr>
+      <p:grpSpPr>
+        <a:xfrm>
+          <a:off x="0" y="0"/>
+          <a:ext cx="0" cy="0"/>
+          <a:chOff x="0" y="0"/>
+          <a:chExt cx="0" cy="0"/>
+        </a:xfrm>
+      </p:grpSpPr>
+      <p:sp>
+        <p:nvSpPr>
+          <p:cNvPr id="2" name="Slide Number Placeholder 1">
+            <a:extLst>
+              <a:ext uri="{FF2B5EF4-FFF2-40B4-BE49-F238E27FC236}">
+                <a16:creationId xmlns:a16="http://schemas.microsoft.com/office/drawing/2014/main" id="{F8A98626-1416-45BF-9D85-1D992DD3FC37}"/>
+              </a:ext>
+            </a:extLst>
+          </p:cNvPr>
+          <p:cNvSpPr>
+            <a:spLocks noGrp="1"/>
+          </p:cNvSpPr>
+          <p:nvPr>
+            <p:ph type="sldNum" sz="quarter" idx="4"/>
+          </p:nvPr>
+        </p:nvSpPr>
+        <p:spPr/>
+        <p:txBody>
+          <a:bodyPr/>
+          <a:lstStyle/>
+          <a:p>
+            <a:fld id="{3A707DD9-E92B-45E8-BE0A-E6B2EDF345EB}" type="slidenum">
+              <a:rPr lang="en-US" smtClean="0"/>
+              <a:pPr/>
+              <a:t>18</a:t>
+            </a:fld>
+            <a:endParaRPr lang="en-US" dirty="0"/>
+          </a:p>
+        </p:txBody>
+      </p:sp>
+      <p:sp>
+        <p:nvSpPr>
+          <p:cNvPr id="3" name="TextBox 2">
+            <a:extLst>
+              <a:ext uri="{FF2B5EF4-FFF2-40B4-BE49-F238E27FC236}">
+                <a16:creationId xmlns:a16="http://schemas.microsoft.com/office/drawing/2014/main" id="{B4A5174A-8A02-408B-94BA-E3EA0EE857D0}"/>
+              </a:ext>
+            </a:extLst>
+          </p:cNvPr>
+          <p:cNvSpPr txBox="1"/>
+          <p:nvPr/>
+        </p:nvSpPr>
+        <p:spPr>
+          <a:xfrm>
+            <a:off x="3400045" y="2279363"/>
+            <a:ext cx="2343911" cy="584775"/>
+          </a:xfrm>
+          <a:prstGeom prst="rect">
+            <a:avLst/>
+          </a:prstGeom>
+          <a:noFill/>
+        </p:spPr>
+        <p:txBody>
+          <a:bodyPr wrap="none" rtlCol="0">
+            <a:spAutoFit/>
+          </a:bodyPr>
+          <a:lstStyle/>
+          <a:p>
+            <a:r>
+              <a:rPr lang="en-US" sz="3200" dirty="0"/>
+              <a:t>DEMO TIME!</a:t>
+            </a:r>
+          </a:p>
+        </p:txBody>
+      </p:sp>
+    </p:spTree>
+    <p:extLst>
+      <p:ext uri="{BB962C8B-B14F-4D97-AF65-F5344CB8AC3E}">
+        <p14:creationId xmlns:p14="http://schemas.microsoft.com/office/powerpoint/2010/main" val="2998751406"/>
+      </p:ext>
+    </p:extLst>
+  </p:cSld>
+  <p:clrMapOvr>
+    <a:masterClrMapping/>
+  </p:clrMapOvr>
+</p:sld>
+</file>
+
+<file path=ppt/slides/slide19.xml><?xml version="1.0" encoding="utf-8"?>
+<p:sld xmlns:a="http://schemas.openxmlformats.org/drawingml/2006/main" xmlns:r="http://schemas.openxmlformats.org/officeDocument/2006/relationships" xmlns:p="http://schemas.openxmlformats.org/presentationml/2006/main">
+  <p:cSld>
+    <p:spTree>
+      <p:nvGrpSpPr>
+        <p:cNvPr id="1" name=""/>
+        <p:cNvGrpSpPr/>
+        <p:nvPr/>
+      </p:nvGrpSpPr>
+      <p:grpSpPr>
+        <a:xfrm>
+          <a:off x="0" y="0"/>
+          <a:ext cx="0" cy="0"/>
+          <a:chOff x="0" y="0"/>
+          <a:chExt cx="0" cy="0"/>
+        </a:xfrm>
+      </p:grpSpPr>
+      <p:sp>
+        <p:nvSpPr>
+          <p:cNvPr id="3" name="Title 2">
+            <a:extLst>
+              <a:ext uri="{FF2B5EF4-FFF2-40B4-BE49-F238E27FC236}">
+                <a16:creationId xmlns:a16="http://schemas.microsoft.com/office/drawing/2014/main" id="{774092C2-9A30-4A82-B6A5-F855B7417E1B}"/>
+              </a:ext>
+            </a:extLst>
+          </p:cNvPr>
+          <p:cNvSpPr>
+            <a:spLocks noGrp="1"/>
+          </p:cNvSpPr>
+          <p:nvPr>
+            <p:ph type="title"/>
+          </p:nvPr>
+        </p:nvSpPr>
+        <p:spPr/>
+        <p:txBody>
+          <a:bodyPr/>
+          <a:lstStyle/>
+          <a:p>
+            <a:r>
+              <a:rPr lang="en-US" dirty="0"/>
+              <a:t>Mocking</a:t>
+            </a:r>
+          </a:p>
+        </p:txBody>
+      </p:sp>
+      <p:sp>
+        <p:nvSpPr>
+          <p:cNvPr id="2" name="Slide Number Placeholder 1">
+            <a:extLst>
+              <a:ext uri="{FF2B5EF4-FFF2-40B4-BE49-F238E27FC236}">
+                <a16:creationId xmlns:a16="http://schemas.microsoft.com/office/drawing/2014/main" id="{47E6C370-50FF-4D69-8975-FEA96DA8B13A}"/>
+              </a:ext>
+            </a:extLst>
+          </p:cNvPr>
+          <p:cNvSpPr>
+            <a:spLocks noGrp="1"/>
+          </p:cNvSpPr>
+          <p:nvPr>
+            <p:ph type="sldNum" sz="quarter" idx="4294967295"/>
+          </p:nvPr>
+        </p:nvSpPr>
+        <p:spPr>
+          <a:xfrm>
+            <a:off x="7770813" y="4826000"/>
+            <a:ext cx="1373187" cy="317500"/>
+          </a:xfrm>
+          <a:prstGeom prst="rect">
+            <a:avLst/>
+          </a:prstGeom>
+        </p:spPr>
+        <p:txBody>
+          <a:bodyPr/>
+          <a:lstStyle/>
+          <a:p>
+            <a:fld id="{3A707DD9-E92B-45E8-BE0A-E6B2EDF345EB}" type="slidenum">
+              <a:rPr lang="en-US" smtClean="0"/>
+              <a:pPr/>
+              <a:t>19</a:t>
+            </a:fld>
+            <a:endParaRPr lang="en-US" dirty="0"/>
+          </a:p>
+        </p:txBody>
+      </p:sp>
+    </p:spTree>
+    <p:extLst>
+      <p:ext uri="{BB962C8B-B14F-4D97-AF65-F5344CB8AC3E}">
+        <p14:creationId xmlns:p14="http://schemas.microsoft.com/office/powerpoint/2010/main" val="1881863519"/>
       </p:ext>
     </p:extLst>
   </p:cSld>
@@ -23087,6 +26538,101 @@
     <p:extLst>
       <p:ext uri="{BB962C8B-B14F-4D97-AF65-F5344CB8AC3E}">
         <p14:creationId xmlns:p14="http://schemas.microsoft.com/office/powerpoint/2010/main" val="2625936162"/>
+      </p:ext>
+    </p:extLst>
+  </p:cSld>
+  <p:clrMapOvr>
+    <a:masterClrMapping/>
+  </p:clrMapOvr>
+</p:sld>
+</file>
+
+<file path=ppt/slides/slide20.xml><?xml version="1.0" encoding="utf-8"?>
+<p:sld xmlns:a="http://schemas.openxmlformats.org/drawingml/2006/main" xmlns:r="http://schemas.openxmlformats.org/officeDocument/2006/relationships" xmlns:p="http://schemas.openxmlformats.org/presentationml/2006/main">
+  <p:cSld>
+    <p:spTree>
+      <p:nvGrpSpPr>
+        <p:cNvPr id="1" name=""/>
+        <p:cNvGrpSpPr/>
+        <p:nvPr/>
+      </p:nvGrpSpPr>
+      <p:grpSpPr>
+        <a:xfrm>
+          <a:off x="0" y="0"/>
+          <a:ext cx="0" cy="0"/>
+          <a:chOff x="0" y="0"/>
+          <a:chExt cx="0" cy="0"/>
+        </a:xfrm>
+      </p:grpSpPr>
+      <p:sp>
+        <p:nvSpPr>
+          <p:cNvPr id="2" name="Slide Number Placeholder 1">
+            <a:extLst>
+              <a:ext uri="{FF2B5EF4-FFF2-40B4-BE49-F238E27FC236}">
+                <a16:creationId xmlns:a16="http://schemas.microsoft.com/office/drawing/2014/main" id="{F8A98626-1416-45BF-9D85-1D992DD3FC37}"/>
+              </a:ext>
+            </a:extLst>
+          </p:cNvPr>
+          <p:cNvSpPr>
+            <a:spLocks noGrp="1"/>
+          </p:cNvSpPr>
+          <p:nvPr>
+            <p:ph type="sldNum" sz="quarter" idx="4"/>
+          </p:nvPr>
+        </p:nvSpPr>
+        <p:spPr/>
+        <p:txBody>
+          <a:bodyPr/>
+          <a:lstStyle/>
+          <a:p>
+            <a:fld id="{3A707DD9-E92B-45E8-BE0A-E6B2EDF345EB}" type="slidenum">
+              <a:rPr lang="en-US" smtClean="0"/>
+              <a:pPr/>
+              <a:t>20</a:t>
+            </a:fld>
+            <a:endParaRPr lang="en-US" dirty="0"/>
+          </a:p>
+        </p:txBody>
+      </p:sp>
+      <p:sp>
+        <p:nvSpPr>
+          <p:cNvPr id="3" name="TextBox 2">
+            <a:extLst>
+              <a:ext uri="{FF2B5EF4-FFF2-40B4-BE49-F238E27FC236}">
+                <a16:creationId xmlns:a16="http://schemas.microsoft.com/office/drawing/2014/main" id="{B4A5174A-8A02-408B-94BA-E3EA0EE857D0}"/>
+              </a:ext>
+            </a:extLst>
+          </p:cNvPr>
+          <p:cNvSpPr txBox="1"/>
+          <p:nvPr/>
+        </p:nvSpPr>
+        <p:spPr>
+          <a:xfrm>
+            <a:off x="3400045" y="2279363"/>
+            <a:ext cx="2343911" cy="584775"/>
+          </a:xfrm>
+          <a:prstGeom prst="rect">
+            <a:avLst/>
+          </a:prstGeom>
+          <a:noFill/>
+        </p:spPr>
+        <p:txBody>
+          <a:bodyPr wrap="none" rtlCol="0">
+            <a:spAutoFit/>
+          </a:bodyPr>
+          <a:lstStyle/>
+          <a:p>
+            <a:r>
+              <a:rPr lang="en-US" sz="3200" dirty="0"/>
+              <a:t>DEMO TIME!</a:t>
+            </a:r>
+          </a:p>
+        </p:txBody>
+      </p:sp>
+    </p:spTree>
+    <p:extLst>
+      <p:ext uri="{BB962C8B-B14F-4D97-AF65-F5344CB8AC3E}">
+        <p14:creationId xmlns:p14="http://schemas.microsoft.com/office/powerpoint/2010/main" val="2832294497"/>
       </p:ext>
     </p:extLst>
   </p:cSld>

</xml_diff>

<commit_message>
Added cart tests examples
</commit_message>
<xml_diff>
--- a/slides/lecture_1_intro.pptx
+++ b/slides/lecture_1_intro.pptx
@@ -7,10 +7,10 @@
     <p:sldMasterId id="2147483663" r:id="rId3"/>
   </p:sldMasterIdLst>
   <p:notesMasterIdLst>
-    <p:notesMasterId r:id="rId24"/>
+    <p:notesMasterId r:id="rId27"/>
   </p:notesMasterIdLst>
   <p:handoutMasterIdLst>
-    <p:handoutMasterId r:id="rId25"/>
+    <p:handoutMasterId r:id="rId28"/>
   </p:handoutMasterIdLst>
   <p:sldIdLst>
     <p:sldId id="256" r:id="rId4"/>
@@ -32,7 +32,10 @@
     <p:sldId id="293" r:id="rId20"/>
     <p:sldId id="294" r:id="rId21"/>
     <p:sldId id="290" r:id="rId22"/>
-    <p:sldId id="295" r:id="rId23"/>
+    <p:sldId id="296" r:id="rId23"/>
+    <p:sldId id="297" r:id="rId24"/>
+    <p:sldId id="295" r:id="rId25"/>
+    <p:sldId id="301" r:id="rId26"/>
   </p:sldIdLst>
   <p:sldSz cx="9144000" cy="5143500" type="screen16x9"/>
   <p:notesSz cx="6858000" cy="9144000"/>
@@ -826,6 +829,185 @@
 </p:notes>
 </file>
 
+<file path=ppt/notesSlides/notesSlide10.xml><?xml version="1.0" encoding="utf-8"?>
+<p:notes xmlns:a="http://schemas.openxmlformats.org/drawingml/2006/main" xmlns:r="http://schemas.openxmlformats.org/officeDocument/2006/relationships" xmlns:p="http://schemas.openxmlformats.org/presentationml/2006/main">
+  <p:cSld>
+    <p:spTree>
+      <p:nvGrpSpPr>
+        <p:cNvPr id="1" name=""/>
+        <p:cNvGrpSpPr/>
+        <p:nvPr/>
+      </p:nvGrpSpPr>
+      <p:grpSpPr>
+        <a:xfrm>
+          <a:off x="0" y="0"/>
+          <a:ext cx="0" cy="0"/>
+          <a:chOff x="0" y="0"/>
+          <a:chExt cx="0" cy="0"/>
+        </a:xfrm>
+      </p:grpSpPr>
+      <p:sp>
+        <p:nvSpPr>
+          <p:cNvPr id="2" name="Slide Image Placeholder 1"/>
+          <p:cNvSpPr>
+            <a:spLocks noGrp="1" noRot="1" noChangeAspect="1"/>
+          </p:cNvSpPr>
+          <p:nvPr>
+            <p:ph type="sldImg"/>
+          </p:nvPr>
+        </p:nvSpPr>
+        <p:spPr/>
+      </p:sp>
+      <p:sp>
+        <p:nvSpPr>
+          <p:cNvPr id="3" name="Notes Placeholder 2"/>
+          <p:cNvSpPr>
+            <a:spLocks noGrp="1"/>
+          </p:cNvSpPr>
+          <p:nvPr>
+            <p:ph type="body" idx="1"/>
+          </p:nvPr>
+        </p:nvSpPr>
+        <p:spPr/>
+        <p:txBody>
+          <a:bodyPr/>
+          <a:lstStyle/>
+          <a:p>
+            <a:endParaRPr lang="en-US" dirty="0"/>
+          </a:p>
+        </p:txBody>
+      </p:sp>
+      <p:sp>
+        <p:nvSpPr>
+          <p:cNvPr id="4" name="Slide Number Placeholder 3"/>
+          <p:cNvSpPr>
+            <a:spLocks noGrp="1"/>
+          </p:cNvSpPr>
+          <p:nvPr>
+            <p:ph type="sldNum" sz="quarter" idx="5"/>
+          </p:nvPr>
+        </p:nvSpPr>
+        <p:spPr/>
+        <p:txBody>
+          <a:bodyPr/>
+          <a:lstStyle/>
+          <a:p>
+            <a:fld id="{A874FABB-6DBE-47C4-B626-20167906F475}" type="slidenum">
+              <a:rPr lang="en-US" smtClean="0"/>
+              <a:t>21</a:t>
+            </a:fld>
+            <a:endParaRPr lang="en-US"/>
+          </a:p>
+        </p:txBody>
+      </p:sp>
+    </p:spTree>
+    <p:extLst>
+      <p:ext uri="{BB962C8B-B14F-4D97-AF65-F5344CB8AC3E}">
+        <p14:creationId xmlns:p14="http://schemas.microsoft.com/office/powerpoint/2010/main" val="2963935751"/>
+      </p:ext>
+    </p:extLst>
+  </p:cSld>
+  <p:clrMapOvr>
+    <a:masterClrMapping/>
+  </p:clrMapOvr>
+</p:notes>
+</file>
+
+<file path=ppt/notesSlides/notesSlide11.xml><?xml version="1.0" encoding="utf-8"?>
+<p:notes xmlns:a="http://schemas.openxmlformats.org/drawingml/2006/main" xmlns:r="http://schemas.openxmlformats.org/officeDocument/2006/relationships" xmlns:p="http://schemas.openxmlformats.org/presentationml/2006/main">
+  <p:cSld>
+    <p:spTree>
+      <p:nvGrpSpPr>
+        <p:cNvPr id="1" name=""/>
+        <p:cNvGrpSpPr/>
+        <p:nvPr/>
+      </p:nvGrpSpPr>
+      <p:grpSpPr>
+        <a:xfrm>
+          <a:off x="0" y="0"/>
+          <a:ext cx="0" cy="0"/>
+          <a:chOff x="0" y="0"/>
+          <a:chExt cx="0" cy="0"/>
+        </a:xfrm>
+      </p:grpSpPr>
+      <p:sp>
+        <p:nvSpPr>
+          <p:cNvPr id="2" name="Slide Image Placeholder 1"/>
+          <p:cNvSpPr>
+            <a:spLocks noGrp="1" noRot="1" noChangeAspect="1"/>
+          </p:cNvSpPr>
+          <p:nvPr>
+            <p:ph type="sldImg"/>
+          </p:nvPr>
+        </p:nvSpPr>
+        <p:spPr/>
+      </p:sp>
+      <p:sp>
+        <p:nvSpPr>
+          <p:cNvPr id="3" name="Notes Placeholder 2"/>
+          <p:cNvSpPr>
+            <a:spLocks noGrp="1"/>
+          </p:cNvSpPr>
+          <p:nvPr>
+            <p:ph type="body" idx="1"/>
+          </p:nvPr>
+        </p:nvSpPr>
+        <p:spPr/>
+        <p:txBody>
+          <a:bodyPr/>
+          <a:lstStyle/>
+          <a:p>
+            <a:pPr marL="171450" indent="-171450">
+              <a:buFont typeface="Arial" panose="020B0604020202020204" pitchFamily="34" charset="0"/>
+              <a:buChar char="•"/>
+            </a:pPr>
+            <a:endParaRPr lang="en-US" dirty="0"/>
+          </a:p>
+          <a:p>
+            <a:pPr marL="171450" indent="-171450">
+              <a:buFont typeface="Arial" panose="020B0604020202020204" pitchFamily="34" charset="0"/>
+              <a:buChar char="•"/>
+            </a:pPr>
+            <a:endParaRPr lang="en-US" dirty="0"/>
+          </a:p>
+        </p:txBody>
+      </p:sp>
+      <p:sp>
+        <p:nvSpPr>
+          <p:cNvPr id="4" name="Slide Number Placeholder 3"/>
+          <p:cNvSpPr>
+            <a:spLocks noGrp="1"/>
+          </p:cNvSpPr>
+          <p:nvPr>
+            <p:ph type="sldNum" sz="quarter" idx="5"/>
+          </p:nvPr>
+        </p:nvSpPr>
+        <p:spPr/>
+        <p:txBody>
+          <a:bodyPr/>
+          <a:lstStyle/>
+          <a:p>
+            <a:fld id="{A874FABB-6DBE-47C4-B626-20167906F475}" type="slidenum">
+              <a:rPr lang="en-US" smtClean="0"/>
+              <a:t>22</a:t>
+            </a:fld>
+            <a:endParaRPr lang="en-US"/>
+          </a:p>
+        </p:txBody>
+      </p:sp>
+    </p:spTree>
+    <p:extLst>
+      <p:ext uri="{BB962C8B-B14F-4D97-AF65-F5344CB8AC3E}">
+        <p14:creationId xmlns:p14="http://schemas.microsoft.com/office/powerpoint/2010/main" val="518241313"/>
+      </p:ext>
+    </p:extLst>
+  </p:cSld>
+  <p:clrMapOvr>
+    <a:masterClrMapping/>
+  </p:clrMapOvr>
+</p:notes>
+</file>
+
 <file path=ppt/notesSlides/notesSlide2.xml><?xml version="1.0" encoding="utf-8"?>
 <p:notes xmlns:a="http://schemas.openxmlformats.org/drawingml/2006/main" xmlns:r="http://schemas.openxmlformats.org/officeDocument/2006/relationships" xmlns:p="http://schemas.openxmlformats.org/presentationml/2006/main">
   <p:cSld>
@@ -1602,17 +1784,6 @@
           <a:bodyPr/>
           <a:lstStyle/>
           <a:p>
-            <a:pPr marL="171450" indent="-171450">
-              <a:buFont typeface="Arial" panose="020B0604020202020204" pitchFamily="34" charset="0"/>
-              <a:buChar char="•"/>
-            </a:pPr>
-            <a:endParaRPr lang="en-US" dirty="0"/>
-          </a:p>
-          <a:p>
-            <a:pPr marL="171450" indent="-171450">
-              <a:buFont typeface="Arial" panose="020B0604020202020204" pitchFamily="34" charset="0"/>
-              <a:buChar char="•"/>
-            </a:pPr>
             <a:endParaRPr lang="en-US" dirty="0"/>
           </a:p>
         </p:txBody>
@@ -1643,7 +1814,7 @@
     </p:spTree>
     <p:extLst>
       <p:ext uri="{BB962C8B-B14F-4D97-AF65-F5344CB8AC3E}">
-        <p14:creationId xmlns:p14="http://schemas.microsoft.com/office/powerpoint/2010/main" val="518241313"/>
+        <p14:creationId xmlns:p14="http://schemas.microsoft.com/office/powerpoint/2010/main" val="1471631124"/>
       </p:ext>
     </p:extLst>
   </p:cSld>
@@ -10506,7 +10677,7 @@
           </a:ln>
           <a:extLst>
             <a:ext uri="{C572A759-6A51-4108-AA02-DFA0A04FC94B}">
-              <ma14:wrappingTextBoxFlag xmlns="" xmlns:ma14="http://schemas.microsoft.com/office/mac/drawingml/2011/main" val="1"/>
+              <ma14:wrappingTextBoxFlag xmlns:ma14="http://schemas.microsoft.com/office/mac/drawingml/2011/main" xmlns="" val="1"/>
             </a:ext>
           </a:extLst>
         </p:spPr>
@@ -11740,6 +11911,210 @@
 </file>
 
 <file path=ppt/slideLayouts/slideLayout20.xml><?xml version="1.0" encoding="utf-8"?>
+<p:sldLayout xmlns:a="http://schemas.openxmlformats.org/drawingml/2006/main" xmlns:r="http://schemas.openxmlformats.org/officeDocument/2006/relationships" xmlns:p="http://schemas.openxmlformats.org/presentationml/2006/main" userDrawn="1">
+  <p:cSld name="Custom Layout">
+    <p:bg>
+      <p:bgPr>
+        <a:gradFill>
+          <a:gsLst>
+            <a:gs pos="0">
+              <a:srgbClr val="201F1F"/>
+            </a:gs>
+            <a:gs pos="100000">
+              <a:schemeClr val="accent3">
+                <a:lumMod val="30000"/>
+                <a:lumOff val="70000"/>
+              </a:schemeClr>
+            </a:gs>
+          </a:gsLst>
+          <a:lin ang="5400000" scaled="1"/>
+        </a:gradFill>
+        <a:effectLst/>
+      </p:bgPr>
+    </p:bg>
+    <p:spTree>
+      <p:nvGrpSpPr>
+        <p:cNvPr id="1" name=""/>
+        <p:cNvGrpSpPr/>
+        <p:nvPr/>
+      </p:nvGrpSpPr>
+      <p:grpSpPr>
+        <a:xfrm>
+          <a:off x="0" y="0"/>
+          <a:ext cx="0" cy="0"/>
+          <a:chOff x="0" y="0"/>
+          <a:chExt cx="0" cy="0"/>
+        </a:xfrm>
+      </p:grpSpPr>
+      <p:sp>
+        <p:nvSpPr>
+          <p:cNvPr id="3" name="Date Placeholder 2">
+            <a:extLst>
+              <a:ext uri="{FF2B5EF4-FFF2-40B4-BE49-F238E27FC236}">
+                <a16:creationId xmlns:a16="http://schemas.microsoft.com/office/drawing/2014/main" id="{2A8EF0D4-5A4F-4CA3-815C-00B7D6036031}"/>
+              </a:ext>
+            </a:extLst>
+          </p:cNvPr>
+          <p:cNvSpPr>
+            <a:spLocks noGrp="1"/>
+          </p:cNvSpPr>
+          <p:nvPr>
+            <p:ph type="dt" sz="half" idx="10"/>
+          </p:nvPr>
+        </p:nvSpPr>
+        <p:spPr/>
+        <p:txBody>
+          <a:bodyPr/>
+          <a:lstStyle/>
+          <a:p>
+            <a:fld id="{09AE1A03-4B70-45D5-96E7-D979506502C0}" type="datetimeFigureOut">
+              <a:rPr lang="en-US" smtClean="0"/>
+              <a:t>9/10/2020</a:t>
+            </a:fld>
+            <a:endParaRPr lang="en-US"/>
+          </a:p>
+        </p:txBody>
+      </p:sp>
+      <p:sp>
+        <p:nvSpPr>
+          <p:cNvPr id="4" name="Footer Placeholder 3">
+            <a:extLst>
+              <a:ext uri="{FF2B5EF4-FFF2-40B4-BE49-F238E27FC236}">
+                <a16:creationId xmlns:a16="http://schemas.microsoft.com/office/drawing/2014/main" id="{B622C660-C322-4D60-B12C-BC25E3473128}"/>
+              </a:ext>
+            </a:extLst>
+          </p:cNvPr>
+          <p:cNvSpPr>
+            <a:spLocks noGrp="1"/>
+          </p:cNvSpPr>
+          <p:nvPr>
+            <p:ph type="ftr" sz="quarter" idx="11"/>
+          </p:nvPr>
+        </p:nvSpPr>
+        <p:spPr/>
+        <p:txBody>
+          <a:bodyPr/>
+          <a:lstStyle/>
+          <a:p>
+            <a:endParaRPr lang="en-US"/>
+          </a:p>
+        </p:txBody>
+      </p:sp>
+      <p:sp>
+        <p:nvSpPr>
+          <p:cNvPr id="5" name="Slide Number Placeholder 4">
+            <a:extLst>
+              <a:ext uri="{FF2B5EF4-FFF2-40B4-BE49-F238E27FC236}">
+                <a16:creationId xmlns:a16="http://schemas.microsoft.com/office/drawing/2014/main" id="{93EA028D-F3A9-41D7-B152-7132EC1B614D}"/>
+              </a:ext>
+            </a:extLst>
+          </p:cNvPr>
+          <p:cNvSpPr>
+            <a:spLocks noGrp="1"/>
+          </p:cNvSpPr>
+          <p:nvPr>
+            <p:ph type="sldNum" sz="quarter" idx="12"/>
+          </p:nvPr>
+        </p:nvSpPr>
+        <p:spPr/>
+        <p:txBody>
+          <a:bodyPr/>
+          <a:lstStyle/>
+          <a:p>
+            <a:fld id="{A318FA14-1848-419C-88DC-1161D038E0A2}" type="slidenum">
+              <a:rPr lang="en-US" smtClean="0"/>
+              <a:t>‹#›</a:t>
+            </a:fld>
+            <a:endParaRPr lang="en-US"/>
+          </a:p>
+        </p:txBody>
+      </p:sp>
+      <p:pic>
+        <p:nvPicPr>
+          <p:cNvPr id="7" name="Picture 6">
+            <a:extLst>
+              <a:ext uri="{FF2B5EF4-FFF2-40B4-BE49-F238E27FC236}">
+                <a16:creationId xmlns:a16="http://schemas.microsoft.com/office/drawing/2014/main" id="{E3FD937A-B4B1-426E-81A9-2CEB5B719E08}"/>
+              </a:ext>
+            </a:extLst>
+          </p:cNvPr>
+          <p:cNvPicPr>
+            <a:picLocks noChangeAspect="1"/>
+          </p:cNvPicPr>
+          <p:nvPr userDrawn="1"/>
+        </p:nvPicPr>
+        <p:blipFill>
+          <a:blip r:embed="rId2" cstate="print">
+            <a:extLst>
+              <a:ext uri="{28A0092B-C50C-407E-A947-70E740481C1C}">
+                <a14:useLocalDpi xmlns:a14="http://schemas.microsoft.com/office/drawing/2010/main" val="0"/>
+              </a:ext>
+            </a:extLst>
+          </a:blip>
+          <a:stretch>
+            <a:fillRect/>
+          </a:stretch>
+        </p:blipFill>
+        <p:spPr>
+          <a:xfrm>
+            <a:off x="8213272" y="4767263"/>
+            <a:ext cx="800100" cy="281776"/>
+          </a:xfrm>
+          <a:prstGeom prst="rect">
+            <a:avLst/>
+          </a:prstGeom>
+        </p:spPr>
+      </p:pic>
+      <p:pic>
+        <p:nvPicPr>
+          <p:cNvPr id="6" name="Picture 5" descr="A picture containing drawing&#10;&#10;Description automatically generated">
+            <a:extLst>
+              <a:ext uri="{FF2B5EF4-FFF2-40B4-BE49-F238E27FC236}">
+                <a16:creationId xmlns:a16="http://schemas.microsoft.com/office/drawing/2014/main" id="{495973EE-5823-4A3C-AFA6-B39521E55738}"/>
+              </a:ext>
+            </a:extLst>
+          </p:cNvPr>
+          <p:cNvPicPr>
+            <a:picLocks noChangeAspect="1"/>
+          </p:cNvPicPr>
+          <p:nvPr userDrawn="1"/>
+        </p:nvPicPr>
+        <p:blipFill>
+          <a:blip r:embed="rId3" cstate="print">
+            <a:extLst>
+              <a:ext uri="{28A0092B-C50C-407E-A947-70E740481C1C}">
+                <a14:useLocalDpi xmlns:a14="http://schemas.microsoft.com/office/drawing/2010/main" val="0"/>
+              </a:ext>
+            </a:extLst>
+          </a:blip>
+          <a:stretch>
+            <a:fillRect/>
+          </a:stretch>
+        </p:blipFill>
+        <p:spPr>
+          <a:xfrm>
+            <a:off x="7715250" y="4699248"/>
+            <a:ext cx="409741" cy="409872"/>
+          </a:xfrm>
+          <a:prstGeom prst="rect">
+            <a:avLst/>
+          </a:prstGeom>
+        </p:spPr>
+      </p:pic>
+    </p:spTree>
+    <p:extLst>
+      <p:ext uri="{BB962C8B-B14F-4D97-AF65-F5344CB8AC3E}">
+        <p14:creationId xmlns:p14="http://schemas.microsoft.com/office/powerpoint/2010/main" val="4175218192"/>
+      </p:ext>
+    </p:extLst>
+  </p:cSld>
+  <p:clrMapOvr>
+    <a:masterClrMapping/>
+  </p:clrMapOvr>
+</p:sldLayout>
+</file>
+
+<file path=ppt/slideLayouts/slideLayout21.xml><?xml version="1.0" encoding="utf-8"?>
 <p:sldLayout xmlns:a="http://schemas.openxmlformats.org/drawingml/2006/main" xmlns:r="http://schemas.openxmlformats.org/officeDocument/2006/relationships" xmlns:p="http://schemas.openxmlformats.org/presentationml/2006/main" preserve="1" userDrawn="1">
   <p:cSld name="Breaker - EPAM Blue">
     <p:spTree>
@@ -11823,7 +12198,7 @@
 </p:sldLayout>
 </file>
 
-<file path=ppt/slideLayouts/slideLayout21.xml><?xml version="1.0" encoding="utf-8"?>
+<file path=ppt/slideLayouts/slideLayout22.xml><?xml version="1.0" encoding="utf-8"?>
 <p:sldLayout xmlns:a="http://schemas.openxmlformats.org/drawingml/2006/main" xmlns:r="http://schemas.openxmlformats.org/officeDocument/2006/relationships" xmlns:p="http://schemas.openxmlformats.org/presentationml/2006/main" preserve="1" userDrawn="1">
   <p:cSld name="Breaker - Bright Blue">
     <p:bg>
@@ -11913,7 +12288,7 @@
 </p:sldLayout>
 </file>
 
-<file path=ppt/slideLayouts/slideLayout22.xml><?xml version="1.0" encoding="utf-8"?>
+<file path=ppt/slideLayouts/slideLayout23.xml><?xml version="1.0" encoding="utf-8"?>
 <p:sldLayout xmlns:a="http://schemas.openxmlformats.org/drawingml/2006/main" xmlns:r="http://schemas.openxmlformats.org/officeDocument/2006/relationships" xmlns:p="http://schemas.openxmlformats.org/presentationml/2006/main" preserve="1" userDrawn="1">
   <p:cSld name="Breaker - Lime Green">
     <p:bg>
@@ -12003,7 +12378,7 @@
 </p:sldLayout>
 </file>
 
-<file path=ppt/slideLayouts/slideLayout23.xml><?xml version="1.0" encoding="utf-8"?>
+<file path=ppt/slideLayouts/slideLayout24.xml><?xml version="1.0" encoding="utf-8"?>
 <p:sldLayout xmlns:a="http://schemas.openxmlformats.org/drawingml/2006/main" xmlns:r="http://schemas.openxmlformats.org/officeDocument/2006/relationships" xmlns:p="http://schemas.openxmlformats.org/presentationml/2006/main" preserve="1" userDrawn="1">
   <p:cSld name="Breaker - Coral">
     <p:bg>
@@ -12093,7 +12468,7 @@
 </p:sldLayout>
 </file>
 
-<file path=ppt/slideLayouts/slideLayout24.xml><?xml version="1.0" encoding="utf-8"?>
+<file path=ppt/slideLayouts/slideLayout25.xml><?xml version="1.0" encoding="utf-8"?>
 <p:sldLayout xmlns:a="http://schemas.openxmlformats.org/drawingml/2006/main" xmlns:r="http://schemas.openxmlformats.org/officeDocument/2006/relationships" xmlns:p="http://schemas.openxmlformats.org/presentationml/2006/main" userDrawn="1">
   <p:cSld name="Blank">
     <p:spTree>
@@ -12155,6 +12530,138 @@
     <p:extLst>
       <p:ext uri="{BB962C8B-B14F-4D97-AF65-F5344CB8AC3E}">
         <p14:creationId xmlns:p14="http://schemas.microsoft.com/office/powerpoint/2010/main" val="3335397590"/>
+      </p:ext>
+    </p:extLst>
+  </p:cSld>
+  <p:clrMapOvr>
+    <a:masterClrMapping/>
+  </p:clrMapOvr>
+</p:sldLayout>
+</file>
+
+<file path=ppt/slideLayouts/slideLayout26.xml><?xml version="1.0" encoding="utf-8"?>
+<p:sldLayout xmlns:a="http://schemas.openxmlformats.org/drawingml/2006/main" xmlns:r="http://schemas.openxmlformats.org/officeDocument/2006/relationships" xmlns:p="http://schemas.openxmlformats.org/presentationml/2006/main" userDrawn="1">
+  <p:cSld name="Title Only">
+    <p:spTree>
+      <p:nvGrpSpPr>
+        <p:cNvPr id="1" name=""/>
+        <p:cNvGrpSpPr/>
+        <p:nvPr/>
+      </p:nvGrpSpPr>
+      <p:grpSpPr>
+        <a:xfrm>
+          <a:off x="0" y="0"/>
+          <a:ext cx="0" cy="0"/>
+          <a:chOff x="0" y="0"/>
+          <a:chExt cx="0" cy="0"/>
+        </a:xfrm>
+      </p:grpSpPr>
+      <p:sp>
+        <p:nvSpPr>
+          <p:cNvPr id="2" name="Title 1"/>
+          <p:cNvSpPr>
+            <a:spLocks noGrp="1"/>
+          </p:cNvSpPr>
+          <p:nvPr>
+            <p:ph type="title" hasCustomPrompt="1"/>
+          </p:nvPr>
+        </p:nvSpPr>
+        <p:spPr/>
+        <p:txBody>
+          <a:bodyPr/>
+          <a:lstStyle/>
+          <a:p>
+            <a:r>
+              <a:rPr lang="en-US" dirty="0"/>
+              <a:t>Please Add Slide Headline Here</a:t>
+            </a:r>
+          </a:p>
+        </p:txBody>
+      </p:sp>
+      <p:cxnSp>
+        <p:nvCxnSpPr>
+          <p:cNvPr id="4" name="Straight Connector 3"/>
+          <p:cNvCxnSpPr/>
+          <p:nvPr userDrawn="1"/>
+        </p:nvCxnSpPr>
+        <p:spPr>
+          <a:xfrm>
+            <a:off x="294409" y="716437"/>
+            <a:ext cx="8555182" cy="0"/>
+          </a:xfrm>
+          <a:prstGeom prst="line">
+            <a:avLst/>
+          </a:prstGeom>
+          <a:ln w="19050" cmpd="sng">
+            <a:solidFill>
+              <a:schemeClr val="bg2">
+                <a:lumMod val="20000"/>
+                <a:lumOff val="80000"/>
+              </a:schemeClr>
+            </a:solidFill>
+          </a:ln>
+          <a:effectLst/>
+        </p:spPr>
+        <p:style>
+          <a:lnRef idx="2">
+            <a:schemeClr val="accent1"/>
+          </a:lnRef>
+          <a:fillRef idx="0">
+            <a:schemeClr val="accent1"/>
+          </a:fillRef>
+          <a:effectRef idx="1">
+            <a:schemeClr val="accent1"/>
+          </a:effectRef>
+          <a:fontRef idx="minor">
+            <a:schemeClr val="tx1"/>
+          </a:fontRef>
+        </p:style>
+      </p:cxnSp>
+      <p:sp>
+        <p:nvSpPr>
+          <p:cNvPr id="8" name="Slide Number Placeholder 1"/>
+          <p:cNvSpPr>
+            <a:spLocks noGrp="1"/>
+          </p:cNvSpPr>
+          <p:nvPr>
+            <p:ph type="sldNum" sz="quarter" idx="4"/>
+          </p:nvPr>
+        </p:nvSpPr>
+        <p:spPr>
+          <a:xfrm>
+            <a:off x="7413441" y="4826639"/>
+            <a:ext cx="1373372" cy="316862"/>
+          </a:xfrm>
+          <a:prstGeom prst="rect">
+            <a:avLst/>
+          </a:prstGeom>
+        </p:spPr>
+        <p:txBody>
+          <a:bodyPr vert="horz" wrap="none" lIns="91440" tIns="45720" rIns="0" bIns="82296" rtlCol="0" anchor="ctr"/>
+          <a:lstStyle>
+            <a:lvl1pPr algn="r">
+              <a:defRPr sz="800" b="1" i="0">
+                <a:solidFill>
+                  <a:srgbClr val="FEFEFE"/>
+                </a:solidFill>
+                <a:latin typeface="+mj-lt"/>
+              </a:defRPr>
+            </a:lvl1pPr>
+          </a:lstStyle>
+          <a:p>
+            <a:fld id="{3A707DD9-E92B-45E8-BE0A-E6B2EDF345EB}" type="slidenum">
+              <a:rPr lang="en-US" smtClean="0"/>
+              <a:pPr/>
+              <a:t>‹#›</a:t>
+            </a:fld>
+            <a:endParaRPr lang="en-US" dirty="0"/>
+          </a:p>
+        </p:txBody>
+      </p:sp>
+    </p:spTree>
+    <p:extLst>
+      <p:ext uri="{BB962C8B-B14F-4D97-AF65-F5344CB8AC3E}">
+        <p14:creationId xmlns:p14="http://schemas.microsoft.com/office/powerpoint/2010/main" val="851724290"/>
       </p:ext>
     </p:extLst>
   </p:cSld>
@@ -21546,7 +22053,7 @@
           <p:nvPr userDrawn="1"/>
         </p:nvPicPr>
         <p:blipFill>
-          <a:blip r:embed="rId18" cstate="screen">
+          <a:blip r:embed="rId19" cstate="screen">
             <a:extLst>
               <a:ext uri="{28A0092B-C50C-407E-A947-70E740481C1C}">
                 <a14:useLocalDpi xmlns:a14="http://schemas.microsoft.com/office/drawing/2010/main"/>
@@ -21737,6 +22244,7 @@
     <p:sldLayoutId id="2147483690" r:id="rId14"/>
     <p:sldLayoutId id="2147483697" r:id="rId15"/>
     <p:sldLayoutId id="2147483691" r:id="rId16"/>
+    <p:sldLayoutId id="2147483700" r:id="rId17"/>
   </p:sldLayoutIdLst>
   <p:hf hdr="0" ftr="0" dt="0"/>
   <p:txStyles>
@@ -22209,7 +22717,7 @@
           <p:nvPr userDrawn="1"/>
         </p:nvPicPr>
         <p:blipFill>
-          <a:blip r:embed="rId7" cstate="screen">
+          <a:blip r:embed="rId8" cstate="screen">
             <a:extLst>
               <a:ext uri="{28A0092B-C50C-407E-A947-70E740481C1C}">
                 <a14:useLocalDpi xmlns:a14="http://schemas.microsoft.com/office/drawing/2010/main"/>
@@ -22316,6 +22824,7 @@
     <p:sldLayoutId id="2147483667" r:id="rId3"/>
     <p:sldLayoutId id="2147483668" r:id="rId4"/>
     <p:sldLayoutId id="2147483698" r:id="rId5"/>
+    <p:sldLayoutId id="2147483699" r:id="rId6"/>
   </p:sldLayoutIdLst>
   <p:hf hdr="0" ftr="0" dt="0"/>
   <p:txStyles>
@@ -25246,13 +25755,13 @@
   <p:clrMapOvr>
     <a:masterClrMapping/>
   </p:clrMapOvr>
-  <mc:AlternateContent xmlns:mc="http://schemas.openxmlformats.org/markup-compatibility/2006">
-    <mc:Choice xmlns:p159="http://schemas.microsoft.com/office/powerpoint/2015/09/main" Requires="p159">
+  <mc:AlternateContent xmlns:mc="http://schemas.openxmlformats.org/markup-compatibility/2006" xmlns:p159="http://schemas.microsoft.com/office/powerpoint/2015/09/main">
+    <mc:Choice Requires="p159">
       <p:transition xmlns:p14="http://schemas.microsoft.com/office/powerpoint/2010/main" spd="slow" p14:dur="2000">
         <p159:morph option="byObject"/>
       </p:transition>
     </mc:Choice>
-    <mc:Fallback>
+    <mc:Fallback xmlns="">
       <p:transition spd="slow">
         <p:fade/>
       </p:transition>
@@ -26283,13 +26792,13 @@
   <p:clrMapOvr>
     <a:masterClrMapping/>
   </p:clrMapOvr>
-  <mc:AlternateContent xmlns:mc="http://schemas.openxmlformats.org/markup-compatibility/2006">
-    <mc:Choice xmlns:p159="http://schemas.microsoft.com/office/powerpoint/2015/09/main" Requires="p159">
+  <mc:AlternateContent xmlns:mc="http://schemas.openxmlformats.org/markup-compatibility/2006" xmlns:p159="http://schemas.microsoft.com/office/powerpoint/2015/09/main">
+    <mc:Choice Requires="p159">
       <p:transition xmlns:p14="http://schemas.microsoft.com/office/powerpoint/2010/main" spd="slow" p14:dur="2000">
         <p159:morph option="byObject"/>
       </p:transition>
     </mc:Choice>
-    <mc:Fallback>
+    <mc:Fallback xmlns="">
       <p:transition spd="slow">
         <p:fade/>
       </p:transition>
@@ -26566,6 +27075,2470 @@
       </p:grpSpPr>
       <p:sp>
         <p:nvSpPr>
+          <p:cNvPr id="3" name="Title 2">
+            <a:extLst>
+              <a:ext uri="{FF2B5EF4-FFF2-40B4-BE49-F238E27FC236}">
+                <a16:creationId xmlns:a16="http://schemas.microsoft.com/office/drawing/2014/main" id="{ADB04B0B-004D-4B94-8A06-4CFB0B4C2EF3}"/>
+              </a:ext>
+            </a:extLst>
+          </p:cNvPr>
+          <p:cNvSpPr>
+            <a:spLocks noGrp="1"/>
+          </p:cNvSpPr>
+          <p:nvPr>
+            <p:ph type="title"/>
+          </p:nvPr>
+        </p:nvSpPr>
+        <p:spPr/>
+        <p:txBody>
+          <a:bodyPr/>
+          <a:lstStyle/>
+          <a:p>
+            <a:r>
+              <a:rPr lang="en-US" dirty="0"/>
+              <a:t>MOCKING</a:t>
+            </a:r>
+          </a:p>
+        </p:txBody>
+      </p:sp>
+      <p:sp>
+        <p:nvSpPr>
+          <p:cNvPr id="5" name="Rectangle: Rounded Corners 4">
+            <a:extLst>
+              <a:ext uri="{FF2B5EF4-FFF2-40B4-BE49-F238E27FC236}">
+                <a16:creationId xmlns:a16="http://schemas.microsoft.com/office/drawing/2014/main" id="{CBECB622-85F3-4346-B492-B0937EC9B9D4}"/>
+              </a:ext>
+            </a:extLst>
+          </p:cNvPr>
+          <p:cNvSpPr/>
+          <p:nvPr/>
+        </p:nvSpPr>
+        <p:spPr>
+          <a:xfrm>
+            <a:off x="2694607" y="1584562"/>
+            <a:ext cx="1003721" cy="615719"/>
+          </a:xfrm>
+          <a:prstGeom prst="roundRect">
+            <a:avLst/>
+          </a:prstGeom>
+        </p:spPr>
+        <p:style>
+          <a:lnRef idx="2">
+            <a:schemeClr val="accent3">
+              <a:shade val="50000"/>
+            </a:schemeClr>
+          </a:lnRef>
+          <a:fillRef idx="1">
+            <a:schemeClr val="accent3"/>
+          </a:fillRef>
+          <a:effectRef idx="0">
+            <a:schemeClr val="accent3"/>
+          </a:effectRef>
+          <a:fontRef idx="minor">
+            <a:schemeClr val="lt1"/>
+          </a:fontRef>
+        </p:style>
+        <p:txBody>
+          <a:bodyPr rtlCol="0" anchor="ctr"/>
+          <a:lstStyle/>
+          <a:p>
+            <a:pPr algn="ctr"/>
+            <a:r>
+              <a:rPr lang="en-US" dirty="0"/>
+              <a:t>Cart</a:t>
+            </a:r>
+          </a:p>
+        </p:txBody>
+      </p:sp>
+      <p:sp>
+        <p:nvSpPr>
+          <p:cNvPr id="9" name="Rectangle: Rounded Corners 8">
+            <a:extLst>
+              <a:ext uri="{FF2B5EF4-FFF2-40B4-BE49-F238E27FC236}">
+                <a16:creationId xmlns:a16="http://schemas.microsoft.com/office/drawing/2014/main" id="{E96E4BAB-7861-4323-94E7-CB95E4C1DB73}"/>
+              </a:ext>
+            </a:extLst>
+          </p:cNvPr>
+          <p:cNvSpPr/>
+          <p:nvPr/>
+        </p:nvSpPr>
+        <p:spPr>
+          <a:xfrm>
+            <a:off x="4839738" y="1584562"/>
+            <a:ext cx="1133214" cy="615719"/>
+          </a:xfrm>
+          <a:prstGeom prst="roundRect">
+            <a:avLst/>
+          </a:prstGeom>
+        </p:spPr>
+        <p:style>
+          <a:lnRef idx="2">
+            <a:schemeClr val="accent2">
+              <a:shade val="50000"/>
+            </a:schemeClr>
+          </a:lnRef>
+          <a:fillRef idx="1">
+            <a:schemeClr val="accent2"/>
+          </a:fillRef>
+          <a:effectRef idx="0">
+            <a:schemeClr val="accent2"/>
+          </a:effectRef>
+          <a:fontRef idx="minor">
+            <a:schemeClr val="lt1"/>
+          </a:fontRef>
+        </p:style>
+        <p:txBody>
+          <a:bodyPr rtlCol="0" anchor="ctr"/>
+          <a:lstStyle/>
+          <a:p>
+            <a:pPr algn="ctr"/>
+            <a:r>
+              <a:rPr lang="en-US" dirty="0"/>
+              <a:t>Warehouse</a:t>
+            </a:r>
+          </a:p>
+          <a:p>
+            <a:pPr algn="ctr"/>
+            <a:r>
+              <a:rPr lang="en-US" dirty="0"/>
+              <a:t>Service</a:t>
+            </a:r>
+          </a:p>
+        </p:txBody>
+      </p:sp>
+      <p:cxnSp>
+        <p:nvCxnSpPr>
+          <p:cNvPr id="10" name="Straight Connector 9">
+            <a:extLst>
+              <a:ext uri="{FF2B5EF4-FFF2-40B4-BE49-F238E27FC236}">
+                <a16:creationId xmlns:a16="http://schemas.microsoft.com/office/drawing/2014/main" id="{9E75CE0D-8E35-498B-B657-04BFADD06FCD}"/>
+              </a:ext>
+            </a:extLst>
+          </p:cNvPr>
+          <p:cNvCxnSpPr>
+            <a:cxnSpLocks/>
+            <a:stCxn id="5" idx="3"/>
+            <a:endCxn id="9" idx="1"/>
+          </p:cNvCxnSpPr>
+          <p:nvPr/>
+        </p:nvCxnSpPr>
+        <p:spPr>
+          <a:xfrm>
+            <a:off x="3698328" y="1892422"/>
+            <a:ext cx="1141410" cy="0"/>
+          </a:xfrm>
+          <a:prstGeom prst="line">
+            <a:avLst/>
+          </a:prstGeom>
+          <a:ln w="28575">
+            <a:prstDash val="dash"/>
+          </a:ln>
+        </p:spPr>
+        <p:style>
+          <a:lnRef idx="1">
+            <a:schemeClr val="accent2"/>
+          </a:lnRef>
+          <a:fillRef idx="0">
+            <a:schemeClr val="accent2"/>
+          </a:fillRef>
+          <a:effectRef idx="0">
+            <a:schemeClr val="accent2"/>
+          </a:effectRef>
+          <a:fontRef idx="minor">
+            <a:schemeClr val="tx1"/>
+          </a:fontRef>
+        </p:style>
+      </p:cxnSp>
+      <p:sp>
+        <p:nvSpPr>
+          <p:cNvPr id="2" name="Rectangle: Rounded Corners 1">
+            <a:extLst>
+              <a:ext uri="{FF2B5EF4-FFF2-40B4-BE49-F238E27FC236}">
+                <a16:creationId xmlns:a16="http://schemas.microsoft.com/office/drawing/2014/main" id="{23E3CE41-7F01-4201-B52D-690A041D137C}"/>
+              </a:ext>
+            </a:extLst>
+          </p:cNvPr>
+          <p:cNvSpPr/>
+          <p:nvPr/>
+        </p:nvSpPr>
+        <p:spPr>
+          <a:xfrm>
+            <a:off x="4839738" y="3187469"/>
+            <a:ext cx="1133214" cy="615719"/>
+          </a:xfrm>
+          <a:prstGeom prst="roundRect">
+            <a:avLst/>
+          </a:prstGeom>
+        </p:spPr>
+        <p:style>
+          <a:lnRef idx="2">
+            <a:schemeClr val="accent4">
+              <a:shade val="50000"/>
+            </a:schemeClr>
+          </a:lnRef>
+          <a:fillRef idx="1">
+            <a:schemeClr val="accent4"/>
+          </a:fillRef>
+          <a:effectRef idx="0">
+            <a:schemeClr val="accent4"/>
+          </a:effectRef>
+          <a:fontRef idx="minor">
+            <a:schemeClr val="lt1"/>
+          </a:fontRef>
+        </p:style>
+        <p:txBody>
+          <a:bodyPr rtlCol="0" anchor="ctr"/>
+          <a:lstStyle/>
+          <a:p>
+            <a:pPr algn="ctr"/>
+            <a:r>
+              <a:rPr lang="en-US" dirty="0"/>
+              <a:t>Warehouse</a:t>
+            </a:r>
+          </a:p>
+          <a:p>
+            <a:pPr algn="ctr"/>
+            <a:r>
+              <a:rPr lang="en-US" dirty="0"/>
+              <a:t>Mock</a:t>
+            </a:r>
+          </a:p>
+        </p:txBody>
+      </p:sp>
+      <p:sp>
+        <p:nvSpPr>
+          <p:cNvPr id="8" name="Rectangle: Rounded Corners 7">
+            <a:extLst>
+              <a:ext uri="{FF2B5EF4-FFF2-40B4-BE49-F238E27FC236}">
+                <a16:creationId xmlns:a16="http://schemas.microsoft.com/office/drawing/2014/main" id="{DF4344AF-27AA-4A6E-A153-60C58A37831F}"/>
+              </a:ext>
+            </a:extLst>
+          </p:cNvPr>
+          <p:cNvSpPr/>
+          <p:nvPr/>
+        </p:nvSpPr>
+        <p:spPr>
+          <a:xfrm>
+            <a:off x="6951842" y="3209393"/>
+            <a:ext cx="1003721" cy="615719"/>
+          </a:xfrm>
+          <a:prstGeom prst="roundRect">
+            <a:avLst/>
+          </a:prstGeom>
+        </p:spPr>
+        <p:style>
+          <a:lnRef idx="2">
+            <a:schemeClr val="accent4">
+              <a:shade val="50000"/>
+            </a:schemeClr>
+          </a:lnRef>
+          <a:fillRef idx="1">
+            <a:schemeClr val="accent4"/>
+          </a:fillRef>
+          <a:effectRef idx="0">
+            <a:schemeClr val="accent4"/>
+          </a:effectRef>
+          <a:fontRef idx="minor">
+            <a:schemeClr val="lt1"/>
+          </a:fontRef>
+        </p:style>
+        <p:txBody>
+          <a:bodyPr rtlCol="0" anchor="ctr"/>
+          <a:lstStyle/>
+          <a:p>
+            <a:pPr algn="ctr"/>
+            <a:endParaRPr lang="en-US" dirty="0"/>
+          </a:p>
+        </p:txBody>
+      </p:sp>
+      <p:sp>
+        <p:nvSpPr>
+          <p:cNvPr id="11" name="Arrow: Curved Right 10">
+            <a:extLst>
+              <a:ext uri="{FF2B5EF4-FFF2-40B4-BE49-F238E27FC236}">
+                <a16:creationId xmlns:a16="http://schemas.microsoft.com/office/drawing/2014/main" id="{8DE35EFD-BBD5-4248-BAD7-FB9888357213}"/>
+              </a:ext>
+            </a:extLst>
+          </p:cNvPr>
+          <p:cNvSpPr/>
+          <p:nvPr/>
+        </p:nvSpPr>
+        <p:spPr>
+          <a:xfrm rot="5400000">
+            <a:off x="6124905" y="1948374"/>
+            <a:ext cx="326165" cy="2030493"/>
+          </a:xfrm>
+          <a:prstGeom prst="curvedRightArrow">
+            <a:avLst/>
+          </a:prstGeom>
+        </p:spPr>
+        <p:style>
+          <a:lnRef idx="2">
+            <a:schemeClr val="accent2">
+              <a:shade val="50000"/>
+            </a:schemeClr>
+          </a:lnRef>
+          <a:fillRef idx="1">
+            <a:schemeClr val="accent2"/>
+          </a:fillRef>
+          <a:effectRef idx="0">
+            <a:schemeClr val="accent2"/>
+          </a:effectRef>
+          <a:fontRef idx="minor">
+            <a:schemeClr val="lt1"/>
+          </a:fontRef>
+        </p:style>
+        <p:txBody>
+          <a:bodyPr rtlCol="0" anchor="ctr"/>
+          <a:lstStyle/>
+          <a:p>
+            <a:pPr algn="ctr"/>
+            <a:endParaRPr lang="en-US">
+              <a:solidFill>
+                <a:schemeClr val="tx1"/>
+              </a:solidFill>
+            </a:endParaRPr>
+          </a:p>
+        </p:txBody>
+      </p:sp>
+      <p:sp>
+        <p:nvSpPr>
+          <p:cNvPr id="12" name="Arrow: Curved Right 11">
+            <a:extLst>
+              <a:ext uri="{FF2B5EF4-FFF2-40B4-BE49-F238E27FC236}">
+                <a16:creationId xmlns:a16="http://schemas.microsoft.com/office/drawing/2014/main" id="{E2921031-ABAD-4615-9F25-F018B5D4A2B4}"/>
+              </a:ext>
+            </a:extLst>
+          </p:cNvPr>
+          <p:cNvSpPr/>
+          <p:nvPr/>
+        </p:nvSpPr>
+        <p:spPr>
+          <a:xfrm rot="16200000">
+            <a:off x="6198406" y="3055638"/>
+            <a:ext cx="326165" cy="2030493"/>
+          </a:xfrm>
+          <a:prstGeom prst="curvedRightArrow">
+            <a:avLst/>
+          </a:prstGeom>
+        </p:spPr>
+        <p:style>
+          <a:lnRef idx="2">
+            <a:schemeClr val="accent2">
+              <a:shade val="50000"/>
+            </a:schemeClr>
+          </a:lnRef>
+          <a:fillRef idx="1">
+            <a:schemeClr val="accent2"/>
+          </a:fillRef>
+          <a:effectRef idx="0">
+            <a:schemeClr val="accent2"/>
+          </a:effectRef>
+          <a:fontRef idx="minor">
+            <a:schemeClr val="lt1"/>
+          </a:fontRef>
+        </p:style>
+        <p:txBody>
+          <a:bodyPr rtlCol="0" anchor="ctr"/>
+          <a:lstStyle/>
+          <a:p>
+            <a:pPr algn="ctr"/>
+            <a:endParaRPr lang="en-US">
+              <a:solidFill>
+                <a:schemeClr val="tx1"/>
+              </a:solidFill>
+            </a:endParaRPr>
+          </a:p>
+        </p:txBody>
+      </p:sp>
+      <p:pic>
+        <p:nvPicPr>
+          <p:cNvPr id="13" name="Picture 2" descr="JUnit – About">
+            <a:extLst>
+              <a:ext uri="{FF2B5EF4-FFF2-40B4-BE49-F238E27FC236}">
+                <a16:creationId xmlns:a16="http://schemas.microsoft.com/office/drawing/2014/main" id="{F8BA84E2-D064-4373-8586-86D773FA0757}"/>
+              </a:ext>
+            </a:extLst>
+          </p:cNvPr>
+          <p:cNvPicPr>
+            <a:picLocks noChangeAspect="1" noChangeArrowheads="1"/>
+          </p:cNvPicPr>
+          <p:nvPr/>
+        </p:nvPicPr>
+        <p:blipFill>
+          <a:blip r:embed="rId3" cstate="print">
+            <a:extLst>
+              <a:ext uri="{28A0092B-C50C-407E-A947-70E740481C1C}">
+                <a14:useLocalDpi xmlns:a14="http://schemas.microsoft.com/office/drawing/2010/main" val="0"/>
+              </a:ext>
+            </a:extLst>
+          </a:blip>
+          <a:srcRect/>
+          <a:stretch>
+            <a:fillRect/>
+          </a:stretch>
+        </p:blipFill>
+        <p:spPr bwMode="auto">
+          <a:xfrm>
+            <a:off x="7035660" y="3389517"/>
+            <a:ext cx="836085" cy="255471"/>
+          </a:xfrm>
+          <a:prstGeom prst="rect">
+            <a:avLst/>
+          </a:prstGeom>
+          <a:noFill/>
+          <a:extLst>
+            <a:ext uri="{909E8E84-426E-40DD-AFC4-6F175D3DCCD1}">
+              <a14:hiddenFill xmlns:a14="http://schemas.microsoft.com/office/drawing/2010/main">
+                <a:solidFill>
+                  <a:srgbClr val="FFFFFF"/>
+                </a:solidFill>
+              </a14:hiddenFill>
+            </a:ext>
+          </a:extLst>
+        </p:spPr>
+      </p:pic>
+      <p:pic>
+        <p:nvPicPr>
+          <p:cNvPr id="14" name="Graphic 13" descr="Exclamation mark">
+            <a:extLst>
+              <a:ext uri="{FF2B5EF4-FFF2-40B4-BE49-F238E27FC236}">
+                <a16:creationId xmlns:a16="http://schemas.microsoft.com/office/drawing/2014/main" id="{74BACFE7-1AB2-4490-8C9B-CE08E59A32F1}"/>
+              </a:ext>
+            </a:extLst>
+          </p:cNvPr>
+          <p:cNvPicPr>
+            <a:picLocks noChangeAspect="1"/>
+          </p:cNvPicPr>
+          <p:nvPr/>
+        </p:nvPicPr>
+        <p:blipFill>
+          <a:blip r:embed="rId4">
+            <a:extLst>
+              <a:ext uri="{28A0092B-C50C-407E-A947-70E740481C1C}">
+                <a14:useLocalDpi xmlns:a14="http://schemas.microsoft.com/office/drawing/2010/main" val="0"/>
+              </a:ext>
+              <a:ext uri="{96DAC541-7B7A-43D3-8B79-37D633B846F1}">
+                <asvg:svgBlip xmlns:asvg="http://schemas.microsoft.com/office/drawing/2016/SVG/main" r:embed="rId5"/>
+              </a:ext>
+            </a:extLst>
+          </a:blip>
+          <a:stretch>
+            <a:fillRect/>
+          </a:stretch>
+        </p:blipFill>
+        <p:spPr>
+          <a:xfrm>
+            <a:off x="6143280" y="3789221"/>
+            <a:ext cx="436418" cy="436418"/>
+          </a:xfrm>
+          <a:prstGeom prst="rect">
+            <a:avLst/>
+          </a:prstGeom>
+        </p:spPr>
+      </p:pic>
+      <p:sp>
+        <p:nvSpPr>
+          <p:cNvPr id="17" name="Arrow: Curved Right 16">
+            <a:extLst>
+              <a:ext uri="{FF2B5EF4-FFF2-40B4-BE49-F238E27FC236}">
+                <a16:creationId xmlns:a16="http://schemas.microsoft.com/office/drawing/2014/main" id="{CD6F2D06-F092-45DB-A67E-DE8BC185BF57}"/>
+              </a:ext>
+            </a:extLst>
+          </p:cNvPr>
+          <p:cNvSpPr/>
+          <p:nvPr/>
+        </p:nvSpPr>
+        <p:spPr>
+          <a:xfrm rot="6538903">
+            <a:off x="4956133" y="-788939"/>
+            <a:ext cx="1198305" cy="5009972"/>
+          </a:xfrm>
+          <a:prstGeom prst="curvedRightArrow">
+            <a:avLst>
+              <a:gd name="adj1" fmla="val 6155"/>
+              <a:gd name="adj2" fmla="val 21345"/>
+              <a:gd name="adj3" fmla="val 16936"/>
+            </a:avLst>
+          </a:prstGeom>
+        </p:spPr>
+        <p:style>
+          <a:lnRef idx="2">
+            <a:schemeClr val="accent2">
+              <a:shade val="50000"/>
+            </a:schemeClr>
+          </a:lnRef>
+          <a:fillRef idx="1">
+            <a:schemeClr val="accent2"/>
+          </a:fillRef>
+          <a:effectRef idx="0">
+            <a:schemeClr val="accent2"/>
+          </a:effectRef>
+          <a:fontRef idx="minor">
+            <a:schemeClr val="lt1"/>
+          </a:fontRef>
+        </p:style>
+        <p:txBody>
+          <a:bodyPr rtlCol="0" anchor="ctr"/>
+          <a:lstStyle/>
+          <a:p>
+            <a:pPr algn="ctr"/>
+            <a:endParaRPr lang="en-US">
+              <a:solidFill>
+                <a:schemeClr val="tx1"/>
+              </a:solidFill>
+            </a:endParaRPr>
+          </a:p>
+        </p:txBody>
+      </p:sp>
+      <p:pic>
+        <p:nvPicPr>
+          <p:cNvPr id="18" name="Graphic 17" descr="Question Mark">
+            <a:extLst>
+              <a:ext uri="{FF2B5EF4-FFF2-40B4-BE49-F238E27FC236}">
+                <a16:creationId xmlns:a16="http://schemas.microsoft.com/office/drawing/2014/main" id="{B579B520-7140-4B8C-8B44-F99C8DB3967F}"/>
+              </a:ext>
+            </a:extLst>
+          </p:cNvPr>
+          <p:cNvPicPr>
+            <a:picLocks noChangeAspect="1"/>
+          </p:cNvPicPr>
+          <p:nvPr/>
+        </p:nvPicPr>
+        <p:blipFill>
+          <a:blip r:embed="rId6">
+            <a:extLst>
+              <a:ext uri="{28A0092B-C50C-407E-A947-70E740481C1C}">
+                <a14:useLocalDpi xmlns:a14="http://schemas.microsoft.com/office/drawing/2010/main" val="0"/>
+              </a:ext>
+              <a:ext uri="{96DAC541-7B7A-43D3-8B79-37D633B846F1}">
+                <asvg:svgBlip xmlns:asvg="http://schemas.microsoft.com/office/drawing/2016/SVG/main" r:embed="rId7"/>
+              </a:ext>
+            </a:extLst>
+          </a:blip>
+          <a:stretch>
+            <a:fillRect/>
+          </a:stretch>
+        </p:blipFill>
+        <p:spPr>
+          <a:xfrm>
+            <a:off x="5925070" y="838186"/>
+            <a:ext cx="436418" cy="436418"/>
+          </a:xfrm>
+          <a:prstGeom prst="rect">
+            <a:avLst/>
+          </a:prstGeom>
+        </p:spPr>
+      </p:pic>
+      <p:cxnSp>
+        <p:nvCxnSpPr>
+          <p:cNvPr id="22" name="Straight Connector 21">
+            <a:extLst>
+              <a:ext uri="{FF2B5EF4-FFF2-40B4-BE49-F238E27FC236}">
+                <a16:creationId xmlns:a16="http://schemas.microsoft.com/office/drawing/2014/main" id="{89490DFD-11FD-4760-A766-716C81645AAE}"/>
+              </a:ext>
+            </a:extLst>
+          </p:cNvPr>
+          <p:cNvCxnSpPr>
+            <a:cxnSpLocks/>
+            <a:stCxn id="5" idx="3"/>
+            <a:endCxn id="2" idx="1"/>
+          </p:cNvCxnSpPr>
+          <p:nvPr/>
+        </p:nvCxnSpPr>
+        <p:spPr>
+          <a:xfrm>
+            <a:off x="3698328" y="1892422"/>
+            <a:ext cx="1141410" cy="1602907"/>
+          </a:xfrm>
+          <a:prstGeom prst="line">
+            <a:avLst/>
+          </a:prstGeom>
+          <a:ln w="28575">
+            <a:prstDash val="dash"/>
+          </a:ln>
+        </p:spPr>
+        <p:style>
+          <a:lnRef idx="1">
+            <a:schemeClr val="accent2"/>
+          </a:lnRef>
+          <a:fillRef idx="0">
+            <a:schemeClr val="accent2"/>
+          </a:fillRef>
+          <a:effectRef idx="0">
+            <a:schemeClr val="accent2"/>
+          </a:effectRef>
+          <a:fontRef idx="minor">
+            <a:schemeClr val="tx1"/>
+          </a:fontRef>
+        </p:style>
+      </p:cxnSp>
+    </p:spTree>
+    <p:extLst>
+      <p:ext uri="{BB962C8B-B14F-4D97-AF65-F5344CB8AC3E}">
+        <p14:creationId xmlns:p14="http://schemas.microsoft.com/office/powerpoint/2010/main" val="1368589847"/>
+      </p:ext>
+    </p:extLst>
+  </p:cSld>
+  <p:clrMapOvr>
+    <a:masterClrMapping/>
+  </p:clrMapOvr>
+  <p:timing>
+    <p:tnLst>
+      <p:par>
+        <p:cTn id="1" dur="indefinite" restart="never" nodeType="tmRoot">
+          <p:childTnLst>
+            <p:seq concurrent="1" nextAc="seek">
+              <p:cTn id="2" dur="indefinite" nodeType="mainSeq">
+                <p:childTnLst>
+                  <p:par>
+                    <p:cTn id="3" fill="hold">
+                      <p:stCondLst>
+                        <p:cond delay="indefinite"/>
+                      </p:stCondLst>
+                      <p:childTnLst>
+                        <p:par>
+                          <p:cTn id="4" fill="hold">
+                            <p:stCondLst>
+                              <p:cond delay="0"/>
+                            </p:stCondLst>
+                            <p:childTnLst>
+                              <p:par>
+                                <p:cTn id="5" presetID="10" presetClass="entr" presetSubtype="0" fill="hold" grpId="0" nodeType="clickEffect">
+                                  <p:stCondLst>
+                                    <p:cond delay="0"/>
+                                  </p:stCondLst>
+                                  <p:childTnLst>
+                                    <p:set>
+                                      <p:cBhvr>
+                                        <p:cTn id="6" dur="1" fill="hold">
+                                          <p:stCondLst>
+                                            <p:cond delay="0"/>
+                                          </p:stCondLst>
+                                        </p:cTn>
+                                        <p:tgtEl>
+                                          <p:spTgt spid="11"/>
+                                        </p:tgtEl>
+                                        <p:attrNameLst>
+                                          <p:attrName>style.visibility</p:attrName>
+                                        </p:attrNameLst>
+                                      </p:cBhvr>
+                                      <p:to>
+                                        <p:strVal val="visible"/>
+                                      </p:to>
+                                    </p:set>
+                                    <p:animEffect transition="in" filter="fade">
+                                      <p:cBhvr>
+                                        <p:cTn id="7" dur="500"/>
+                                        <p:tgtEl>
+                                          <p:spTgt spid="11"/>
+                                        </p:tgtEl>
+                                      </p:cBhvr>
+                                    </p:animEffect>
+                                  </p:childTnLst>
+                                </p:cTn>
+                              </p:par>
+                              <p:par>
+                                <p:cTn id="8" presetID="10" presetClass="entr" presetSubtype="0" fill="hold" nodeType="withEffect">
+                                  <p:stCondLst>
+                                    <p:cond delay="0"/>
+                                  </p:stCondLst>
+                                  <p:childTnLst>
+                                    <p:set>
+                                      <p:cBhvr>
+                                        <p:cTn id="9" dur="1" fill="hold">
+                                          <p:stCondLst>
+                                            <p:cond delay="0"/>
+                                          </p:stCondLst>
+                                        </p:cTn>
+                                        <p:tgtEl>
+                                          <p:spTgt spid="13"/>
+                                        </p:tgtEl>
+                                        <p:attrNameLst>
+                                          <p:attrName>style.visibility</p:attrName>
+                                        </p:attrNameLst>
+                                      </p:cBhvr>
+                                      <p:to>
+                                        <p:strVal val="visible"/>
+                                      </p:to>
+                                    </p:set>
+                                    <p:animEffect transition="in" filter="fade">
+                                      <p:cBhvr>
+                                        <p:cTn id="10" dur="500"/>
+                                        <p:tgtEl>
+                                          <p:spTgt spid="13"/>
+                                        </p:tgtEl>
+                                      </p:cBhvr>
+                                    </p:animEffect>
+                                  </p:childTnLst>
+                                </p:cTn>
+                              </p:par>
+                              <p:par>
+                                <p:cTn id="11" presetID="10" presetClass="entr" presetSubtype="0" fill="hold" grpId="0" nodeType="withEffect">
+                                  <p:stCondLst>
+                                    <p:cond delay="0"/>
+                                  </p:stCondLst>
+                                  <p:childTnLst>
+                                    <p:set>
+                                      <p:cBhvr>
+                                        <p:cTn id="12" dur="1" fill="hold">
+                                          <p:stCondLst>
+                                            <p:cond delay="0"/>
+                                          </p:stCondLst>
+                                        </p:cTn>
+                                        <p:tgtEl>
+                                          <p:spTgt spid="8"/>
+                                        </p:tgtEl>
+                                        <p:attrNameLst>
+                                          <p:attrName>style.visibility</p:attrName>
+                                        </p:attrNameLst>
+                                      </p:cBhvr>
+                                      <p:to>
+                                        <p:strVal val="visible"/>
+                                      </p:to>
+                                    </p:set>
+                                    <p:animEffect transition="in" filter="fade">
+                                      <p:cBhvr>
+                                        <p:cTn id="13" dur="500"/>
+                                        <p:tgtEl>
+                                          <p:spTgt spid="8"/>
+                                        </p:tgtEl>
+                                      </p:cBhvr>
+                                    </p:animEffect>
+                                  </p:childTnLst>
+                                </p:cTn>
+                              </p:par>
+                              <p:par>
+                                <p:cTn id="14" presetID="10" presetClass="entr" presetSubtype="0" fill="hold" grpId="0" nodeType="withEffect">
+                                  <p:stCondLst>
+                                    <p:cond delay="0"/>
+                                  </p:stCondLst>
+                                  <p:childTnLst>
+                                    <p:set>
+                                      <p:cBhvr>
+                                        <p:cTn id="15" dur="1" fill="hold">
+                                          <p:stCondLst>
+                                            <p:cond delay="0"/>
+                                          </p:stCondLst>
+                                        </p:cTn>
+                                        <p:tgtEl>
+                                          <p:spTgt spid="12"/>
+                                        </p:tgtEl>
+                                        <p:attrNameLst>
+                                          <p:attrName>style.visibility</p:attrName>
+                                        </p:attrNameLst>
+                                      </p:cBhvr>
+                                      <p:to>
+                                        <p:strVal val="visible"/>
+                                      </p:to>
+                                    </p:set>
+                                    <p:animEffect transition="in" filter="fade">
+                                      <p:cBhvr>
+                                        <p:cTn id="16" dur="500"/>
+                                        <p:tgtEl>
+                                          <p:spTgt spid="12"/>
+                                        </p:tgtEl>
+                                      </p:cBhvr>
+                                    </p:animEffect>
+                                  </p:childTnLst>
+                                </p:cTn>
+                              </p:par>
+                              <p:par>
+                                <p:cTn id="17" presetID="10" presetClass="entr" presetSubtype="0" fill="hold" nodeType="withEffect">
+                                  <p:stCondLst>
+                                    <p:cond delay="0"/>
+                                  </p:stCondLst>
+                                  <p:childTnLst>
+                                    <p:set>
+                                      <p:cBhvr>
+                                        <p:cTn id="18" dur="1" fill="hold">
+                                          <p:stCondLst>
+                                            <p:cond delay="0"/>
+                                          </p:stCondLst>
+                                        </p:cTn>
+                                        <p:tgtEl>
+                                          <p:spTgt spid="14"/>
+                                        </p:tgtEl>
+                                        <p:attrNameLst>
+                                          <p:attrName>style.visibility</p:attrName>
+                                        </p:attrNameLst>
+                                      </p:cBhvr>
+                                      <p:to>
+                                        <p:strVal val="visible"/>
+                                      </p:to>
+                                    </p:set>
+                                    <p:animEffect transition="in" filter="fade">
+                                      <p:cBhvr>
+                                        <p:cTn id="19" dur="500"/>
+                                        <p:tgtEl>
+                                          <p:spTgt spid="14"/>
+                                        </p:tgtEl>
+                                      </p:cBhvr>
+                                    </p:animEffect>
+                                  </p:childTnLst>
+                                </p:cTn>
+                              </p:par>
+                            </p:childTnLst>
+                          </p:cTn>
+                        </p:par>
+                      </p:childTnLst>
+                    </p:cTn>
+                  </p:par>
+                  <p:par>
+                    <p:cTn id="20" fill="hold">
+                      <p:stCondLst>
+                        <p:cond delay="indefinite"/>
+                      </p:stCondLst>
+                      <p:childTnLst>
+                        <p:par>
+                          <p:cTn id="21" fill="hold">
+                            <p:stCondLst>
+                              <p:cond delay="0"/>
+                            </p:stCondLst>
+                            <p:childTnLst>
+                              <p:par>
+                                <p:cTn id="22" presetID="10" presetClass="entr" presetSubtype="0" fill="hold" grpId="0" nodeType="clickEffect">
+                                  <p:stCondLst>
+                                    <p:cond delay="0"/>
+                                  </p:stCondLst>
+                                  <p:childTnLst>
+                                    <p:set>
+                                      <p:cBhvr>
+                                        <p:cTn id="23" dur="1" fill="hold">
+                                          <p:stCondLst>
+                                            <p:cond delay="0"/>
+                                          </p:stCondLst>
+                                        </p:cTn>
+                                        <p:tgtEl>
+                                          <p:spTgt spid="17"/>
+                                        </p:tgtEl>
+                                        <p:attrNameLst>
+                                          <p:attrName>style.visibility</p:attrName>
+                                        </p:attrNameLst>
+                                      </p:cBhvr>
+                                      <p:to>
+                                        <p:strVal val="visible"/>
+                                      </p:to>
+                                    </p:set>
+                                    <p:animEffect transition="in" filter="fade">
+                                      <p:cBhvr>
+                                        <p:cTn id="24" dur="500"/>
+                                        <p:tgtEl>
+                                          <p:spTgt spid="17"/>
+                                        </p:tgtEl>
+                                      </p:cBhvr>
+                                    </p:animEffect>
+                                  </p:childTnLst>
+                                </p:cTn>
+                              </p:par>
+                              <p:par>
+                                <p:cTn id="25" presetID="10" presetClass="entr" presetSubtype="0" fill="hold" nodeType="withEffect">
+                                  <p:stCondLst>
+                                    <p:cond delay="0"/>
+                                  </p:stCondLst>
+                                  <p:childTnLst>
+                                    <p:set>
+                                      <p:cBhvr>
+                                        <p:cTn id="26" dur="1" fill="hold">
+                                          <p:stCondLst>
+                                            <p:cond delay="0"/>
+                                          </p:stCondLst>
+                                        </p:cTn>
+                                        <p:tgtEl>
+                                          <p:spTgt spid="18"/>
+                                        </p:tgtEl>
+                                        <p:attrNameLst>
+                                          <p:attrName>style.visibility</p:attrName>
+                                        </p:attrNameLst>
+                                      </p:cBhvr>
+                                      <p:to>
+                                        <p:strVal val="visible"/>
+                                      </p:to>
+                                    </p:set>
+                                    <p:animEffect transition="in" filter="fade">
+                                      <p:cBhvr>
+                                        <p:cTn id="27" dur="500"/>
+                                        <p:tgtEl>
+                                          <p:spTgt spid="18"/>
+                                        </p:tgtEl>
+                                      </p:cBhvr>
+                                    </p:animEffect>
+                                  </p:childTnLst>
+                                </p:cTn>
+                              </p:par>
+                            </p:childTnLst>
+                          </p:cTn>
+                        </p:par>
+                      </p:childTnLst>
+                    </p:cTn>
+                  </p:par>
+                </p:childTnLst>
+              </p:cTn>
+              <p:prevCondLst>
+                <p:cond evt="onPrev" delay="0">
+                  <p:tgtEl>
+                    <p:sldTgt/>
+                  </p:tgtEl>
+                </p:cond>
+              </p:prevCondLst>
+              <p:nextCondLst>
+                <p:cond evt="onNext" delay="0">
+                  <p:tgtEl>
+                    <p:sldTgt/>
+                  </p:tgtEl>
+                </p:cond>
+              </p:nextCondLst>
+            </p:seq>
+          </p:childTnLst>
+        </p:cTn>
+      </p:par>
+    </p:tnLst>
+    <p:bldLst>
+      <p:bldP spid="8" grpId="0" animBg="1"/>
+      <p:bldP spid="11" grpId="0" animBg="1"/>
+      <p:bldP spid="12" grpId="0" animBg="1"/>
+      <p:bldP spid="17" grpId="0" animBg="1"/>
+    </p:bldLst>
+  </p:timing>
+</p:sld>
+</file>
+
+<file path=ppt/slides/slide21.xml><?xml version="1.0" encoding="utf-8"?>
+<p:sld xmlns:a="http://schemas.openxmlformats.org/drawingml/2006/main" xmlns:r="http://schemas.openxmlformats.org/officeDocument/2006/relationships" xmlns:p="http://schemas.openxmlformats.org/presentationml/2006/main">
+  <p:cSld>
+    <p:spTree>
+      <p:nvGrpSpPr>
+        <p:cNvPr id="1" name=""/>
+        <p:cNvGrpSpPr/>
+        <p:nvPr/>
+      </p:nvGrpSpPr>
+      <p:grpSpPr>
+        <a:xfrm>
+          <a:off x="0" y="0"/>
+          <a:ext cx="0" cy="0"/>
+          <a:chOff x="0" y="0"/>
+          <a:chExt cx="0" cy="0"/>
+        </a:xfrm>
+      </p:grpSpPr>
+      <p:sp>
+        <p:nvSpPr>
+          <p:cNvPr id="25" name="Rectangle: Rounded Corners 24">
+            <a:extLst>
+              <a:ext uri="{FF2B5EF4-FFF2-40B4-BE49-F238E27FC236}">
+                <a16:creationId xmlns:a16="http://schemas.microsoft.com/office/drawing/2014/main" id="{DF04F428-A1F4-4235-92A1-FAC3D72F46AA}"/>
+              </a:ext>
+            </a:extLst>
+          </p:cNvPr>
+          <p:cNvSpPr/>
+          <p:nvPr/>
+        </p:nvSpPr>
+        <p:spPr>
+          <a:xfrm>
+            <a:off x="2823228" y="817690"/>
+            <a:ext cx="3268470" cy="1951643"/>
+          </a:xfrm>
+          <a:prstGeom prst="roundRect">
+            <a:avLst/>
+          </a:prstGeom>
+        </p:spPr>
+        <p:style>
+          <a:lnRef idx="2">
+            <a:schemeClr val="accent5"/>
+          </a:lnRef>
+          <a:fillRef idx="1">
+            <a:schemeClr val="lt1"/>
+          </a:fillRef>
+          <a:effectRef idx="0">
+            <a:schemeClr val="accent5"/>
+          </a:effectRef>
+          <a:fontRef idx="minor">
+            <a:schemeClr val="dk1"/>
+          </a:fontRef>
+        </p:style>
+        <p:txBody>
+          <a:bodyPr rtlCol="0" anchor="ctr"/>
+          <a:lstStyle/>
+          <a:p>
+            <a:pPr algn="ctr"/>
+            <a:endParaRPr lang="en-US" dirty="0"/>
+          </a:p>
+        </p:txBody>
+      </p:sp>
+      <p:sp>
+        <p:nvSpPr>
+          <p:cNvPr id="3" name="Title 2">
+            <a:extLst>
+              <a:ext uri="{FF2B5EF4-FFF2-40B4-BE49-F238E27FC236}">
+                <a16:creationId xmlns:a16="http://schemas.microsoft.com/office/drawing/2014/main" id="{ADB04B0B-004D-4B94-8A06-4CFB0B4C2EF3}"/>
+              </a:ext>
+            </a:extLst>
+          </p:cNvPr>
+          <p:cNvSpPr>
+            <a:spLocks noGrp="1"/>
+          </p:cNvSpPr>
+          <p:nvPr>
+            <p:ph type="title"/>
+          </p:nvPr>
+        </p:nvSpPr>
+        <p:spPr>
+          <a:xfrm>
+            <a:off x="358775" y="219075"/>
+            <a:ext cx="8426449" cy="301752"/>
+          </a:xfrm>
+        </p:spPr>
+        <p:txBody>
+          <a:bodyPr/>
+          <a:lstStyle/>
+          <a:p>
+            <a:r>
+              <a:rPr lang="en-US" dirty="0"/>
+              <a:t>MOCKING</a:t>
+            </a:r>
+          </a:p>
+        </p:txBody>
+      </p:sp>
+      <p:sp>
+        <p:nvSpPr>
+          <p:cNvPr id="9" name="Rectangle: Rounded Corners 8">
+            <a:extLst>
+              <a:ext uri="{FF2B5EF4-FFF2-40B4-BE49-F238E27FC236}">
+                <a16:creationId xmlns:a16="http://schemas.microsoft.com/office/drawing/2014/main" id="{E96E4BAB-7861-4323-94E7-CB95E4C1DB73}"/>
+              </a:ext>
+            </a:extLst>
+          </p:cNvPr>
+          <p:cNvSpPr/>
+          <p:nvPr/>
+        </p:nvSpPr>
+        <p:spPr>
+          <a:xfrm>
+            <a:off x="1063236" y="3079787"/>
+            <a:ext cx="3268470" cy="615719"/>
+          </a:xfrm>
+          <a:prstGeom prst="roundRect">
+            <a:avLst/>
+          </a:prstGeom>
+        </p:spPr>
+        <p:style>
+          <a:lnRef idx="2">
+            <a:schemeClr val="accent4">
+              <a:shade val="50000"/>
+            </a:schemeClr>
+          </a:lnRef>
+          <a:fillRef idx="1">
+            <a:schemeClr val="accent4"/>
+          </a:fillRef>
+          <a:effectRef idx="0">
+            <a:schemeClr val="accent4"/>
+          </a:effectRef>
+          <a:fontRef idx="minor">
+            <a:schemeClr val="lt1"/>
+          </a:fontRef>
+        </p:style>
+        <p:txBody>
+          <a:bodyPr rtlCol="0" anchor="ctr"/>
+          <a:lstStyle/>
+          <a:p>
+            <a:pPr algn="ctr"/>
+            <a:r>
+              <a:rPr lang="en-US" dirty="0"/>
+              <a:t>Persistency</a:t>
+            </a:r>
+          </a:p>
+        </p:txBody>
+      </p:sp>
+      <p:sp>
+        <p:nvSpPr>
+          <p:cNvPr id="11" name="Rectangle: Rounded Corners 10">
+            <a:extLst>
+              <a:ext uri="{FF2B5EF4-FFF2-40B4-BE49-F238E27FC236}">
+                <a16:creationId xmlns:a16="http://schemas.microsoft.com/office/drawing/2014/main" id="{7C31B104-113C-41E4-8A4A-8DB1A0BA829A}"/>
+              </a:ext>
+            </a:extLst>
+          </p:cNvPr>
+          <p:cNvSpPr/>
+          <p:nvPr/>
+        </p:nvSpPr>
+        <p:spPr>
+          <a:xfrm>
+            <a:off x="3103108" y="922499"/>
+            <a:ext cx="808698" cy="433284"/>
+          </a:xfrm>
+          <a:prstGeom prst="roundRect">
+            <a:avLst/>
+          </a:prstGeom>
+        </p:spPr>
+        <p:style>
+          <a:lnRef idx="2">
+            <a:schemeClr val="accent3">
+              <a:shade val="50000"/>
+            </a:schemeClr>
+          </a:lnRef>
+          <a:fillRef idx="1">
+            <a:schemeClr val="accent3"/>
+          </a:fillRef>
+          <a:effectRef idx="0">
+            <a:schemeClr val="accent3"/>
+          </a:effectRef>
+          <a:fontRef idx="minor">
+            <a:schemeClr val="lt1"/>
+          </a:fontRef>
+        </p:style>
+        <p:txBody>
+          <a:bodyPr rtlCol="0" anchor="ctr"/>
+          <a:lstStyle/>
+          <a:p>
+            <a:pPr algn="ctr"/>
+            <a:r>
+              <a:rPr lang="en-US" dirty="0"/>
+              <a:t>User</a:t>
+            </a:r>
+          </a:p>
+        </p:txBody>
+      </p:sp>
+      <p:sp>
+        <p:nvSpPr>
+          <p:cNvPr id="12" name="Rectangle: Rounded Corners 11">
+            <a:extLst>
+              <a:ext uri="{FF2B5EF4-FFF2-40B4-BE49-F238E27FC236}">
+                <a16:creationId xmlns:a16="http://schemas.microsoft.com/office/drawing/2014/main" id="{7968C700-AA8E-405C-9073-3F2B2B193FEA}"/>
+              </a:ext>
+            </a:extLst>
+          </p:cNvPr>
+          <p:cNvSpPr/>
+          <p:nvPr/>
+        </p:nvSpPr>
+        <p:spPr>
+          <a:xfrm>
+            <a:off x="5003119" y="1316170"/>
+            <a:ext cx="808698" cy="433284"/>
+          </a:xfrm>
+          <a:prstGeom prst="roundRect">
+            <a:avLst/>
+          </a:prstGeom>
+        </p:spPr>
+        <p:style>
+          <a:lnRef idx="2">
+            <a:schemeClr val="accent3">
+              <a:shade val="50000"/>
+            </a:schemeClr>
+          </a:lnRef>
+          <a:fillRef idx="1">
+            <a:schemeClr val="accent3"/>
+          </a:fillRef>
+          <a:effectRef idx="0">
+            <a:schemeClr val="accent3"/>
+          </a:effectRef>
+          <a:fontRef idx="minor">
+            <a:schemeClr val="lt1"/>
+          </a:fontRef>
+        </p:style>
+        <p:txBody>
+          <a:bodyPr rtlCol="0" anchor="ctr"/>
+          <a:lstStyle/>
+          <a:p>
+            <a:pPr algn="ctr"/>
+            <a:r>
+              <a:rPr lang="en-US" dirty="0"/>
+              <a:t>Cart</a:t>
+            </a:r>
+          </a:p>
+        </p:txBody>
+      </p:sp>
+      <p:sp>
+        <p:nvSpPr>
+          <p:cNvPr id="13" name="Rectangle: Rounded Corners 12">
+            <a:extLst>
+              <a:ext uri="{FF2B5EF4-FFF2-40B4-BE49-F238E27FC236}">
+                <a16:creationId xmlns:a16="http://schemas.microsoft.com/office/drawing/2014/main" id="{C67256B9-991D-48F0-BDC9-F009DA86DA9A}"/>
+              </a:ext>
+            </a:extLst>
+          </p:cNvPr>
+          <p:cNvSpPr/>
+          <p:nvPr/>
+        </p:nvSpPr>
+        <p:spPr>
+          <a:xfrm>
+            <a:off x="3523008" y="2231240"/>
+            <a:ext cx="808698" cy="433284"/>
+          </a:xfrm>
+          <a:prstGeom prst="roundRect">
+            <a:avLst/>
+          </a:prstGeom>
+        </p:spPr>
+        <p:style>
+          <a:lnRef idx="2">
+            <a:schemeClr val="accent3">
+              <a:shade val="50000"/>
+            </a:schemeClr>
+          </a:lnRef>
+          <a:fillRef idx="1">
+            <a:schemeClr val="accent3"/>
+          </a:fillRef>
+          <a:effectRef idx="0">
+            <a:schemeClr val="accent3"/>
+          </a:effectRef>
+          <a:fontRef idx="minor">
+            <a:schemeClr val="lt1"/>
+          </a:fontRef>
+        </p:style>
+        <p:txBody>
+          <a:bodyPr rtlCol="0" anchor="ctr"/>
+          <a:lstStyle/>
+          <a:p>
+            <a:pPr algn="ctr"/>
+            <a:r>
+              <a:rPr lang="en-US" dirty="0" err="1"/>
+              <a:t>ListItem</a:t>
+            </a:r>
+            <a:endParaRPr lang="en-US" dirty="0"/>
+          </a:p>
+        </p:txBody>
+      </p:sp>
+      <p:cxnSp>
+        <p:nvCxnSpPr>
+          <p:cNvPr id="14" name="Straight Connector 13">
+            <a:extLst>
+              <a:ext uri="{FF2B5EF4-FFF2-40B4-BE49-F238E27FC236}">
+                <a16:creationId xmlns:a16="http://schemas.microsoft.com/office/drawing/2014/main" id="{106E79A2-9D24-4ACD-9BE3-B0F6B44A5D31}"/>
+              </a:ext>
+            </a:extLst>
+          </p:cNvPr>
+          <p:cNvCxnSpPr>
+            <a:cxnSpLocks/>
+            <a:stCxn id="11" idx="3"/>
+            <a:endCxn id="12" idx="1"/>
+          </p:cNvCxnSpPr>
+          <p:nvPr/>
+        </p:nvCxnSpPr>
+        <p:spPr>
+          <a:xfrm>
+            <a:off x="3911806" y="1139142"/>
+            <a:ext cx="1091313" cy="393671"/>
+          </a:xfrm>
+          <a:prstGeom prst="line">
+            <a:avLst/>
+          </a:prstGeom>
+          <a:ln w="28575">
+            <a:prstDash val="dash"/>
+          </a:ln>
+        </p:spPr>
+        <p:style>
+          <a:lnRef idx="1">
+            <a:schemeClr val="accent2"/>
+          </a:lnRef>
+          <a:fillRef idx="0">
+            <a:schemeClr val="accent2"/>
+          </a:fillRef>
+          <a:effectRef idx="0">
+            <a:schemeClr val="accent2"/>
+          </a:effectRef>
+          <a:fontRef idx="minor">
+            <a:schemeClr val="tx1"/>
+          </a:fontRef>
+        </p:style>
+      </p:cxnSp>
+      <p:cxnSp>
+        <p:nvCxnSpPr>
+          <p:cNvPr id="15" name="Straight Connector 14">
+            <a:extLst>
+              <a:ext uri="{FF2B5EF4-FFF2-40B4-BE49-F238E27FC236}">
+                <a16:creationId xmlns:a16="http://schemas.microsoft.com/office/drawing/2014/main" id="{CEE816F6-8948-49C7-A9CB-F869D6F1FC64}"/>
+              </a:ext>
+            </a:extLst>
+          </p:cNvPr>
+          <p:cNvCxnSpPr>
+            <a:cxnSpLocks/>
+            <a:stCxn id="13" idx="3"/>
+            <a:endCxn id="12" idx="2"/>
+          </p:cNvCxnSpPr>
+          <p:nvPr/>
+        </p:nvCxnSpPr>
+        <p:spPr>
+          <a:xfrm flipV="1">
+            <a:off x="4331706" y="1749454"/>
+            <a:ext cx="1075761" cy="698428"/>
+          </a:xfrm>
+          <a:prstGeom prst="line">
+            <a:avLst/>
+          </a:prstGeom>
+          <a:ln w="28575">
+            <a:prstDash val="dash"/>
+          </a:ln>
+        </p:spPr>
+        <p:style>
+          <a:lnRef idx="1">
+            <a:schemeClr val="accent2"/>
+          </a:lnRef>
+          <a:fillRef idx="0">
+            <a:schemeClr val="accent2"/>
+          </a:fillRef>
+          <a:effectRef idx="0">
+            <a:schemeClr val="accent2"/>
+          </a:effectRef>
+          <a:fontRef idx="minor">
+            <a:schemeClr val="tx1"/>
+          </a:fontRef>
+        </p:style>
+      </p:cxnSp>
+      <p:sp>
+        <p:nvSpPr>
+          <p:cNvPr id="17" name="Flowchart: Magnetic Disk 16">
+            <a:extLst>
+              <a:ext uri="{FF2B5EF4-FFF2-40B4-BE49-F238E27FC236}">
+                <a16:creationId xmlns:a16="http://schemas.microsoft.com/office/drawing/2014/main" id="{550D8398-D256-4E3E-9AE5-A5B912D759A2}"/>
+              </a:ext>
+            </a:extLst>
+          </p:cNvPr>
+          <p:cNvSpPr/>
+          <p:nvPr/>
+        </p:nvSpPr>
+        <p:spPr>
+          <a:xfrm>
+            <a:off x="2023690" y="3949451"/>
+            <a:ext cx="1347561" cy="771525"/>
+          </a:xfrm>
+          <a:prstGeom prst="flowChartMagneticDisk">
+            <a:avLst/>
+          </a:prstGeom>
+        </p:spPr>
+        <p:style>
+          <a:lnRef idx="2">
+            <a:schemeClr val="accent6">
+              <a:shade val="50000"/>
+            </a:schemeClr>
+          </a:lnRef>
+          <a:fillRef idx="1">
+            <a:schemeClr val="accent6"/>
+          </a:fillRef>
+          <a:effectRef idx="0">
+            <a:schemeClr val="accent6"/>
+          </a:effectRef>
+          <a:fontRef idx="minor">
+            <a:schemeClr val="lt1"/>
+          </a:fontRef>
+        </p:style>
+        <p:txBody>
+          <a:bodyPr rtlCol="0" anchor="ctr"/>
+          <a:lstStyle/>
+          <a:p>
+            <a:pPr algn="ctr"/>
+            <a:r>
+              <a:rPr lang="en-US" dirty="0"/>
+              <a:t>Database</a:t>
+            </a:r>
+          </a:p>
+        </p:txBody>
+      </p:sp>
+      <p:cxnSp>
+        <p:nvCxnSpPr>
+          <p:cNvPr id="18" name="Straight Connector 17">
+            <a:extLst>
+              <a:ext uri="{FF2B5EF4-FFF2-40B4-BE49-F238E27FC236}">
+                <a16:creationId xmlns:a16="http://schemas.microsoft.com/office/drawing/2014/main" id="{235D9357-CBFC-4F36-816C-8859C7D81078}"/>
+              </a:ext>
+            </a:extLst>
+          </p:cNvPr>
+          <p:cNvCxnSpPr>
+            <a:cxnSpLocks/>
+            <a:stCxn id="9" idx="2"/>
+            <a:endCxn id="17" idx="1"/>
+          </p:cNvCxnSpPr>
+          <p:nvPr/>
+        </p:nvCxnSpPr>
+        <p:spPr>
+          <a:xfrm>
+            <a:off x="2697471" y="3695506"/>
+            <a:ext cx="0" cy="253945"/>
+          </a:xfrm>
+          <a:prstGeom prst="line">
+            <a:avLst/>
+          </a:prstGeom>
+          <a:ln w="57150">
+            <a:prstDash val="solid"/>
+            <a:headEnd type="none" w="med" len="med"/>
+            <a:tailEnd type="triangle" w="med" len="med"/>
+          </a:ln>
+        </p:spPr>
+        <p:style>
+          <a:lnRef idx="1">
+            <a:schemeClr val="accent2"/>
+          </a:lnRef>
+          <a:fillRef idx="0">
+            <a:schemeClr val="accent2"/>
+          </a:fillRef>
+          <a:effectRef idx="0">
+            <a:schemeClr val="accent2"/>
+          </a:effectRef>
+          <a:fontRef idx="minor">
+            <a:schemeClr val="tx1"/>
+          </a:fontRef>
+        </p:style>
+      </p:cxnSp>
+      <p:cxnSp>
+        <p:nvCxnSpPr>
+          <p:cNvPr id="23" name="Straight Connector 22">
+            <a:extLst>
+              <a:ext uri="{FF2B5EF4-FFF2-40B4-BE49-F238E27FC236}">
+                <a16:creationId xmlns:a16="http://schemas.microsoft.com/office/drawing/2014/main" id="{D26C0954-62E5-4756-85F3-4E9BCF56B8E7}"/>
+              </a:ext>
+            </a:extLst>
+          </p:cNvPr>
+          <p:cNvCxnSpPr>
+            <a:cxnSpLocks/>
+            <a:endCxn id="9" idx="0"/>
+          </p:cNvCxnSpPr>
+          <p:nvPr/>
+        </p:nvCxnSpPr>
+        <p:spPr>
+          <a:xfrm flipH="1">
+            <a:off x="2697471" y="2722427"/>
+            <a:ext cx="297587" cy="357360"/>
+          </a:xfrm>
+          <a:prstGeom prst="line">
+            <a:avLst/>
+          </a:prstGeom>
+          <a:ln w="57150">
+            <a:prstDash val="solid"/>
+            <a:headEnd type="none" w="med" len="med"/>
+            <a:tailEnd type="triangle" w="med" len="med"/>
+          </a:ln>
+        </p:spPr>
+        <p:style>
+          <a:lnRef idx="1">
+            <a:schemeClr val="accent2"/>
+          </a:lnRef>
+          <a:fillRef idx="0">
+            <a:schemeClr val="accent2"/>
+          </a:fillRef>
+          <a:effectRef idx="0">
+            <a:schemeClr val="accent2"/>
+          </a:effectRef>
+          <a:fontRef idx="minor">
+            <a:schemeClr val="tx1"/>
+          </a:fontRef>
+        </p:style>
+      </p:cxnSp>
+      <p:sp>
+        <p:nvSpPr>
+          <p:cNvPr id="2" name="Rectangle: Rounded Corners 1">
+            <a:extLst>
+              <a:ext uri="{FF2B5EF4-FFF2-40B4-BE49-F238E27FC236}">
+                <a16:creationId xmlns:a16="http://schemas.microsoft.com/office/drawing/2014/main" id="{1BD99F40-F286-4341-8826-5C07FEE73EE7}"/>
+              </a:ext>
+            </a:extLst>
+          </p:cNvPr>
+          <p:cNvSpPr/>
+          <p:nvPr/>
+        </p:nvSpPr>
+        <p:spPr>
+          <a:xfrm>
+            <a:off x="4629293" y="3079787"/>
+            <a:ext cx="3268470" cy="615719"/>
+          </a:xfrm>
+          <a:prstGeom prst="roundRect">
+            <a:avLst/>
+          </a:prstGeom>
+        </p:spPr>
+        <p:style>
+          <a:lnRef idx="2">
+            <a:schemeClr val="accent2">
+              <a:shade val="50000"/>
+            </a:schemeClr>
+          </a:lnRef>
+          <a:fillRef idx="1">
+            <a:schemeClr val="accent2"/>
+          </a:fillRef>
+          <a:effectRef idx="0">
+            <a:schemeClr val="accent2"/>
+          </a:effectRef>
+          <a:fontRef idx="minor">
+            <a:schemeClr val="lt1"/>
+          </a:fontRef>
+        </p:style>
+        <p:txBody>
+          <a:bodyPr rtlCol="0" anchor="ctr"/>
+          <a:lstStyle/>
+          <a:p>
+            <a:pPr algn="ctr"/>
+            <a:r>
+              <a:rPr lang="en-US" dirty="0"/>
+              <a:t>Persistency Mock</a:t>
+            </a:r>
+          </a:p>
+        </p:txBody>
+      </p:sp>
+      <p:cxnSp>
+        <p:nvCxnSpPr>
+          <p:cNvPr id="19" name="Straight Connector 18">
+            <a:extLst>
+              <a:ext uri="{FF2B5EF4-FFF2-40B4-BE49-F238E27FC236}">
+                <a16:creationId xmlns:a16="http://schemas.microsoft.com/office/drawing/2014/main" id="{01D086D9-AFDC-4273-95C1-D11E56CE6267}"/>
+              </a:ext>
+            </a:extLst>
+          </p:cNvPr>
+          <p:cNvCxnSpPr>
+            <a:cxnSpLocks/>
+            <a:endCxn id="2" idx="0"/>
+          </p:cNvCxnSpPr>
+          <p:nvPr/>
+        </p:nvCxnSpPr>
+        <p:spPr>
+          <a:xfrm>
+            <a:off x="5965941" y="2722427"/>
+            <a:ext cx="297587" cy="357360"/>
+          </a:xfrm>
+          <a:prstGeom prst="line">
+            <a:avLst/>
+          </a:prstGeom>
+          <a:ln w="57150">
+            <a:prstDash val="solid"/>
+            <a:headEnd type="none" w="med" len="med"/>
+            <a:tailEnd type="triangle" w="med" len="med"/>
+          </a:ln>
+        </p:spPr>
+        <p:style>
+          <a:lnRef idx="1">
+            <a:schemeClr val="accent2"/>
+          </a:lnRef>
+          <a:fillRef idx="0">
+            <a:schemeClr val="accent2"/>
+          </a:fillRef>
+          <a:effectRef idx="0">
+            <a:schemeClr val="accent2"/>
+          </a:effectRef>
+          <a:fontRef idx="minor">
+            <a:schemeClr val="tx1"/>
+          </a:fontRef>
+        </p:style>
+      </p:cxnSp>
+      <p:sp>
+        <p:nvSpPr>
+          <p:cNvPr id="26" name="Rectangle: Rounded Corners 25">
+            <a:extLst>
+              <a:ext uri="{FF2B5EF4-FFF2-40B4-BE49-F238E27FC236}">
+                <a16:creationId xmlns:a16="http://schemas.microsoft.com/office/drawing/2014/main" id="{468012D4-5D3C-4C84-BB04-6F592DEF961A}"/>
+              </a:ext>
+            </a:extLst>
+          </p:cNvPr>
+          <p:cNvSpPr/>
+          <p:nvPr/>
+        </p:nvSpPr>
+        <p:spPr>
+          <a:xfrm>
+            <a:off x="7126092" y="1461641"/>
+            <a:ext cx="1003721" cy="615719"/>
+          </a:xfrm>
+          <a:prstGeom prst="roundRect">
+            <a:avLst/>
+          </a:prstGeom>
+        </p:spPr>
+        <p:style>
+          <a:lnRef idx="2">
+            <a:schemeClr val="accent4">
+              <a:shade val="50000"/>
+            </a:schemeClr>
+          </a:lnRef>
+          <a:fillRef idx="1">
+            <a:schemeClr val="accent4"/>
+          </a:fillRef>
+          <a:effectRef idx="0">
+            <a:schemeClr val="accent4"/>
+          </a:effectRef>
+          <a:fontRef idx="minor">
+            <a:schemeClr val="lt1"/>
+          </a:fontRef>
+        </p:style>
+        <p:txBody>
+          <a:bodyPr rtlCol="0" anchor="ctr"/>
+          <a:lstStyle/>
+          <a:p>
+            <a:pPr algn="ctr"/>
+            <a:endParaRPr lang="en-US" dirty="0"/>
+          </a:p>
+        </p:txBody>
+      </p:sp>
+      <p:pic>
+        <p:nvPicPr>
+          <p:cNvPr id="27" name="Picture 2" descr="JUnit – About">
+            <a:extLst>
+              <a:ext uri="{FF2B5EF4-FFF2-40B4-BE49-F238E27FC236}">
+                <a16:creationId xmlns:a16="http://schemas.microsoft.com/office/drawing/2014/main" id="{C564247A-A82D-4E4E-B5B0-BB136F1E95DC}"/>
+              </a:ext>
+            </a:extLst>
+          </p:cNvPr>
+          <p:cNvPicPr>
+            <a:picLocks noChangeAspect="1" noChangeArrowheads="1"/>
+          </p:cNvPicPr>
+          <p:nvPr/>
+        </p:nvPicPr>
+        <p:blipFill>
+          <a:blip r:embed="rId3" cstate="print">
+            <a:extLst>
+              <a:ext uri="{28A0092B-C50C-407E-A947-70E740481C1C}">
+                <a14:useLocalDpi xmlns:a14="http://schemas.microsoft.com/office/drawing/2010/main" val="0"/>
+              </a:ext>
+            </a:extLst>
+          </a:blip>
+          <a:srcRect/>
+          <a:stretch>
+            <a:fillRect/>
+          </a:stretch>
+        </p:blipFill>
+        <p:spPr bwMode="auto">
+          <a:xfrm>
+            <a:off x="7209910" y="1641765"/>
+            <a:ext cx="836085" cy="255471"/>
+          </a:xfrm>
+          <a:prstGeom prst="rect">
+            <a:avLst/>
+          </a:prstGeom>
+          <a:noFill/>
+          <a:extLst>
+            <a:ext uri="{909E8E84-426E-40DD-AFC4-6F175D3DCCD1}">
+              <a14:hiddenFill xmlns:a14="http://schemas.microsoft.com/office/drawing/2010/main">
+                <a:solidFill>
+                  <a:srgbClr val="FFFFFF"/>
+                </a:solidFill>
+              </a14:hiddenFill>
+            </a:ext>
+          </a:extLst>
+        </p:spPr>
+      </p:pic>
+      <p:sp>
+        <p:nvSpPr>
+          <p:cNvPr id="28" name="Arrow: Curved Right 27">
+            <a:extLst>
+              <a:ext uri="{FF2B5EF4-FFF2-40B4-BE49-F238E27FC236}">
+                <a16:creationId xmlns:a16="http://schemas.microsoft.com/office/drawing/2014/main" id="{1F7CA720-A940-40EB-9E60-53CD5FA7B1D2}"/>
+              </a:ext>
+            </a:extLst>
+          </p:cNvPr>
+          <p:cNvSpPr/>
+          <p:nvPr/>
+        </p:nvSpPr>
+        <p:spPr>
+          <a:xfrm rot="11344582">
+            <a:off x="8125062" y="1724549"/>
+            <a:ext cx="539689" cy="1861930"/>
+          </a:xfrm>
+          <a:prstGeom prst="curvedRightArrow">
+            <a:avLst/>
+          </a:prstGeom>
+        </p:spPr>
+        <p:style>
+          <a:lnRef idx="2">
+            <a:schemeClr val="accent2">
+              <a:shade val="50000"/>
+            </a:schemeClr>
+          </a:lnRef>
+          <a:fillRef idx="1">
+            <a:schemeClr val="accent2"/>
+          </a:fillRef>
+          <a:effectRef idx="0">
+            <a:schemeClr val="accent2"/>
+          </a:effectRef>
+          <a:fontRef idx="minor">
+            <a:schemeClr val="lt1"/>
+          </a:fontRef>
+        </p:style>
+        <p:txBody>
+          <a:bodyPr rtlCol="0" anchor="ctr"/>
+          <a:lstStyle/>
+          <a:p>
+            <a:pPr algn="ctr"/>
+            <a:endParaRPr lang="en-US">
+              <a:solidFill>
+                <a:schemeClr val="tx1"/>
+              </a:solidFill>
+            </a:endParaRPr>
+          </a:p>
+        </p:txBody>
+      </p:sp>
+      <p:pic>
+        <p:nvPicPr>
+          <p:cNvPr id="29" name="Graphic 28" descr="Exclamation mark">
+            <a:extLst>
+              <a:ext uri="{FF2B5EF4-FFF2-40B4-BE49-F238E27FC236}">
+                <a16:creationId xmlns:a16="http://schemas.microsoft.com/office/drawing/2014/main" id="{2843C5A5-8C3E-4B48-BE18-9E2B4AD203A5}"/>
+              </a:ext>
+            </a:extLst>
+          </p:cNvPr>
+          <p:cNvPicPr>
+            <a:picLocks noChangeAspect="1"/>
+          </p:cNvPicPr>
+          <p:nvPr/>
+        </p:nvPicPr>
+        <p:blipFill>
+          <a:blip r:embed="rId4">
+            <a:extLst>
+              <a:ext uri="{28A0092B-C50C-407E-A947-70E740481C1C}">
+                <a14:useLocalDpi xmlns:a14="http://schemas.microsoft.com/office/drawing/2010/main" val="0"/>
+              </a:ext>
+              <a:ext uri="{96DAC541-7B7A-43D3-8B79-37D633B846F1}">
+                <asvg:svgBlip xmlns:asvg="http://schemas.microsoft.com/office/drawing/2016/SVG/main" r:embed="rId5"/>
+              </a:ext>
+            </a:extLst>
+          </a:blip>
+          <a:stretch>
+            <a:fillRect/>
+          </a:stretch>
+        </p:blipFill>
+        <p:spPr>
+          <a:xfrm>
+            <a:off x="8129813" y="2484256"/>
+            <a:ext cx="487096" cy="487096"/>
+          </a:xfrm>
+          <a:prstGeom prst="rect">
+            <a:avLst/>
+          </a:prstGeom>
+        </p:spPr>
+      </p:pic>
+      <p:sp>
+        <p:nvSpPr>
+          <p:cNvPr id="30" name="Arrow: Curved Right 29">
+            <a:extLst>
+              <a:ext uri="{FF2B5EF4-FFF2-40B4-BE49-F238E27FC236}">
+                <a16:creationId xmlns:a16="http://schemas.microsoft.com/office/drawing/2014/main" id="{8FB9538B-2F08-4BCA-BC77-BA22477F5CF1}"/>
+              </a:ext>
+            </a:extLst>
+          </p:cNvPr>
+          <p:cNvSpPr/>
+          <p:nvPr/>
+        </p:nvSpPr>
+        <p:spPr>
+          <a:xfrm rot="1132941">
+            <a:off x="6251664" y="1499291"/>
+            <a:ext cx="563971" cy="1534435"/>
+          </a:xfrm>
+          <a:prstGeom prst="curvedRightArrow">
+            <a:avLst>
+              <a:gd name="adj1" fmla="val 14567"/>
+              <a:gd name="adj2" fmla="val 47951"/>
+              <a:gd name="adj3" fmla="val 28773"/>
+            </a:avLst>
+          </a:prstGeom>
+        </p:spPr>
+        <p:style>
+          <a:lnRef idx="2">
+            <a:schemeClr val="accent2">
+              <a:shade val="50000"/>
+            </a:schemeClr>
+          </a:lnRef>
+          <a:fillRef idx="1">
+            <a:schemeClr val="accent2"/>
+          </a:fillRef>
+          <a:effectRef idx="0">
+            <a:schemeClr val="accent2"/>
+          </a:effectRef>
+          <a:fontRef idx="minor">
+            <a:schemeClr val="lt1"/>
+          </a:fontRef>
+        </p:style>
+        <p:txBody>
+          <a:bodyPr rtlCol="0" anchor="ctr"/>
+          <a:lstStyle/>
+          <a:p>
+            <a:pPr algn="ctr"/>
+            <a:endParaRPr lang="en-US">
+              <a:solidFill>
+                <a:schemeClr val="tx1"/>
+              </a:solidFill>
+            </a:endParaRPr>
+          </a:p>
+        </p:txBody>
+      </p:sp>
+      <p:pic>
+        <p:nvPicPr>
+          <p:cNvPr id="31" name="Graphic 30" descr="Question Mark">
+            <a:extLst>
+              <a:ext uri="{FF2B5EF4-FFF2-40B4-BE49-F238E27FC236}">
+                <a16:creationId xmlns:a16="http://schemas.microsoft.com/office/drawing/2014/main" id="{45E28C47-27FF-4662-8E36-D731A8B31D03}"/>
+              </a:ext>
+            </a:extLst>
+          </p:cNvPr>
+          <p:cNvPicPr>
+            <a:picLocks noChangeAspect="1"/>
+          </p:cNvPicPr>
+          <p:nvPr/>
+        </p:nvPicPr>
+        <p:blipFill>
+          <a:blip r:embed="rId6">
+            <a:extLst>
+              <a:ext uri="{28A0092B-C50C-407E-A947-70E740481C1C}">
+                <a14:useLocalDpi xmlns:a14="http://schemas.microsoft.com/office/drawing/2010/main" val="0"/>
+              </a:ext>
+              <a:ext uri="{96DAC541-7B7A-43D3-8B79-37D633B846F1}">
+                <asvg:svgBlip xmlns:asvg="http://schemas.microsoft.com/office/drawing/2016/SVG/main" r:embed="rId7"/>
+              </a:ext>
+            </a:extLst>
+          </a:blip>
+          <a:stretch>
+            <a:fillRect/>
+          </a:stretch>
+        </p:blipFill>
+        <p:spPr>
+          <a:xfrm>
+            <a:off x="6324625" y="2057484"/>
+            <a:ext cx="418048" cy="418048"/>
+          </a:xfrm>
+          <a:prstGeom prst="rect">
+            <a:avLst/>
+          </a:prstGeom>
+        </p:spPr>
+      </p:pic>
+    </p:spTree>
+    <p:extLst>
+      <p:ext uri="{BB962C8B-B14F-4D97-AF65-F5344CB8AC3E}">
+        <p14:creationId xmlns:p14="http://schemas.microsoft.com/office/powerpoint/2010/main" val="678100199"/>
+      </p:ext>
+    </p:extLst>
+  </p:cSld>
+  <p:clrMapOvr>
+    <a:masterClrMapping/>
+  </p:clrMapOvr>
+  <mc:AlternateContent xmlns:mc="http://schemas.openxmlformats.org/markup-compatibility/2006" xmlns:p159="http://schemas.microsoft.com/office/powerpoint/2015/09/main">
+    <mc:Choice Requires="p159">
+      <p:transition xmlns:p14="http://schemas.microsoft.com/office/powerpoint/2010/main" spd="slow" p14:dur="2000">
+        <p159:morph option="byObject"/>
+      </p:transition>
+    </mc:Choice>
+    <mc:Fallback xmlns="">
+      <p:transition spd="slow">
+        <p:fade/>
+      </p:transition>
+    </mc:Fallback>
+  </mc:AlternateContent>
+  <p:timing>
+    <p:tnLst>
+      <p:par>
+        <p:cTn id="1" dur="indefinite" restart="never" nodeType="tmRoot">
+          <p:childTnLst>
+            <p:seq concurrent="1" nextAc="seek">
+              <p:cTn id="2" dur="indefinite" nodeType="mainSeq">
+                <p:childTnLst>
+                  <p:par>
+                    <p:cTn id="3" fill="hold">
+                      <p:stCondLst>
+                        <p:cond delay="indefinite"/>
+                      </p:stCondLst>
+                      <p:childTnLst>
+                        <p:par>
+                          <p:cTn id="4" fill="hold">
+                            <p:stCondLst>
+                              <p:cond delay="0"/>
+                            </p:stCondLst>
+                            <p:childTnLst>
+                              <p:par>
+                                <p:cTn id="5" presetID="24" presetClass="emph" presetSubtype="0" fill="hold" grpId="0" nodeType="clickEffect">
+                                  <p:stCondLst>
+                                    <p:cond delay="0"/>
+                                  </p:stCondLst>
+                                  <p:childTnLst>
+                                    <p:animClr clrSpc="hsl" dir="cw">
+                                      <p:cBhvr override="childStyle">
+                                        <p:cTn id="6" dur="500" fill="hold"/>
+                                        <p:tgtEl>
+                                          <p:spTgt spid="11"/>
+                                        </p:tgtEl>
+                                        <p:attrNameLst>
+                                          <p:attrName>style.color</p:attrName>
+                                        </p:attrNameLst>
+                                      </p:cBhvr>
+                                      <p:by>
+                                        <p:hsl h="0" s="-12549" l="-25098"/>
+                                      </p:by>
+                                    </p:animClr>
+                                    <p:animClr clrSpc="hsl" dir="cw">
+                                      <p:cBhvr>
+                                        <p:cTn id="7" dur="500" fill="hold"/>
+                                        <p:tgtEl>
+                                          <p:spTgt spid="11"/>
+                                        </p:tgtEl>
+                                        <p:attrNameLst>
+                                          <p:attrName>fillcolor</p:attrName>
+                                        </p:attrNameLst>
+                                      </p:cBhvr>
+                                      <p:by>
+                                        <p:hsl h="0" s="-12549" l="-25098"/>
+                                      </p:by>
+                                    </p:animClr>
+                                    <p:animClr clrSpc="hsl" dir="cw">
+                                      <p:cBhvr>
+                                        <p:cTn id="8" dur="500" fill="hold"/>
+                                        <p:tgtEl>
+                                          <p:spTgt spid="11"/>
+                                        </p:tgtEl>
+                                        <p:attrNameLst>
+                                          <p:attrName>stroke.color</p:attrName>
+                                        </p:attrNameLst>
+                                      </p:cBhvr>
+                                      <p:by>
+                                        <p:hsl h="0" s="-12549" l="-25098"/>
+                                      </p:by>
+                                    </p:animClr>
+                                    <p:set>
+                                      <p:cBhvr>
+                                        <p:cTn id="9" dur="500" fill="hold"/>
+                                        <p:tgtEl>
+                                          <p:spTgt spid="11"/>
+                                        </p:tgtEl>
+                                        <p:attrNameLst>
+                                          <p:attrName>fill.type</p:attrName>
+                                        </p:attrNameLst>
+                                      </p:cBhvr>
+                                      <p:to>
+                                        <p:strVal val="solid"/>
+                                      </p:to>
+                                    </p:set>
+                                  </p:childTnLst>
+                                </p:cTn>
+                              </p:par>
+                              <p:par>
+                                <p:cTn id="10" presetID="24" presetClass="emph" presetSubtype="0" fill="hold" grpId="0" nodeType="withEffect">
+                                  <p:stCondLst>
+                                    <p:cond delay="0"/>
+                                  </p:stCondLst>
+                                  <p:childTnLst>
+                                    <p:animClr clrSpc="hsl" dir="cw">
+                                      <p:cBhvr override="childStyle">
+                                        <p:cTn id="11" dur="500" fill="hold"/>
+                                        <p:tgtEl>
+                                          <p:spTgt spid="12"/>
+                                        </p:tgtEl>
+                                        <p:attrNameLst>
+                                          <p:attrName>style.color</p:attrName>
+                                        </p:attrNameLst>
+                                      </p:cBhvr>
+                                      <p:by>
+                                        <p:hsl h="0" s="-12549" l="-25098"/>
+                                      </p:by>
+                                    </p:animClr>
+                                    <p:animClr clrSpc="hsl" dir="cw">
+                                      <p:cBhvr>
+                                        <p:cTn id="12" dur="500" fill="hold"/>
+                                        <p:tgtEl>
+                                          <p:spTgt spid="12"/>
+                                        </p:tgtEl>
+                                        <p:attrNameLst>
+                                          <p:attrName>fillcolor</p:attrName>
+                                        </p:attrNameLst>
+                                      </p:cBhvr>
+                                      <p:by>
+                                        <p:hsl h="0" s="-12549" l="-25098"/>
+                                      </p:by>
+                                    </p:animClr>
+                                    <p:animClr clrSpc="hsl" dir="cw">
+                                      <p:cBhvr>
+                                        <p:cTn id="13" dur="500" fill="hold"/>
+                                        <p:tgtEl>
+                                          <p:spTgt spid="12"/>
+                                        </p:tgtEl>
+                                        <p:attrNameLst>
+                                          <p:attrName>stroke.color</p:attrName>
+                                        </p:attrNameLst>
+                                      </p:cBhvr>
+                                      <p:by>
+                                        <p:hsl h="0" s="-12549" l="-25098"/>
+                                      </p:by>
+                                    </p:animClr>
+                                    <p:set>
+                                      <p:cBhvr>
+                                        <p:cTn id="14" dur="500" fill="hold"/>
+                                        <p:tgtEl>
+                                          <p:spTgt spid="12"/>
+                                        </p:tgtEl>
+                                        <p:attrNameLst>
+                                          <p:attrName>fill.type</p:attrName>
+                                        </p:attrNameLst>
+                                      </p:cBhvr>
+                                      <p:to>
+                                        <p:strVal val="solid"/>
+                                      </p:to>
+                                    </p:set>
+                                  </p:childTnLst>
+                                </p:cTn>
+                              </p:par>
+                              <p:par>
+                                <p:cTn id="15" presetID="24" presetClass="emph" presetSubtype="0" fill="hold" nodeType="withEffect">
+                                  <p:stCondLst>
+                                    <p:cond delay="0"/>
+                                  </p:stCondLst>
+                                  <p:childTnLst>
+                                    <p:animClr clrSpc="hsl" dir="cw">
+                                      <p:cBhvr override="childStyle">
+                                        <p:cTn id="16" dur="500" fill="hold"/>
+                                        <p:tgtEl>
+                                          <p:spTgt spid="14"/>
+                                        </p:tgtEl>
+                                        <p:attrNameLst>
+                                          <p:attrName>style.color</p:attrName>
+                                        </p:attrNameLst>
+                                      </p:cBhvr>
+                                      <p:by>
+                                        <p:hsl h="0" s="-12549" l="-25098"/>
+                                      </p:by>
+                                    </p:animClr>
+                                    <p:animClr clrSpc="hsl" dir="cw">
+                                      <p:cBhvr>
+                                        <p:cTn id="17" dur="500" fill="hold"/>
+                                        <p:tgtEl>
+                                          <p:spTgt spid="14"/>
+                                        </p:tgtEl>
+                                        <p:attrNameLst>
+                                          <p:attrName>fillcolor</p:attrName>
+                                        </p:attrNameLst>
+                                      </p:cBhvr>
+                                      <p:by>
+                                        <p:hsl h="0" s="-12549" l="-25098"/>
+                                      </p:by>
+                                    </p:animClr>
+                                    <p:animClr clrSpc="hsl" dir="cw">
+                                      <p:cBhvr>
+                                        <p:cTn id="18" dur="500" fill="hold"/>
+                                        <p:tgtEl>
+                                          <p:spTgt spid="14"/>
+                                        </p:tgtEl>
+                                        <p:attrNameLst>
+                                          <p:attrName>stroke.color</p:attrName>
+                                        </p:attrNameLst>
+                                      </p:cBhvr>
+                                      <p:by>
+                                        <p:hsl h="0" s="-12549" l="-25098"/>
+                                      </p:by>
+                                    </p:animClr>
+                                    <p:set>
+                                      <p:cBhvr>
+                                        <p:cTn id="19" dur="500" fill="hold"/>
+                                        <p:tgtEl>
+                                          <p:spTgt spid="14"/>
+                                        </p:tgtEl>
+                                        <p:attrNameLst>
+                                          <p:attrName>fill.type</p:attrName>
+                                        </p:attrNameLst>
+                                      </p:cBhvr>
+                                      <p:to>
+                                        <p:strVal val="solid"/>
+                                      </p:to>
+                                    </p:set>
+                                  </p:childTnLst>
+                                </p:cTn>
+                              </p:par>
+                              <p:par>
+                                <p:cTn id="20" presetID="24" presetClass="emph" presetSubtype="0" fill="hold" grpId="0" nodeType="withEffect">
+                                  <p:stCondLst>
+                                    <p:cond delay="0"/>
+                                  </p:stCondLst>
+                                  <p:childTnLst>
+                                    <p:animClr clrSpc="hsl" dir="cw">
+                                      <p:cBhvr override="childStyle">
+                                        <p:cTn id="21" dur="500" fill="hold"/>
+                                        <p:tgtEl>
+                                          <p:spTgt spid="25"/>
+                                        </p:tgtEl>
+                                        <p:attrNameLst>
+                                          <p:attrName>style.color</p:attrName>
+                                        </p:attrNameLst>
+                                      </p:cBhvr>
+                                      <p:by>
+                                        <p:hsl h="0" s="-12549" l="-25098"/>
+                                      </p:by>
+                                    </p:animClr>
+                                    <p:animClr clrSpc="hsl" dir="cw">
+                                      <p:cBhvr>
+                                        <p:cTn id="22" dur="500" fill="hold"/>
+                                        <p:tgtEl>
+                                          <p:spTgt spid="25"/>
+                                        </p:tgtEl>
+                                        <p:attrNameLst>
+                                          <p:attrName>fillcolor</p:attrName>
+                                        </p:attrNameLst>
+                                      </p:cBhvr>
+                                      <p:by>
+                                        <p:hsl h="0" s="-12549" l="-25098"/>
+                                      </p:by>
+                                    </p:animClr>
+                                    <p:animClr clrSpc="hsl" dir="cw">
+                                      <p:cBhvr>
+                                        <p:cTn id="23" dur="500" fill="hold"/>
+                                        <p:tgtEl>
+                                          <p:spTgt spid="25"/>
+                                        </p:tgtEl>
+                                        <p:attrNameLst>
+                                          <p:attrName>stroke.color</p:attrName>
+                                        </p:attrNameLst>
+                                      </p:cBhvr>
+                                      <p:by>
+                                        <p:hsl h="0" s="-12549" l="-25098"/>
+                                      </p:by>
+                                    </p:animClr>
+                                    <p:set>
+                                      <p:cBhvr>
+                                        <p:cTn id="24" dur="500" fill="hold"/>
+                                        <p:tgtEl>
+                                          <p:spTgt spid="25"/>
+                                        </p:tgtEl>
+                                        <p:attrNameLst>
+                                          <p:attrName>fill.type</p:attrName>
+                                        </p:attrNameLst>
+                                      </p:cBhvr>
+                                      <p:to>
+                                        <p:strVal val="solid"/>
+                                      </p:to>
+                                    </p:set>
+                                  </p:childTnLst>
+                                </p:cTn>
+                              </p:par>
+                              <p:par>
+                                <p:cTn id="25" presetID="24" presetClass="emph" presetSubtype="0" fill="hold" nodeType="withEffect">
+                                  <p:stCondLst>
+                                    <p:cond delay="0"/>
+                                  </p:stCondLst>
+                                  <p:childTnLst>
+                                    <p:animClr clrSpc="hsl" dir="cw">
+                                      <p:cBhvr override="childStyle">
+                                        <p:cTn id="26" dur="500" fill="hold"/>
+                                        <p:tgtEl>
+                                          <p:spTgt spid="15"/>
+                                        </p:tgtEl>
+                                        <p:attrNameLst>
+                                          <p:attrName>style.color</p:attrName>
+                                        </p:attrNameLst>
+                                      </p:cBhvr>
+                                      <p:by>
+                                        <p:hsl h="0" s="-12549" l="-25098"/>
+                                      </p:by>
+                                    </p:animClr>
+                                    <p:animClr clrSpc="hsl" dir="cw">
+                                      <p:cBhvr>
+                                        <p:cTn id="27" dur="500" fill="hold"/>
+                                        <p:tgtEl>
+                                          <p:spTgt spid="15"/>
+                                        </p:tgtEl>
+                                        <p:attrNameLst>
+                                          <p:attrName>fillcolor</p:attrName>
+                                        </p:attrNameLst>
+                                      </p:cBhvr>
+                                      <p:by>
+                                        <p:hsl h="0" s="-12549" l="-25098"/>
+                                      </p:by>
+                                    </p:animClr>
+                                    <p:animClr clrSpc="hsl" dir="cw">
+                                      <p:cBhvr>
+                                        <p:cTn id="28" dur="500" fill="hold"/>
+                                        <p:tgtEl>
+                                          <p:spTgt spid="15"/>
+                                        </p:tgtEl>
+                                        <p:attrNameLst>
+                                          <p:attrName>stroke.color</p:attrName>
+                                        </p:attrNameLst>
+                                      </p:cBhvr>
+                                      <p:by>
+                                        <p:hsl h="0" s="-12549" l="-25098"/>
+                                      </p:by>
+                                    </p:animClr>
+                                    <p:set>
+                                      <p:cBhvr>
+                                        <p:cTn id="29" dur="500" fill="hold"/>
+                                        <p:tgtEl>
+                                          <p:spTgt spid="15"/>
+                                        </p:tgtEl>
+                                        <p:attrNameLst>
+                                          <p:attrName>fill.type</p:attrName>
+                                        </p:attrNameLst>
+                                      </p:cBhvr>
+                                      <p:to>
+                                        <p:strVal val="solid"/>
+                                      </p:to>
+                                    </p:set>
+                                  </p:childTnLst>
+                                </p:cTn>
+                              </p:par>
+                              <p:par>
+                                <p:cTn id="30" presetID="10" presetClass="entr" presetSubtype="0" fill="hold" nodeType="withEffect">
+                                  <p:stCondLst>
+                                    <p:cond delay="0"/>
+                                  </p:stCondLst>
+                                  <p:childTnLst>
+                                    <p:set>
+                                      <p:cBhvr>
+                                        <p:cTn id="31" dur="1" fill="hold">
+                                          <p:stCondLst>
+                                            <p:cond delay="0"/>
+                                          </p:stCondLst>
+                                        </p:cTn>
+                                        <p:tgtEl>
+                                          <p:spTgt spid="27"/>
+                                        </p:tgtEl>
+                                        <p:attrNameLst>
+                                          <p:attrName>style.visibility</p:attrName>
+                                        </p:attrNameLst>
+                                      </p:cBhvr>
+                                      <p:to>
+                                        <p:strVal val="visible"/>
+                                      </p:to>
+                                    </p:set>
+                                    <p:animEffect transition="in" filter="fade">
+                                      <p:cBhvr>
+                                        <p:cTn id="32" dur="500"/>
+                                        <p:tgtEl>
+                                          <p:spTgt spid="27"/>
+                                        </p:tgtEl>
+                                      </p:cBhvr>
+                                    </p:animEffect>
+                                  </p:childTnLst>
+                                </p:cTn>
+                              </p:par>
+                              <p:par>
+                                <p:cTn id="33" presetID="10" presetClass="entr" presetSubtype="0" fill="hold" grpId="0" nodeType="withEffect">
+                                  <p:stCondLst>
+                                    <p:cond delay="0"/>
+                                  </p:stCondLst>
+                                  <p:childTnLst>
+                                    <p:set>
+                                      <p:cBhvr>
+                                        <p:cTn id="34" dur="1" fill="hold">
+                                          <p:stCondLst>
+                                            <p:cond delay="0"/>
+                                          </p:stCondLst>
+                                        </p:cTn>
+                                        <p:tgtEl>
+                                          <p:spTgt spid="26"/>
+                                        </p:tgtEl>
+                                        <p:attrNameLst>
+                                          <p:attrName>style.visibility</p:attrName>
+                                        </p:attrNameLst>
+                                      </p:cBhvr>
+                                      <p:to>
+                                        <p:strVal val="visible"/>
+                                      </p:to>
+                                    </p:set>
+                                    <p:animEffect transition="in" filter="fade">
+                                      <p:cBhvr>
+                                        <p:cTn id="35" dur="500"/>
+                                        <p:tgtEl>
+                                          <p:spTgt spid="26"/>
+                                        </p:tgtEl>
+                                      </p:cBhvr>
+                                    </p:animEffect>
+                                  </p:childTnLst>
+                                </p:cTn>
+                              </p:par>
+                              <p:par>
+                                <p:cTn id="36" presetID="10" presetClass="entr" presetSubtype="0" fill="hold" grpId="0" nodeType="withEffect">
+                                  <p:stCondLst>
+                                    <p:cond delay="0"/>
+                                  </p:stCondLst>
+                                  <p:childTnLst>
+                                    <p:set>
+                                      <p:cBhvr>
+                                        <p:cTn id="37" dur="1" fill="hold">
+                                          <p:stCondLst>
+                                            <p:cond delay="0"/>
+                                          </p:stCondLst>
+                                        </p:cTn>
+                                        <p:tgtEl>
+                                          <p:spTgt spid="28"/>
+                                        </p:tgtEl>
+                                        <p:attrNameLst>
+                                          <p:attrName>style.visibility</p:attrName>
+                                        </p:attrNameLst>
+                                      </p:cBhvr>
+                                      <p:to>
+                                        <p:strVal val="visible"/>
+                                      </p:to>
+                                    </p:set>
+                                    <p:animEffect transition="in" filter="fade">
+                                      <p:cBhvr>
+                                        <p:cTn id="38" dur="500"/>
+                                        <p:tgtEl>
+                                          <p:spTgt spid="28"/>
+                                        </p:tgtEl>
+                                      </p:cBhvr>
+                                    </p:animEffect>
+                                  </p:childTnLst>
+                                </p:cTn>
+                              </p:par>
+                              <p:par>
+                                <p:cTn id="39" presetID="10" presetClass="entr" presetSubtype="0" fill="hold" nodeType="withEffect">
+                                  <p:stCondLst>
+                                    <p:cond delay="0"/>
+                                  </p:stCondLst>
+                                  <p:childTnLst>
+                                    <p:set>
+                                      <p:cBhvr>
+                                        <p:cTn id="40" dur="1" fill="hold">
+                                          <p:stCondLst>
+                                            <p:cond delay="0"/>
+                                          </p:stCondLst>
+                                        </p:cTn>
+                                        <p:tgtEl>
+                                          <p:spTgt spid="29"/>
+                                        </p:tgtEl>
+                                        <p:attrNameLst>
+                                          <p:attrName>style.visibility</p:attrName>
+                                        </p:attrNameLst>
+                                      </p:cBhvr>
+                                      <p:to>
+                                        <p:strVal val="visible"/>
+                                      </p:to>
+                                    </p:set>
+                                    <p:animEffect transition="in" filter="fade">
+                                      <p:cBhvr>
+                                        <p:cTn id="41" dur="500"/>
+                                        <p:tgtEl>
+                                          <p:spTgt spid="29"/>
+                                        </p:tgtEl>
+                                      </p:cBhvr>
+                                    </p:animEffect>
+                                  </p:childTnLst>
+                                </p:cTn>
+                              </p:par>
+                            </p:childTnLst>
+                          </p:cTn>
+                        </p:par>
+                      </p:childTnLst>
+                    </p:cTn>
+                  </p:par>
+                  <p:par>
+                    <p:cTn id="42" fill="hold">
+                      <p:stCondLst>
+                        <p:cond delay="indefinite"/>
+                      </p:stCondLst>
+                      <p:childTnLst>
+                        <p:par>
+                          <p:cTn id="43" fill="hold">
+                            <p:stCondLst>
+                              <p:cond delay="0"/>
+                            </p:stCondLst>
+                            <p:childTnLst>
+                              <p:par>
+                                <p:cTn id="44" presetID="10" presetClass="entr" presetSubtype="0" fill="hold" grpId="0" nodeType="clickEffect">
+                                  <p:stCondLst>
+                                    <p:cond delay="0"/>
+                                  </p:stCondLst>
+                                  <p:childTnLst>
+                                    <p:set>
+                                      <p:cBhvr>
+                                        <p:cTn id="45" dur="1" fill="hold">
+                                          <p:stCondLst>
+                                            <p:cond delay="0"/>
+                                          </p:stCondLst>
+                                        </p:cTn>
+                                        <p:tgtEl>
+                                          <p:spTgt spid="30"/>
+                                        </p:tgtEl>
+                                        <p:attrNameLst>
+                                          <p:attrName>style.visibility</p:attrName>
+                                        </p:attrNameLst>
+                                      </p:cBhvr>
+                                      <p:to>
+                                        <p:strVal val="visible"/>
+                                      </p:to>
+                                    </p:set>
+                                    <p:animEffect transition="in" filter="fade">
+                                      <p:cBhvr>
+                                        <p:cTn id="46" dur="500"/>
+                                        <p:tgtEl>
+                                          <p:spTgt spid="30"/>
+                                        </p:tgtEl>
+                                      </p:cBhvr>
+                                    </p:animEffect>
+                                  </p:childTnLst>
+                                </p:cTn>
+                              </p:par>
+                              <p:par>
+                                <p:cTn id="47" presetID="10" presetClass="entr" presetSubtype="0" fill="hold" nodeType="withEffect">
+                                  <p:stCondLst>
+                                    <p:cond delay="0"/>
+                                  </p:stCondLst>
+                                  <p:childTnLst>
+                                    <p:set>
+                                      <p:cBhvr>
+                                        <p:cTn id="48" dur="1" fill="hold">
+                                          <p:stCondLst>
+                                            <p:cond delay="0"/>
+                                          </p:stCondLst>
+                                        </p:cTn>
+                                        <p:tgtEl>
+                                          <p:spTgt spid="31"/>
+                                        </p:tgtEl>
+                                        <p:attrNameLst>
+                                          <p:attrName>style.visibility</p:attrName>
+                                        </p:attrNameLst>
+                                      </p:cBhvr>
+                                      <p:to>
+                                        <p:strVal val="visible"/>
+                                      </p:to>
+                                    </p:set>
+                                    <p:animEffect transition="in" filter="fade">
+                                      <p:cBhvr>
+                                        <p:cTn id="49" dur="500"/>
+                                        <p:tgtEl>
+                                          <p:spTgt spid="31"/>
+                                        </p:tgtEl>
+                                      </p:cBhvr>
+                                    </p:animEffect>
+                                  </p:childTnLst>
+                                </p:cTn>
+                              </p:par>
+                            </p:childTnLst>
+                          </p:cTn>
+                        </p:par>
+                      </p:childTnLst>
+                    </p:cTn>
+                  </p:par>
+                </p:childTnLst>
+              </p:cTn>
+              <p:prevCondLst>
+                <p:cond evt="onPrev" delay="0">
+                  <p:tgtEl>
+                    <p:sldTgt/>
+                  </p:tgtEl>
+                </p:cond>
+              </p:prevCondLst>
+              <p:nextCondLst>
+                <p:cond evt="onNext" delay="0">
+                  <p:tgtEl>
+                    <p:sldTgt/>
+                  </p:tgtEl>
+                </p:cond>
+              </p:nextCondLst>
+            </p:seq>
+          </p:childTnLst>
+        </p:cTn>
+      </p:par>
+    </p:tnLst>
+    <p:bldLst>
+      <p:bldP spid="25" grpId="0" animBg="1"/>
+      <p:bldP spid="11" grpId="0" animBg="1"/>
+      <p:bldP spid="12" grpId="0" animBg="1"/>
+      <p:bldP spid="26" grpId="0" animBg="1"/>
+      <p:bldP spid="28" grpId="0" animBg="1"/>
+      <p:bldP spid="30" grpId="0" animBg="1"/>
+    </p:bldLst>
+  </p:timing>
+</p:sld>
+</file>
+
+<file path=ppt/slides/slide22.xml><?xml version="1.0" encoding="utf-8"?>
+<p:sld xmlns:a="http://schemas.openxmlformats.org/drawingml/2006/main" xmlns:r="http://schemas.openxmlformats.org/officeDocument/2006/relationships" xmlns:p="http://schemas.openxmlformats.org/presentationml/2006/main">
+  <p:cSld>
+    <p:spTree>
+      <p:nvGrpSpPr>
+        <p:cNvPr id="1" name=""/>
+        <p:cNvGrpSpPr/>
+        <p:nvPr/>
+      </p:nvGrpSpPr>
+      <p:grpSpPr>
+        <a:xfrm>
+          <a:off x="0" y="0"/>
+          <a:ext cx="0" cy="0"/>
+          <a:chOff x="0" y="0"/>
+          <a:chExt cx="0" cy="0"/>
+        </a:xfrm>
+      </p:grpSpPr>
+      <p:sp>
+        <p:nvSpPr>
           <p:cNvPr id="2" name="Slide Number Placeholder 1">
             <a:extLst>
               <a:ext uri="{FF2B5EF4-FFF2-40B4-BE49-F238E27FC236}">
@@ -26588,7 +29561,7 @@
             <a:fld id="{3A707DD9-E92B-45E8-BE0A-E6B2EDF345EB}" type="slidenum">
               <a:rPr lang="en-US" smtClean="0"/>
               <a:pPr/>
-              <a:t>20</a:t>
+              <a:t>22</a:t>
             </a:fld>
             <a:endParaRPr lang="en-US" dirty="0"/>
           </a:p>
@@ -26633,6 +29606,446 @@
     <p:extLst>
       <p:ext uri="{BB962C8B-B14F-4D97-AF65-F5344CB8AC3E}">
         <p14:creationId xmlns:p14="http://schemas.microsoft.com/office/powerpoint/2010/main" val="2832294497"/>
+      </p:ext>
+    </p:extLst>
+  </p:cSld>
+  <p:clrMapOvr>
+    <a:masterClrMapping/>
+  </p:clrMapOvr>
+</p:sld>
+</file>
+
+<file path=ppt/slides/slide23.xml><?xml version="1.0" encoding="utf-8"?>
+<p:sld xmlns:a="http://schemas.openxmlformats.org/drawingml/2006/main" xmlns:r="http://schemas.openxmlformats.org/officeDocument/2006/relationships" xmlns:p="http://schemas.openxmlformats.org/presentationml/2006/main">
+  <p:cSld>
+    <p:spTree>
+      <p:nvGrpSpPr>
+        <p:cNvPr id="1" name=""/>
+        <p:cNvGrpSpPr/>
+        <p:nvPr/>
+      </p:nvGrpSpPr>
+      <p:grpSpPr>
+        <a:xfrm>
+          <a:off x="0" y="0"/>
+          <a:ext cx="0" cy="0"/>
+          <a:chOff x="0" y="0"/>
+          <a:chExt cx="0" cy="0"/>
+        </a:xfrm>
+      </p:grpSpPr>
+      <p:sp>
+        <p:nvSpPr>
+          <p:cNvPr id="2" name="Title 1">
+            <a:extLst>
+              <a:ext uri="{FF2B5EF4-FFF2-40B4-BE49-F238E27FC236}">
+                <a16:creationId xmlns:a16="http://schemas.microsoft.com/office/drawing/2014/main" id="{8B16BF04-858B-4895-8535-6C2A048D5F97}"/>
+              </a:ext>
+            </a:extLst>
+          </p:cNvPr>
+          <p:cNvSpPr>
+            <a:spLocks noGrp="1"/>
+          </p:cNvSpPr>
+          <p:nvPr>
+            <p:ph type="title"/>
+          </p:nvPr>
+        </p:nvSpPr>
+        <p:spPr>
+          <a:xfrm>
+            <a:off x="298176" y="240243"/>
+            <a:ext cx="8537602" cy="658189"/>
+          </a:xfrm>
+          <a:ln>
+            <a:noFill/>
+          </a:ln>
+        </p:spPr>
+        <p:txBody>
+          <a:bodyPr/>
+          <a:lstStyle/>
+          <a:p>
+            <a:pPr algn="l"/>
+            <a:r>
+              <a:rPr lang="en-US" sz="2400" dirty="0">
+                <a:effectLst>
+                  <a:outerShdw blurRad="38100" dist="38100" dir="2700000" algn="tl">
+                    <a:srgbClr val="000000">
+                      <a:alpha val="43137"/>
+                    </a:srgbClr>
+                  </a:outerShdw>
+                </a:effectLst>
+                <a:latin typeface="Arial Narrow" panose="020B0606020202030204" pitchFamily="34" charset="0"/>
+                <a:ea typeface="+mn-ea"/>
+                <a:cs typeface="+mn-cs"/>
+              </a:rPr>
+              <a:t>THANK YOU!</a:t>
+            </a:r>
+          </a:p>
+        </p:txBody>
+      </p:sp>
+      <p:pic>
+        <p:nvPicPr>
+          <p:cNvPr id="10" name="Picture 9">
+            <a:extLst>
+              <a:ext uri="{FF2B5EF4-FFF2-40B4-BE49-F238E27FC236}">
+                <a16:creationId xmlns:a16="http://schemas.microsoft.com/office/drawing/2014/main" id="{4D0C748E-4FC5-477E-9445-9F8C09581BCB}"/>
+              </a:ext>
+            </a:extLst>
+          </p:cNvPr>
+          <p:cNvPicPr>
+            <a:picLocks noChangeAspect="1"/>
+          </p:cNvPicPr>
+          <p:nvPr/>
+        </p:nvPicPr>
+        <p:blipFill>
+          <a:blip r:embed="rId2" cstate="print">
+            <a:extLst>
+              <a:ext uri="{28A0092B-C50C-407E-A947-70E740481C1C}">
+                <a14:useLocalDpi xmlns:a14="http://schemas.microsoft.com/office/drawing/2010/main" val="0"/>
+              </a:ext>
+            </a:extLst>
+          </a:blip>
+          <a:stretch>
+            <a:fillRect/>
+          </a:stretch>
+        </p:blipFill>
+        <p:spPr>
+          <a:xfrm>
+            <a:off x="1055991" y="1694025"/>
+            <a:ext cx="2119447" cy="2119447"/>
+          </a:xfrm>
+          <a:prstGeom prst="rect">
+            <a:avLst/>
+          </a:prstGeom>
+          <a:solidFill>
+            <a:srgbClr val="FFFFFF">
+              <a:shade val="85000"/>
+            </a:srgbClr>
+          </a:solidFill>
+          <a:ln w="190500" cap="sq">
+            <a:solidFill>
+              <a:srgbClr val="FFFFFF"/>
+            </a:solidFill>
+            <a:miter lim="800000"/>
+          </a:ln>
+          <a:effectLst>
+            <a:outerShdw blurRad="65000" dist="50800" dir="12900000" kx="195000" ky="145000" algn="tl" rotWithShape="0">
+              <a:srgbClr val="000000">
+                <a:alpha val="30000"/>
+              </a:srgbClr>
+            </a:outerShdw>
+          </a:effectLst>
+          <a:scene3d>
+            <a:camera prst="orthographicFront">
+              <a:rot lat="0" lon="0" rev="360000"/>
+            </a:camera>
+            <a:lightRig rig="twoPt" dir="t">
+              <a:rot lat="0" lon="0" rev="7200000"/>
+            </a:lightRig>
+          </a:scene3d>
+          <a:sp3d contourW="12700">
+            <a:bevelT w="25400" h="19050"/>
+            <a:contourClr>
+              <a:srgbClr val="969696"/>
+            </a:contourClr>
+          </a:sp3d>
+        </p:spPr>
+      </p:pic>
+      <p:sp>
+        <p:nvSpPr>
+          <p:cNvPr id="12" name="Rectangle 11">
+            <a:extLst>
+              <a:ext uri="{FF2B5EF4-FFF2-40B4-BE49-F238E27FC236}">
+                <a16:creationId xmlns:a16="http://schemas.microsoft.com/office/drawing/2014/main" id="{61C6D37F-309B-4094-96F5-7447598BD888}"/>
+              </a:ext>
+            </a:extLst>
+          </p:cNvPr>
+          <p:cNvSpPr/>
+          <p:nvPr/>
+        </p:nvSpPr>
+        <p:spPr>
+          <a:xfrm>
+            <a:off x="4874861" y="338504"/>
+            <a:ext cx="3525324" cy="461665"/>
+          </a:xfrm>
+          <a:prstGeom prst="rect">
+            <a:avLst/>
+          </a:prstGeom>
+        </p:spPr>
+        <p:txBody>
+          <a:bodyPr wrap="none">
+            <a:spAutoFit/>
+          </a:bodyPr>
+          <a:lstStyle/>
+          <a:p>
+            <a:pPr>
+              <a:buClr>
+                <a:schemeClr val="tx2"/>
+              </a:buClr>
+            </a:pPr>
+            <a:r>
+              <a:rPr lang="en-US" sz="2400" b="1" dirty="0">
+                <a:solidFill>
+                  <a:schemeClr val="bg1"/>
+                </a:solidFill>
+                <a:effectLst>
+                  <a:outerShdw blurRad="38100" dist="38100" dir="2700000" algn="tl">
+                    <a:srgbClr val="000000">
+                      <a:alpha val="43137"/>
+                    </a:srgbClr>
+                  </a:outerShdw>
+                </a:effectLst>
+                <a:latin typeface="Arial Narrow" panose="020B0606020202030204" pitchFamily="34" charset="0"/>
+              </a:rPr>
+              <a:t>ORESZT</a:t>
+            </a:r>
+            <a:r>
+              <a:rPr lang="hu-HU" sz="2400" b="1" dirty="0">
+                <a:solidFill>
+                  <a:schemeClr val="bg1"/>
+                </a:solidFill>
+                <a:effectLst>
+                  <a:outerShdw blurRad="38100" dist="38100" dir="2700000" algn="tl">
+                    <a:srgbClr val="000000">
+                      <a:alpha val="43137"/>
+                    </a:srgbClr>
+                  </a:outerShdw>
+                </a:effectLst>
+                <a:latin typeface="Arial Narrow" panose="020B0606020202030204" pitchFamily="34" charset="0"/>
+              </a:rPr>
+              <a:t>ÉSZ MARGARITISZ</a:t>
+            </a:r>
+            <a:endParaRPr lang="en-US" sz="2400" b="1" dirty="0">
+              <a:solidFill>
+                <a:schemeClr val="bg1"/>
+              </a:solidFill>
+              <a:effectLst>
+                <a:outerShdw blurRad="38100" dist="38100" dir="2700000" algn="tl">
+                  <a:srgbClr val="000000">
+                    <a:alpha val="43137"/>
+                  </a:srgbClr>
+                </a:outerShdw>
+              </a:effectLst>
+              <a:latin typeface="Arial Narrow" panose="020B0606020202030204" pitchFamily="34" charset="0"/>
+            </a:endParaRPr>
+          </a:p>
+        </p:txBody>
+      </p:sp>
+      <p:sp>
+        <p:nvSpPr>
+          <p:cNvPr id="16" name="TextBox 15">
+            <a:extLst>
+              <a:ext uri="{FF2B5EF4-FFF2-40B4-BE49-F238E27FC236}">
+                <a16:creationId xmlns:a16="http://schemas.microsoft.com/office/drawing/2014/main" id="{DE49AE51-3FDE-4DCC-BD11-9F45A1D1AC2F}"/>
+              </a:ext>
+            </a:extLst>
+          </p:cNvPr>
+          <p:cNvSpPr txBox="1"/>
+          <p:nvPr/>
+        </p:nvSpPr>
+        <p:spPr>
+          <a:xfrm>
+            <a:off x="5670929" y="2960517"/>
+            <a:ext cx="3302443" cy="369332"/>
+          </a:xfrm>
+          <a:prstGeom prst="rect">
+            <a:avLst/>
+          </a:prstGeom>
+          <a:noFill/>
+        </p:spPr>
+        <p:txBody>
+          <a:bodyPr wrap="none" rtlCol="0">
+            <a:spAutoFit/>
+          </a:bodyPr>
+          <a:lstStyle/>
+          <a:p>
+            <a:r>
+              <a:rPr lang="en-US" sz="1800" b="1" dirty="0">
+                <a:solidFill>
+                  <a:schemeClr val="bg1"/>
+                </a:solidFill>
+                <a:latin typeface="+mj-lt"/>
+              </a:rPr>
+              <a:t>oresztesz_margaritisz@epam.com</a:t>
+            </a:r>
+          </a:p>
+        </p:txBody>
+      </p:sp>
+      <p:sp>
+        <p:nvSpPr>
+          <p:cNvPr id="18" name="TextBox 17">
+            <a:extLst>
+              <a:ext uri="{FF2B5EF4-FFF2-40B4-BE49-F238E27FC236}">
+                <a16:creationId xmlns:a16="http://schemas.microsoft.com/office/drawing/2014/main" id="{F08C8C3C-30D9-4D1D-8563-D93FFBB6570A}"/>
+              </a:ext>
+            </a:extLst>
+          </p:cNvPr>
+          <p:cNvSpPr txBox="1"/>
+          <p:nvPr/>
+        </p:nvSpPr>
+        <p:spPr>
+          <a:xfrm>
+            <a:off x="5670929" y="2384416"/>
+            <a:ext cx="1174424" cy="369332"/>
+          </a:xfrm>
+          <a:prstGeom prst="rect">
+            <a:avLst/>
+          </a:prstGeom>
+          <a:noFill/>
+        </p:spPr>
+        <p:txBody>
+          <a:bodyPr wrap="none" rtlCol="0">
+            <a:spAutoFit/>
+          </a:bodyPr>
+          <a:lstStyle/>
+          <a:p>
+            <a:r>
+              <a:rPr lang="en-US" sz="1800" b="1" dirty="0" err="1">
+                <a:solidFill>
+                  <a:schemeClr val="bg1"/>
+                </a:solidFill>
+                <a:latin typeface="+mj-lt"/>
+              </a:rPr>
+              <a:t>gitaroktato</a:t>
+            </a:r>
+            <a:endParaRPr lang="en-US" sz="1800" b="1" dirty="0">
+              <a:solidFill>
+                <a:schemeClr val="bg1"/>
+              </a:solidFill>
+              <a:latin typeface="+mj-lt"/>
+            </a:endParaRPr>
+          </a:p>
+        </p:txBody>
+      </p:sp>
+      <p:pic>
+        <p:nvPicPr>
+          <p:cNvPr id="19" name="Picture 18">
+            <a:extLst>
+              <a:ext uri="{FF2B5EF4-FFF2-40B4-BE49-F238E27FC236}">
+                <a16:creationId xmlns:a16="http://schemas.microsoft.com/office/drawing/2014/main" id="{B96481A5-20CE-443A-B43E-9863E5DD5085}"/>
+              </a:ext>
+            </a:extLst>
+          </p:cNvPr>
+          <p:cNvPicPr>
+            <a:picLocks noChangeAspect="1"/>
+          </p:cNvPicPr>
+          <p:nvPr/>
+        </p:nvPicPr>
+        <p:blipFill>
+          <a:blip r:embed="rId3" cstate="print">
+            <a:extLst>
+              <a:ext uri="{BEBA8EAE-BF5A-486C-A8C5-ECC9F3942E4B}">
+                <a14:imgProps xmlns:a14="http://schemas.microsoft.com/office/drawing/2010/main">
+                  <a14:imgLayer r:embed="rId4">
+                    <a14:imgEffect>
+                      <a14:backgroundRemoval t="10000" b="90000" l="10000" r="90000"/>
+                    </a14:imgEffect>
+                  </a14:imgLayer>
+                </a14:imgProps>
+              </a:ext>
+              <a:ext uri="{28A0092B-C50C-407E-A947-70E740481C1C}">
+                <a14:useLocalDpi xmlns:a14="http://schemas.microsoft.com/office/drawing/2010/main" val="0"/>
+              </a:ext>
+            </a:extLst>
+          </a:blip>
+          <a:stretch>
+            <a:fillRect/>
+          </a:stretch>
+        </p:blipFill>
+        <p:spPr>
+          <a:xfrm>
+            <a:off x="4874861" y="2256357"/>
+            <a:ext cx="610586" cy="610586"/>
+          </a:xfrm>
+          <a:prstGeom prst="rect">
+            <a:avLst/>
+          </a:prstGeom>
+        </p:spPr>
+      </p:pic>
+      <p:pic>
+        <p:nvPicPr>
+          <p:cNvPr id="13" name="Picture 12">
+            <a:extLst>
+              <a:ext uri="{FF2B5EF4-FFF2-40B4-BE49-F238E27FC236}">
+                <a16:creationId xmlns:a16="http://schemas.microsoft.com/office/drawing/2014/main" id="{4F596698-2F9B-48CD-A0F1-9CF2EEB0C2B8}"/>
+              </a:ext>
+            </a:extLst>
+          </p:cNvPr>
+          <p:cNvPicPr>
+            <a:picLocks noChangeAspect="1"/>
+          </p:cNvPicPr>
+          <p:nvPr/>
+        </p:nvPicPr>
+        <p:blipFill>
+          <a:blip r:embed="rId5">
+            <a:extLst>
+              <a:ext uri="{28A0092B-C50C-407E-A947-70E740481C1C}">
+                <a14:useLocalDpi xmlns:a14="http://schemas.microsoft.com/office/drawing/2010/main" val="0"/>
+              </a:ext>
+            </a:extLst>
+          </a:blip>
+          <a:stretch>
+            <a:fillRect/>
+          </a:stretch>
+        </p:blipFill>
+        <p:spPr>
+          <a:xfrm>
+            <a:off x="4874861" y="1304106"/>
+            <a:ext cx="1955700" cy="733389"/>
+          </a:xfrm>
+          <a:prstGeom prst="rect">
+            <a:avLst/>
+          </a:prstGeom>
+        </p:spPr>
+      </p:pic>
+      <p:pic>
+        <p:nvPicPr>
+          <p:cNvPr id="1026" name="Picture 2" descr="EdTechTeacher gmail-logo - EdTechTeacher">
+            <a:extLst>
+              <a:ext uri="{FF2B5EF4-FFF2-40B4-BE49-F238E27FC236}">
+                <a16:creationId xmlns:a16="http://schemas.microsoft.com/office/drawing/2014/main" id="{1D9B6F5F-2371-4CCB-9BA9-26F411F581F6}"/>
+              </a:ext>
+            </a:extLst>
+          </p:cNvPr>
+          <p:cNvPicPr>
+            <a:picLocks noChangeAspect="1" noChangeArrowheads="1"/>
+          </p:cNvPicPr>
+          <p:nvPr/>
+        </p:nvPicPr>
+        <p:blipFill>
+          <a:blip r:embed="rId6" cstate="print">
+            <a:extLst>
+              <a:ext uri="{28A0092B-C50C-407E-A947-70E740481C1C}">
+                <a14:useLocalDpi xmlns:a14="http://schemas.microsoft.com/office/drawing/2010/main" val="0"/>
+              </a:ext>
+            </a:extLst>
+          </a:blip>
+          <a:srcRect/>
+          <a:stretch>
+            <a:fillRect/>
+          </a:stretch>
+        </p:blipFill>
+        <p:spPr bwMode="auto">
+          <a:xfrm>
+            <a:off x="4880149" y="2842534"/>
+            <a:ext cx="605298" cy="605298"/>
+          </a:xfrm>
+          <a:prstGeom prst="rect">
+            <a:avLst/>
+          </a:prstGeom>
+          <a:noFill/>
+          <a:extLst>
+            <a:ext uri="{909E8E84-426E-40DD-AFC4-6F175D3DCCD1}">
+              <a14:hiddenFill xmlns:a14="http://schemas.microsoft.com/office/drawing/2010/main">
+                <a:solidFill>
+                  <a:srgbClr val="FFFFFF"/>
+                </a:solidFill>
+              </a14:hiddenFill>
+            </a:ext>
+          </a:extLst>
+        </p:spPr>
+      </p:pic>
+    </p:spTree>
+    <p:extLst>
+      <p:ext uri="{BB962C8B-B14F-4D97-AF65-F5344CB8AC3E}">
+        <p14:creationId xmlns:p14="http://schemas.microsoft.com/office/powerpoint/2010/main" val="488183526"/>
       </p:ext>
     </p:extLst>
   </p:cSld>

</xml_diff>